<commit_message>
Slide Deck Update 2.0
</commit_message>
<xml_diff>
--- a/Project 3 Group 8 - Museums of the United States.pptx
+++ b/Project 3 Group 8 - Museums of the United States.pptx
@@ -4,6 +4,9 @@
   <p:sldMasterIdLst>
     <p:sldMasterId id="2147483677" r:id="rId1"/>
   </p:sldMasterIdLst>
+  <p:notesMasterIdLst>
+    <p:notesMasterId r:id="rId14"/>
+  </p:notesMasterIdLst>
   <p:sldIdLst>
     <p:sldId id="256" r:id="rId2"/>
     <p:sldId id="260" r:id="rId3"/>
@@ -121,6 +124,458 @@
     </p:ext>
   </p:extLst>
 </p:presentation>
+</file>
+
+<file path=ppt/notesMasters/notesMaster1.xml><?xml version="1.0" encoding="utf-8"?>
+<p:notesMaster xmlns:a="http://schemas.openxmlformats.org/drawingml/2006/main" xmlns:r="http://schemas.openxmlformats.org/officeDocument/2006/relationships" xmlns:p="http://schemas.openxmlformats.org/presentationml/2006/main">
+  <p:cSld>
+    <p:bg>
+      <p:bgRef idx="1001">
+        <a:schemeClr val="bg1"/>
+      </p:bgRef>
+    </p:bg>
+    <p:spTree>
+      <p:nvGrpSpPr>
+        <p:cNvPr id="1" name=""/>
+        <p:cNvGrpSpPr/>
+        <p:nvPr/>
+      </p:nvGrpSpPr>
+      <p:grpSpPr>
+        <a:xfrm>
+          <a:off x="0" y="0"/>
+          <a:ext cx="0" cy="0"/>
+          <a:chOff x="0" y="0"/>
+          <a:chExt cx="0" cy="0"/>
+        </a:xfrm>
+      </p:grpSpPr>
+      <p:sp>
+        <p:nvSpPr>
+          <p:cNvPr id="2" name="Header Placeholder 1"/>
+          <p:cNvSpPr>
+            <a:spLocks noGrp="1"/>
+          </p:cNvSpPr>
+          <p:nvPr>
+            <p:ph type="hdr" sz="quarter"/>
+          </p:nvPr>
+        </p:nvSpPr>
+        <p:spPr>
+          <a:xfrm>
+            <a:off x="0" y="0"/>
+            <a:ext cx="2971800" cy="458788"/>
+          </a:xfrm>
+          <a:prstGeom prst="rect">
+            <a:avLst/>
+          </a:prstGeom>
+        </p:spPr>
+        <p:txBody>
+          <a:bodyPr vert="horz" lIns="91440" tIns="45720" rIns="91440" bIns="45720" rtlCol="0"/>
+          <a:lstStyle>
+            <a:lvl1pPr algn="l">
+              <a:defRPr sz="1200"/>
+            </a:lvl1pPr>
+          </a:lstStyle>
+          <a:p>
+            <a:endParaRPr lang="en-US"/>
+          </a:p>
+        </p:txBody>
+      </p:sp>
+      <p:sp>
+        <p:nvSpPr>
+          <p:cNvPr id="3" name="Date Placeholder 2"/>
+          <p:cNvSpPr>
+            <a:spLocks noGrp="1"/>
+          </p:cNvSpPr>
+          <p:nvPr>
+            <p:ph type="dt" idx="1"/>
+          </p:nvPr>
+        </p:nvSpPr>
+        <p:spPr>
+          <a:xfrm>
+            <a:off x="3884613" y="0"/>
+            <a:ext cx="2971800" cy="458788"/>
+          </a:xfrm>
+          <a:prstGeom prst="rect">
+            <a:avLst/>
+          </a:prstGeom>
+        </p:spPr>
+        <p:txBody>
+          <a:bodyPr vert="horz" lIns="91440" tIns="45720" rIns="91440" bIns="45720" rtlCol="0"/>
+          <a:lstStyle>
+            <a:lvl1pPr algn="r">
+              <a:defRPr sz="1200"/>
+            </a:lvl1pPr>
+          </a:lstStyle>
+          <a:p>
+            <a:fld id="{C502E4CC-7E95-4D9E-8EA5-748C1C7B4EC5}" type="datetimeFigureOut">
+              <a:rPr lang="en-US" smtClean="0"/>
+              <a:t>12/12/2023</a:t>
+            </a:fld>
+            <a:endParaRPr lang="en-US"/>
+          </a:p>
+        </p:txBody>
+      </p:sp>
+      <p:sp>
+        <p:nvSpPr>
+          <p:cNvPr id="4" name="Slide Image Placeholder 3"/>
+          <p:cNvSpPr>
+            <a:spLocks noGrp="1" noRot="1" noChangeAspect="1"/>
+          </p:cNvSpPr>
+          <p:nvPr>
+            <p:ph type="sldImg" idx="2"/>
+          </p:nvPr>
+        </p:nvSpPr>
+        <p:spPr>
+          <a:xfrm>
+            <a:off x="685800" y="1143000"/>
+            <a:ext cx="5486400" cy="3086100"/>
+          </a:xfrm>
+          <a:prstGeom prst="rect">
+            <a:avLst/>
+          </a:prstGeom>
+          <a:noFill/>
+          <a:ln w="12700">
+            <a:solidFill>
+              <a:prstClr val="black"/>
+            </a:solidFill>
+          </a:ln>
+        </p:spPr>
+        <p:txBody>
+          <a:bodyPr vert="horz" lIns="91440" tIns="45720" rIns="91440" bIns="45720" rtlCol="0" anchor="ctr"/>
+          <a:lstStyle/>
+          <a:p>
+            <a:endParaRPr lang="en-US"/>
+          </a:p>
+        </p:txBody>
+      </p:sp>
+      <p:sp>
+        <p:nvSpPr>
+          <p:cNvPr id="5" name="Notes Placeholder 4"/>
+          <p:cNvSpPr>
+            <a:spLocks noGrp="1"/>
+          </p:cNvSpPr>
+          <p:nvPr>
+            <p:ph type="body" sz="quarter" idx="3"/>
+          </p:nvPr>
+        </p:nvSpPr>
+        <p:spPr>
+          <a:xfrm>
+            <a:off x="685800" y="4400550"/>
+            <a:ext cx="5486400" cy="3600450"/>
+          </a:xfrm>
+          <a:prstGeom prst="rect">
+            <a:avLst/>
+          </a:prstGeom>
+        </p:spPr>
+        <p:txBody>
+          <a:bodyPr vert="horz" lIns="91440" tIns="45720" rIns="91440" bIns="45720" rtlCol="0"/>
+          <a:lstStyle/>
+          <a:p>
+            <a:pPr lvl="0"/>
+            <a:r>
+              <a:rPr lang="en-US"/>
+              <a:t>Click to edit Master text styles</a:t>
+            </a:r>
+          </a:p>
+          <a:p>
+            <a:pPr lvl="1"/>
+            <a:r>
+              <a:rPr lang="en-US"/>
+              <a:t>Second level</a:t>
+            </a:r>
+          </a:p>
+          <a:p>
+            <a:pPr lvl="2"/>
+            <a:r>
+              <a:rPr lang="en-US"/>
+              <a:t>Third level</a:t>
+            </a:r>
+          </a:p>
+          <a:p>
+            <a:pPr lvl="3"/>
+            <a:r>
+              <a:rPr lang="en-US"/>
+              <a:t>Fourth level</a:t>
+            </a:r>
+          </a:p>
+          <a:p>
+            <a:pPr lvl="4"/>
+            <a:r>
+              <a:rPr lang="en-US"/>
+              <a:t>Fifth level</a:t>
+            </a:r>
+          </a:p>
+        </p:txBody>
+      </p:sp>
+      <p:sp>
+        <p:nvSpPr>
+          <p:cNvPr id="6" name="Footer Placeholder 5"/>
+          <p:cNvSpPr>
+            <a:spLocks noGrp="1"/>
+          </p:cNvSpPr>
+          <p:nvPr>
+            <p:ph type="ftr" sz="quarter" idx="4"/>
+          </p:nvPr>
+        </p:nvSpPr>
+        <p:spPr>
+          <a:xfrm>
+            <a:off x="0" y="8685213"/>
+            <a:ext cx="2971800" cy="458787"/>
+          </a:xfrm>
+          <a:prstGeom prst="rect">
+            <a:avLst/>
+          </a:prstGeom>
+        </p:spPr>
+        <p:txBody>
+          <a:bodyPr vert="horz" lIns="91440" tIns="45720" rIns="91440" bIns="45720" rtlCol="0" anchor="b"/>
+          <a:lstStyle>
+            <a:lvl1pPr algn="l">
+              <a:defRPr sz="1200"/>
+            </a:lvl1pPr>
+          </a:lstStyle>
+          <a:p>
+            <a:endParaRPr lang="en-US"/>
+          </a:p>
+        </p:txBody>
+      </p:sp>
+      <p:sp>
+        <p:nvSpPr>
+          <p:cNvPr id="7" name="Slide Number Placeholder 6"/>
+          <p:cNvSpPr>
+            <a:spLocks noGrp="1"/>
+          </p:cNvSpPr>
+          <p:nvPr>
+            <p:ph type="sldNum" sz="quarter" idx="5"/>
+          </p:nvPr>
+        </p:nvSpPr>
+        <p:spPr>
+          <a:xfrm>
+            <a:off x="3884613" y="8685213"/>
+            <a:ext cx="2971800" cy="458787"/>
+          </a:xfrm>
+          <a:prstGeom prst="rect">
+            <a:avLst/>
+          </a:prstGeom>
+        </p:spPr>
+        <p:txBody>
+          <a:bodyPr vert="horz" lIns="91440" tIns="45720" rIns="91440" bIns="45720" rtlCol="0" anchor="b"/>
+          <a:lstStyle>
+            <a:lvl1pPr algn="r">
+              <a:defRPr sz="1200"/>
+            </a:lvl1pPr>
+          </a:lstStyle>
+          <a:p>
+            <a:fld id="{45BF070E-29B1-426F-AD8F-F5981CDB40BD}" type="slidenum">
+              <a:rPr lang="en-US" smtClean="0"/>
+              <a:t>‹#›</a:t>
+            </a:fld>
+            <a:endParaRPr lang="en-US"/>
+          </a:p>
+        </p:txBody>
+      </p:sp>
+    </p:spTree>
+    <p:extLst>
+      <p:ext uri="{BB962C8B-B14F-4D97-AF65-F5344CB8AC3E}">
+        <p14:creationId xmlns:p14="http://schemas.microsoft.com/office/powerpoint/2010/main" val="4271196625"/>
+      </p:ext>
+    </p:extLst>
+  </p:cSld>
+  <p:clrMap bg1="lt1" tx1="dk1" bg2="lt2" tx2="dk2" accent1="accent1" accent2="accent2" accent3="accent3" accent4="accent4" accent5="accent5" accent6="accent6" hlink="hlink" folHlink="folHlink"/>
+  <p:notesStyle>
+    <a:lvl1pPr marL="0" algn="l" defTabSz="914400" rtl="0" eaLnBrk="1" latinLnBrk="0" hangingPunct="1">
+      <a:defRPr sz="1200" kern="1200">
+        <a:solidFill>
+          <a:schemeClr val="tx1"/>
+        </a:solidFill>
+        <a:latin typeface="+mn-lt"/>
+        <a:ea typeface="+mn-ea"/>
+        <a:cs typeface="+mn-cs"/>
+      </a:defRPr>
+    </a:lvl1pPr>
+    <a:lvl2pPr marL="457200" algn="l" defTabSz="914400" rtl="0" eaLnBrk="1" latinLnBrk="0" hangingPunct="1">
+      <a:defRPr sz="1200" kern="1200">
+        <a:solidFill>
+          <a:schemeClr val="tx1"/>
+        </a:solidFill>
+        <a:latin typeface="+mn-lt"/>
+        <a:ea typeface="+mn-ea"/>
+        <a:cs typeface="+mn-cs"/>
+      </a:defRPr>
+    </a:lvl2pPr>
+    <a:lvl3pPr marL="914400" algn="l" defTabSz="914400" rtl="0" eaLnBrk="1" latinLnBrk="0" hangingPunct="1">
+      <a:defRPr sz="1200" kern="1200">
+        <a:solidFill>
+          <a:schemeClr val="tx1"/>
+        </a:solidFill>
+        <a:latin typeface="+mn-lt"/>
+        <a:ea typeface="+mn-ea"/>
+        <a:cs typeface="+mn-cs"/>
+      </a:defRPr>
+    </a:lvl3pPr>
+    <a:lvl4pPr marL="1371600" algn="l" defTabSz="914400" rtl="0" eaLnBrk="1" latinLnBrk="0" hangingPunct="1">
+      <a:defRPr sz="1200" kern="1200">
+        <a:solidFill>
+          <a:schemeClr val="tx1"/>
+        </a:solidFill>
+        <a:latin typeface="+mn-lt"/>
+        <a:ea typeface="+mn-ea"/>
+        <a:cs typeface="+mn-cs"/>
+      </a:defRPr>
+    </a:lvl4pPr>
+    <a:lvl5pPr marL="1828800" algn="l" defTabSz="914400" rtl="0" eaLnBrk="1" latinLnBrk="0" hangingPunct="1">
+      <a:defRPr sz="1200" kern="1200">
+        <a:solidFill>
+          <a:schemeClr val="tx1"/>
+        </a:solidFill>
+        <a:latin typeface="+mn-lt"/>
+        <a:ea typeface="+mn-ea"/>
+        <a:cs typeface="+mn-cs"/>
+      </a:defRPr>
+    </a:lvl5pPr>
+    <a:lvl6pPr marL="2286000" algn="l" defTabSz="914400" rtl="0" eaLnBrk="1" latinLnBrk="0" hangingPunct="1">
+      <a:defRPr sz="1200" kern="1200">
+        <a:solidFill>
+          <a:schemeClr val="tx1"/>
+        </a:solidFill>
+        <a:latin typeface="+mn-lt"/>
+        <a:ea typeface="+mn-ea"/>
+        <a:cs typeface="+mn-cs"/>
+      </a:defRPr>
+    </a:lvl6pPr>
+    <a:lvl7pPr marL="2743200" algn="l" defTabSz="914400" rtl="0" eaLnBrk="1" latinLnBrk="0" hangingPunct="1">
+      <a:defRPr sz="1200" kern="1200">
+        <a:solidFill>
+          <a:schemeClr val="tx1"/>
+        </a:solidFill>
+        <a:latin typeface="+mn-lt"/>
+        <a:ea typeface="+mn-ea"/>
+        <a:cs typeface="+mn-cs"/>
+      </a:defRPr>
+    </a:lvl7pPr>
+    <a:lvl8pPr marL="3200400" algn="l" defTabSz="914400" rtl="0" eaLnBrk="1" latinLnBrk="0" hangingPunct="1">
+      <a:defRPr sz="1200" kern="1200">
+        <a:solidFill>
+          <a:schemeClr val="tx1"/>
+        </a:solidFill>
+        <a:latin typeface="+mn-lt"/>
+        <a:ea typeface="+mn-ea"/>
+        <a:cs typeface="+mn-cs"/>
+      </a:defRPr>
+    </a:lvl8pPr>
+    <a:lvl9pPr marL="3657600" algn="l" defTabSz="914400" rtl="0" eaLnBrk="1" latinLnBrk="0" hangingPunct="1">
+      <a:defRPr sz="1200" kern="1200">
+        <a:solidFill>
+          <a:schemeClr val="tx1"/>
+        </a:solidFill>
+        <a:latin typeface="+mn-lt"/>
+        <a:ea typeface="+mn-ea"/>
+        <a:cs typeface="+mn-cs"/>
+      </a:defRPr>
+    </a:lvl9pPr>
+  </p:notesStyle>
+</p:notesMaster>
+</file>
+
+<file path=ppt/notesSlides/notesSlide1.xml><?xml version="1.0" encoding="utf-8"?>
+<p:notes xmlns:a="http://schemas.openxmlformats.org/drawingml/2006/main" xmlns:r="http://schemas.openxmlformats.org/officeDocument/2006/relationships" xmlns:p="http://schemas.openxmlformats.org/presentationml/2006/main">
+  <p:cSld>
+    <p:spTree>
+      <p:nvGrpSpPr>
+        <p:cNvPr id="1" name=""/>
+        <p:cNvGrpSpPr/>
+        <p:nvPr/>
+      </p:nvGrpSpPr>
+      <p:grpSpPr>
+        <a:xfrm>
+          <a:off x="0" y="0"/>
+          <a:ext cx="0" cy="0"/>
+          <a:chOff x="0" y="0"/>
+          <a:chExt cx="0" cy="0"/>
+        </a:xfrm>
+      </p:grpSpPr>
+      <p:sp>
+        <p:nvSpPr>
+          <p:cNvPr id="2" name="Slide Image Placeholder 1"/>
+          <p:cNvSpPr>
+            <a:spLocks noGrp="1" noRot="1" noChangeAspect="1"/>
+          </p:cNvSpPr>
+          <p:nvPr>
+            <p:ph type="sldImg"/>
+          </p:nvPr>
+        </p:nvSpPr>
+        <p:spPr/>
+      </p:sp>
+      <p:sp>
+        <p:nvSpPr>
+          <p:cNvPr id="3" name="Notes Placeholder 2"/>
+          <p:cNvSpPr>
+            <a:spLocks noGrp="1"/>
+          </p:cNvSpPr>
+          <p:nvPr>
+            <p:ph type="body" idx="1"/>
+          </p:nvPr>
+        </p:nvSpPr>
+        <p:spPr/>
+        <p:txBody>
+          <a:bodyPr/>
+          <a:lstStyle/>
+          <a:p>
+            <a:r>
+              <a:rPr lang="en-US" dirty="0"/>
+              <a:t>4 and 4.5 under the same </a:t>
+            </a:r>
+            <a:r>
+              <a:rPr lang="en-US" dirty="0" err="1"/>
+              <a:t>colour</a:t>
+            </a:r>
+            <a:endParaRPr lang="en-US" dirty="0"/>
+          </a:p>
+          <a:p>
+            <a:r>
+              <a:rPr lang="en-US" dirty="0"/>
+              <a:t>Each rating has a </a:t>
+            </a:r>
+            <a:r>
+              <a:rPr lang="en-US" dirty="0" err="1"/>
+              <a:t>colour</a:t>
+            </a:r>
+            <a:endParaRPr lang="en-US" dirty="0"/>
+          </a:p>
+        </p:txBody>
+      </p:sp>
+      <p:sp>
+        <p:nvSpPr>
+          <p:cNvPr id="4" name="Slide Number Placeholder 3"/>
+          <p:cNvSpPr>
+            <a:spLocks noGrp="1"/>
+          </p:cNvSpPr>
+          <p:nvPr>
+            <p:ph type="sldNum" sz="quarter" idx="5"/>
+          </p:nvPr>
+        </p:nvSpPr>
+        <p:spPr/>
+        <p:txBody>
+          <a:bodyPr/>
+          <a:lstStyle/>
+          <a:p>
+            <a:fld id="{45BF070E-29B1-426F-AD8F-F5981CDB40BD}" type="slidenum">
+              <a:rPr lang="en-US" smtClean="0"/>
+              <a:t>6</a:t>
+            </a:fld>
+            <a:endParaRPr lang="en-US"/>
+          </a:p>
+        </p:txBody>
+      </p:sp>
+    </p:spTree>
+    <p:extLst>
+      <p:ext uri="{BB962C8B-B14F-4D97-AF65-F5344CB8AC3E}">
+        <p14:creationId xmlns:p14="http://schemas.microsoft.com/office/powerpoint/2010/main" val="2130182050"/>
+      </p:ext>
+    </p:extLst>
+  </p:cSld>
+  <p:clrMapOvr>
+    <a:masterClrMapping/>
+  </p:clrMapOvr>
+</p:notes>
 </file>
 
 <file path=ppt/slideLayouts/slideLayout1.xml><?xml version="1.0" encoding="utf-8"?>
@@ -3436,6 +3891,129 @@
           <a:chExt cx="0" cy="0"/>
         </a:xfrm>
       </p:grpSpPr>
+      <p:sp useBgFill="1">
+        <p:nvSpPr>
+          <p:cNvPr id="16" name="Rectangle 15">
+            <a:extLst>
+              <a:ext uri="{FF2B5EF4-FFF2-40B4-BE49-F238E27FC236}">
+                <a16:creationId xmlns:a16="http://schemas.microsoft.com/office/drawing/2014/main" id="{54A6836E-C603-43CB-9DA7-89D8E3FA3838}"/>
+              </a:ext>
+              <a:ext uri="{C183D7F6-B498-43B3-948B-1728B52AA6E4}">
+                <adec:decorative xmlns:adec="http://schemas.microsoft.com/office/drawing/2017/decorative" val="1"/>
+              </a:ext>
+            </a:extLst>
+          </p:cNvPr>
+          <p:cNvSpPr>
+            <a:spLocks noGrp="1" noRot="1" noChangeAspect="1" noMove="1" noResize="1" noEditPoints="1" noAdjustHandles="1" noChangeArrowheads="1" noChangeShapeType="1" noTextEdit="1"/>
+          </p:cNvSpPr>
+          <p:nvPr>
+            <p:extLst>
+              <p:ext uri="{386F3935-93C4-4BCD-93E2-E3B085C9AB24}">
+                <p16:designElem xmlns:p16="http://schemas.microsoft.com/office/powerpoint/2015/main" val="1"/>
+              </p:ext>
+            </p:extLst>
+          </p:nvPr>
+        </p:nvSpPr>
+        <p:spPr>
+          <a:xfrm>
+            <a:off x="0" y="1"/>
+            <a:ext cx="12191695" cy="6858000"/>
+          </a:xfrm>
+          <a:prstGeom prst="rect">
+            <a:avLst/>
+          </a:prstGeom>
+          <a:ln>
+            <a:noFill/>
+          </a:ln>
+        </p:spPr>
+        <p:style>
+          <a:lnRef idx="2">
+            <a:schemeClr val="accent1">
+              <a:shade val="50000"/>
+            </a:schemeClr>
+          </a:lnRef>
+          <a:fillRef idx="1">
+            <a:schemeClr val="accent1"/>
+          </a:fillRef>
+          <a:effectRef idx="0">
+            <a:schemeClr val="accent1"/>
+          </a:effectRef>
+          <a:fontRef idx="minor">
+            <a:schemeClr val="lt1"/>
+          </a:fontRef>
+        </p:style>
+        <p:txBody>
+          <a:bodyPr rtlCol="0" anchor="ctr"/>
+          <a:lstStyle/>
+          <a:p>
+            <a:pPr algn="ctr"/>
+            <a:endParaRPr lang="en-US"/>
+          </a:p>
+        </p:txBody>
+      </p:sp>
+      <p:sp>
+        <p:nvSpPr>
+          <p:cNvPr id="22" name="Rectangle 21">
+            <a:extLst>
+              <a:ext uri="{FF2B5EF4-FFF2-40B4-BE49-F238E27FC236}">
+                <a16:creationId xmlns:a16="http://schemas.microsoft.com/office/drawing/2014/main" id="{296007DD-F9BF-4F0F-B8C6-C514B2841971}"/>
+              </a:ext>
+              <a:ext uri="{C183D7F6-B498-43B3-948B-1728B52AA6E4}">
+                <adec:decorative xmlns:adec="http://schemas.microsoft.com/office/drawing/2017/decorative" val="1"/>
+              </a:ext>
+            </a:extLst>
+          </p:cNvPr>
+          <p:cNvSpPr>
+            <a:spLocks noGrp="1" noRot="1" noChangeAspect="1" noMove="1" noResize="1" noEditPoints="1" noAdjustHandles="1" noChangeArrowheads="1" noChangeShapeType="1" noTextEdit="1"/>
+          </p:cNvSpPr>
+          <p:nvPr>
+            <p:extLst>
+              <p:ext uri="{386F3935-93C4-4BCD-93E2-E3B085C9AB24}">
+                <p16:designElem xmlns:p16="http://schemas.microsoft.com/office/powerpoint/2015/main" val="1"/>
+              </p:ext>
+            </p:extLst>
+          </p:nvPr>
+        </p:nvSpPr>
+        <p:spPr>
+          <a:xfrm>
+            <a:off x="305" y="0"/>
+            <a:ext cx="12191695" cy="6858000"/>
+          </a:xfrm>
+          <a:prstGeom prst="rect">
+            <a:avLst/>
+          </a:prstGeom>
+          <a:solidFill>
+            <a:schemeClr val="bg1"/>
+          </a:solidFill>
+          <a:ln>
+            <a:noFill/>
+          </a:ln>
+        </p:spPr>
+        <p:style>
+          <a:lnRef idx="2">
+            <a:schemeClr val="accent1">
+              <a:shade val="50000"/>
+            </a:schemeClr>
+          </a:lnRef>
+          <a:fillRef idx="1">
+            <a:schemeClr val="accent1"/>
+          </a:fillRef>
+          <a:effectRef idx="0">
+            <a:schemeClr val="accent1"/>
+          </a:effectRef>
+          <a:fontRef idx="minor">
+            <a:schemeClr val="lt1"/>
+          </a:fontRef>
+        </p:style>
+        <p:txBody>
+          <a:bodyPr rtlCol="0" anchor="ctr"/>
+          <a:lstStyle/>
+          <a:p>
+            <a:pPr algn="ctr"/>
+            <a:endParaRPr lang="en-US" sz="800"/>
+          </a:p>
+        </p:txBody>
+      </p:sp>
       <p:sp>
         <p:nvSpPr>
           <p:cNvPr id="2" name="Title 1">
@@ -3454,8 +4032,8 @@
         </p:nvSpPr>
         <p:spPr>
           <a:xfrm>
-            <a:off x="3215729" y="1764407"/>
-            <a:ext cx="5760846" cy="2310312"/>
+            <a:off x="753925" y="1321056"/>
+            <a:ext cx="10684151" cy="1991979"/>
           </a:xfrm>
         </p:spPr>
         <p:txBody>
@@ -3479,6 +4057,3141 @@
           </a:p>
         </p:txBody>
       </p:sp>
+      <p:grpSp>
+        <p:nvGrpSpPr>
+          <p:cNvPr id="24" name="Group 23">
+            <a:extLst>
+              <a:ext uri="{FF2B5EF4-FFF2-40B4-BE49-F238E27FC236}">
+                <a16:creationId xmlns:a16="http://schemas.microsoft.com/office/drawing/2014/main" id="{8A0FAFCA-5C96-453B-83B7-A9AEF7F18960}"/>
+              </a:ext>
+              <a:ext uri="{C183D7F6-B498-43B3-948B-1728B52AA6E4}">
+                <adec:decorative xmlns:adec="http://schemas.microsoft.com/office/drawing/2017/decorative" val="1"/>
+              </a:ext>
+            </a:extLst>
+          </p:cNvPr>
+          <p:cNvGrpSpPr>
+            <a:grpSpLocks noGrp="1" noUngrp="1" noRot="1" noChangeAspect="1" noMove="1" noResize="1"/>
+          </p:cNvGrpSpPr>
+          <p:nvPr>
+            <p:extLst>
+              <p:ext uri="{386F3935-93C4-4BCD-93E2-E3B085C9AB24}">
+                <p16:designElem xmlns:p16="http://schemas.microsoft.com/office/powerpoint/2015/main" val="1"/>
+              </p:ext>
+            </p:extLst>
+          </p:nvPr>
+        </p:nvGrpSpPr>
+        <p:grpSpPr>
+          <a:xfrm>
+            <a:off x="7867135" y="0"/>
+            <a:ext cx="4324865" cy="2641149"/>
+            <a:chOff x="6867015" y="-1"/>
+            <a:chExt cx="5324985" cy="3251912"/>
+          </a:xfrm>
+          <a:solidFill>
+            <a:schemeClr val="accent5">
+              <a:alpha val="10000"/>
+            </a:schemeClr>
+          </a:solidFill>
+        </p:grpSpPr>
+        <p:sp>
+          <p:nvSpPr>
+            <p:cNvPr id="25" name="Freeform: Shape 24">
+              <a:extLst>
+                <a:ext uri="{FF2B5EF4-FFF2-40B4-BE49-F238E27FC236}">
+                  <a16:creationId xmlns:a16="http://schemas.microsoft.com/office/drawing/2014/main" id="{4A0F84AE-A24D-4353-B1BA-BD80DAA385F1}"/>
+                </a:ext>
+                <a:ext uri="{C183D7F6-B498-43B3-948B-1728B52AA6E4}">
+                  <adec:decorative xmlns:adec="http://schemas.microsoft.com/office/drawing/2017/decorative" val="1"/>
+                </a:ext>
+              </a:extLst>
+            </p:cNvPr>
+            <p:cNvSpPr/>
+            <p:nvPr>
+              <p:extLst>
+                <p:ext uri="{386F3935-93C4-4BCD-93E2-E3B085C9AB24}">
+                  <p16:designElem xmlns:p16="http://schemas.microsoft.com/office/powerpoint/2015/main" val="1"/>
+                </p:ext>
+              </p:extLst>
+            </p:nvPr>
+          </p:nvSpPr>
+          <p:spPr>
+            <a:xfrm>
+              <a:off x="6867015" y="-1"/>
+              <a:ext cx="5324985" cy="3251912"/>
+            </a:xfrm>
+            <a:custGeom>
+              <a:avLst/>
+              <a:gdLst>
+                <a:gd name="connsiteX0" fmla="*/ 0 w 5324985"/>
+                <a:gd name="connsiteY0" fmla="*/ 0 h 3251912"/>
+                <a:gd name="connsiteX1" fmla="*/ 36826 w 5324985"/>
+                <a:gd name="connsiteY1" fmla="*/ 0 h 3251912"/>
+                <a:gd name="connsiteX2" fmla="*/ 45003 w 5324985"/>
+                <a:gd name="connsiteY2" fmla="*/ 152909 h 3251912"/>
+                <a:gd name="connsiteX3" fmla="*/ 68956 w 5324985"/>
+                <a:gd name="connsiteY3" fmla="*/ 308600 h 3251912"/>
+                <a:gd name="connsiteX4" fmla="*/ 167774 w 5324985"/>
+                <a:gd name="connsiteY4" fmla="*/ 607968 h 3251912"/>
+                <a:gd name="connsiteX5" fmla="*/ 201857 w 5324985"/>
+                <a:gd name="connsiteY5" fmla="*/ 679539 h 3251912"/>
+                <a:gd name="connsiteX6" fmla="*/ 239741 w 5324985"/>
+                <a:gd name="connsiteY6" fmla="*/ 749488 h 3251912"/>
+                <a:gd name="connsiteX7" fmla="*/ 323724 w 5324985"/>
+                <a:gd name="connsiteY7" fmla="*/ 885101 h 3251912"/>
+                <a:gd name="connsiteX8" fmla="*/ 416412 w 5324985"/>
+                <a:gd name="connsiteY8" fmla="*/ 1016081 h 3251912"/>
+                <a:gd name="connsiteX9" fmla="*/ 515719 w 5324985"/>
+                <a:gd name="connsiteY9" fmla="*/ 1143356 h 3251912"/>
+                <a:gd name="connsiteX10" fmla="*/ 722427 w 5324985"/>
+                <a:gd name="connsiteY10" fmla="*/ 1395127 h 3251912"/>
+                <a:gd name="connsiteX11" fmla="*/ 825780 w 5324985"/>
+                <a:gd name="connsiteY11" fmla="*/ 1522749 h 3251912"/>
+                <a:gd name="connsiteX12" fmla="*/ 926314 w 5324985"/>
+                <a:gd name="connsiteY12" fmla="*/ 1651992 h 3251912"/>
+                <a:gd name="connsiteX13" fmla="*/ 1026848 w 5324985"/>
+                <a:gd name="connsiteY13" fmla="*/ 1776836 h 3251912"/>
+                <a:gd name="connsiteX14" fmla="*/ 1131918 w 5324985"/>
+                <a:gd name="connsiteY14" fmla="*/ 1897393 h 3251912"/>
+                <a:gd name="connsiteX15" fmla="*/ 1354688 w 5324985"/>
+                <a:gd name="connsiteY15" fmla="*/ 2124728 h 3251912"/>
+                <a:gd name="connsiteX16" fmla="*/ 1855027 w 5324985"/>
+                <a:gd name="connsiteY16" fmla="*/ 2504236 h 3251912"/>
+                <a:gd name="connsiteX17" fmla="*/ 2131618 w 5324985"/>
+                <a:gd name="connsiteY17" fmla="*/ 2646913 h 3251912"/>
+                <a:gd name="connsiteX18" fmla="*/ 2423534 w 5324985"/>
+                <a:gd name="connsiteY18" fmla="*/ 2754732 h 3251912"/>
+                <a:gd name="connsiteX19" fmla="*/ 2727588 w 5324985"/>
+                <a:gd name="connsiteY19" fmla="*/ 2829197 h 3251912"/>
+                <a:gd name="connsiteX20" fmla="*/ 3041083 w 5324985"/>
+                <a:gd name="connsiteY20" fmla="*/ 2870890 h 3251912"/>
+                <a:gd name="connsiteX21" fmla="*/ 3360340 w 5324985"/>
+                <a:gd name="connsiteY21" fmla="*/ 2883976 h 3251912"/>
+                <a:gd name="connsiteX22" fmla="*/ 3439663 w 5324985"/>
+                <a:gd name="connsiteY22" fmla="*/ 2883396 h 3251912"/>
+                <a:gd name="connsiteX23" fmla="*/ 3478529 w 5324985"/>
+                <a:gd name="connsiteY23" fmla="*/ 2882471 h 3251912"/>
+                <a:gd name="connsiteX24" fmla="*/ 3517271 w 5324985"/>
+                <a:gd name="connsiteY24" fmla="*/ 2880616 h 3251912"/>
+                <a:gd name="connsiteX25" fmla="*/ 3671260 w 5324985"/>
+                <a:gd name="connsiteY25" fmla="*/ 2867878 h 3251912"/>
+                <a:gd name="connsiteX26" fmla="*/ 4265268 w 5324985"/>
+                <a:gd name="connsiteY26" fmla="*/ 2716283 h 3251912"/>
+                <a:gd name="connsiteX27" fmla="*/ 4546395 w 5324985"/>
+                <a:gd name="connsiteY27" fmla="*/ 2584724 h 3251912"/>
+                <a:gd name="connsiteX28" fmla="*/ 4817837 w 5324985"/>
+                <a:gd name="connsiteY28" fmla="*/ 2424674 h 3251912"/>
+                <a:gd name="connsiteX29" fmla="*/ 5081677 w 5324985"/>
+                <a:gd name="connsiteY29" fmla="*/ 2243548 h 3251912"/>
+                <a:gd name="connsiteX30" fmla="*/ 5211881 w 5324985"/>
+                <a:gd name="connsiteY30" fmla="*/ 2147658 h 3251912"/>
+                <a:gd name="connsiteX31" fmla="*/ 5324985 w 5324985"/>
+                <a:gd name="connsiteY31" fmla="*/ 2062128 h 3251912"/>
+                <a:gd name="connsiteX32" fmla="*/ 5324985 w 5324985"/>
+                <a:gd name="connsiteY32" fmla="*/ 2514993 h 3251912"/>
+                <a:gd name="connsiteX33" fmla="*/ 5314867 w 5324985"/>
+                <a:gd name="connsiteY33" fmla="*/ 2522881 h 3251912"/>
+                <a:gd name="connsiteX34" fmla="*/ 5038276 w 5324985"/>
+                <a:gd name="connsiteY34" fmla="*/ 2722421 h 3251912"/>
+                <a:gd name="connsiteX35" fmla="*/ 4741701 w 5324985"/>
+                <a:gd name="connsiteY35" fmla="*/ 2904937 h 3251912"/>
+                <a:gd name="connsiteX36" fmla="*/ 4420728 w 5324985"/>
+                <a:gd name="connsiteY36" fmla="*/ 3058848 h 3251912"/>
+                <a:gd name="connsiteX37" fmla="*/ 3717481 w 5324985"/>
+                <a:gd name="connsiteY37" fmla="*/ 3237079 h 3251912"/>
+                <a:gd name="connsiteX38" fmla="*/ 3535661 w 5324985"/>
+                <a:gd name="connsiteY38" fmla="*/ 3249934 h 3251912"/>
+                <a:gd name="connsiteX39" fmla="*/ 3490175 w 5324985"/>
+                <a:gd name="connsiteY39" fmla="*/ 3251555 h 3251912"/>
+                <a:gd name="connsiteX40" fmla="*/ 3444813 w 5324985"/>
+                <a:gd name="connsiteY40" fmla="*/ 3251787 h 3251912"/>
+                <a:gd name="connsiteX41" fmla="*/ 3355681 w 5324985"/>
+                <a:gd name="connsiteY41" fmla="*/ 3250745 h 3251912"/>
+                <a:gd name="connsiteX42" fmla="*/ 3179011 w 5324985"/>
+                <a:gd name="connsiteY42" fmla="*/ 3243795 h 3251912"/>
+                <a:gd name="connsiteX43" fmla="*/ 3002217 w 5324985"/>
+                <a:gd name="connsiteY43" fmla="*/ 3227814 h 3251912"/>
+                <a:gd name="connsiteX44" fmla="*/ 2650103 w 5324985"/>
+                <a:gd name="connsiteY44" fmla="*/ 3170836 h 3251912"/>
+                <a:gd name="connsiteX45" fmla="*/ 2305836 w 5324985"/>
+                <a:gd name="connsiteY45" fmla="*/ 3072514 h 3251912"/>
+                <a:gd name="connsiteX46" fmla="*/ 1978611 w 5324985"/>
+                <a:gd name="connsiteY46" fmla="*/ 2929952 h 3251912"/>
+                <a:gd name="connsiteX47" fmla="*/ 1678235 w 5324985"/>
+                <a:gd name="connsiteY47" fmla="*/ 2744424 h 3251912"/>
+                <a:gd name="connsiteX48" fmla="*/ 1175688 w 5324985"/>
+                <a:gd name="connsiteY48" fmla="*/ 2277018 h 3251912"/>
+                <a:gd name="connsiteX49" fmla="*/ 971310 w 5324985"/>
+                <a:gd name="connsiteY49" fmla="*/ 2012044 h 3251912"/>
+                <a:gd name="connsiteX50" fmla="*/ 790717 w 5324985"/>
+                <a:gd name="connsiteY50" fmla="*/ 1735723 h 3251912"/>
+                <a:gd name="connsiteX51" fmla="*/ 706488 w 5324985"/>
+                <a:gd name="connsiteY51" fmla="*/ 1598604 h 3251912"/>
+                <a:gd name="connsiteX52" fmla="*/ 618951 w 5324985"/>
+                <a:gd name="connsiteY52" fmla="*/ 1463802 h 3251912"/>
+                <a:gd name="connsiteX53" fmla="*/ 436273 w 5324985"/>
+                <a:gd name="connsiteY53" fmla="*/ 1195355 h 3251912"/>
+                <a:gd name="connsiteX54" fmla="*/ 346896 w 5324985"/>
+                <a:gd name="connsiteY54" fmla="*/ 1058816 h 3251912"/>
+                <a:gd name="connsiteX55" fmla="*/ 261809 w 5324985"/>
+                <a:gd name="connsiteY55" fmla="*/ 919264 h 3251912"/>
+                <a:gd name="connsiteX56" fmla="*/ 118487 w 5324985"/>
+                <a:gd name="connsiteY56" fmla="*/ 626498 h 3251912"/>
+                <a:gd name="connsiteX57" fmla="*/ 28130 w 5324985"/>
+                <a:gd name="connsiteY57" fmla="*/ 315781 h 3251912"/>
+                <a:gd name="connsiteX58" fmla="*/ 6751 w 5324985"/>
+                <a:gd name="connsiteY58" fmla="*/ 156195 h 3251912"/>
+              </a:gdLst>
+              <a:ahLst/>
+              <a:cxnLst>
+                <a:cxn ang="0">
+                  <a:pos x="connsiteX0" y="connsiteY0"/>
+                </a:cxn>
+                <a:cxn ang="0">
+                  <a:pos x="connsiteX1" y="connsiteY1"/>
+                </a:cxn>
+                <a:cxn ang="0">
+                  <a:pos x="connsiteX2" y="connsiteY2"/>
+                </a:cxn>
+                <a:cxn ang="0">
+                  <a:pos x="connsiteX3" y="connsiteY3"/>
+                </a:cxn>
+                <a:cxn ang="0">
+                  <a:pos x="connsiteX4" y="connsiteY4"/>
+                </a:cxn>
+                <a:cxn ang="0">
+                  <a:pos x="connsiteX5" y="connsiteY5"/>
+                </a:cxn>
+                <a:cxn ang="0">
+                  <a:pos x="connsiteX6" y="connsiteY6"/>
+                </a:cxn>
+                <a:cxn ang="0">
+                  <a:pos x="connsiteX7" y="connsiteY7"/>
+                </a:cxn>
+                <a:cxn ang="0">
+                  <a:pos x="connsiteX8" y="connsiteY8"/>
+                </a:cxn>
+                <a:cxn ang="0">
+                  <a:pos x="connsiteX9" y="connsiteY9"/>
+                </a:cxn>
+                <a:cxn ang="0">
+                  <a:pos x="connsiteX10" y="connsiteY10"/>
+                </a:cxn>
+                <a:cxn ang="0">
+                  <a:pos x="connsiteX11" y="connsiteY11"/>
+                </a:cxn>
+                <a:cxn ang="0">
+                  <a:pos x="connsiteX12" y="connsiteY12"/>
+                </a:cxn>
+                <a:cxn ang="0">
+                  <a:pos x="connsiteX13" y="connsiteY13"/>
+                </a:cxn>
+                <a:cxn ang="0">
+                  <a:pos x="connsiteX14" y="connsiteY14"/>
+                </a:cxn>
+                <a:cxn ang="0">
+                  <a:pos x="connsiteX15" y="connsiteY15"/>
+                </a:cxn>
+                <a:cxn ang="0">
+                  <a:pos x="connsiteX16" y="connsiteY16"/>
+                </a:cxn>
+                <a:cxn ang="0">
+                  <a:pos x="connsiteX17" y="connsiteY17"/>
+                </a:cxn>
+                <a:cxn ang="0">
+                  <a:pos x="connsiteX18" y="connsiteY18"/>
+                </a:cxn>
+                <a:cxn ang="0">
+                  <a:pos x="connsiteX19" y="connsiteY19"/>
+                </a:cxn>
+                <a:cxn ang="0">
+                  <a:pos x="connsiteX20" y="connsiteY20"/>
+                </a:cxn>
+                <a:cxn ang="0">
+                  <a:pos x="connsiteX21" y="connsiteY21"/>
+                </a:cxn>
+                <a:cxn ang="0">
+                  <a:pos x="connsiteX22" y="connsiteY22"/>
+                </a:cxn>
+                <a:cxn ang="0">
+                  <a:pos x="connsiteX23" y="connsiteY23"/>
+                </a:cxn>
+                <a:cxn ang="0">
+                  <a:pos x="connsiteX24" y="connsiteY24"/>
+                </a:cxn>
+                <a:cxn ang="0">
+                  <a:pos x="connsiteX25" y="connsiteY25"/>
+                </a:cxn>
+                <a:cxn ang="0">
+                  <a:pos x="connsiteX26" y="connsiteY26"/>
+                </a:cxn>
+                <a:cxn ang="0">
+                  <a:pos x="connsiteX27" y="connsiteY27"/>
+                </a:cxn>
+                <a:cxn ang="0">
+                  <a:pos x="connsiteX28" y="connsiteY28"/>
+                </a:cxn>
+                <a:cxn ang="0">
+                  <a:pos x="connsiteX29" y="connsiteY29"/>
+                </a:cxn>
+                <a:cxn ang="0">
+                  <a:pos x="connsiteX30" y="connsiteY30"/>
+                </a:cxn>
+                <a:cxn ang="0">
+                  <a:pos x="connsiteX31" y="connsiteY31"/>
+                </a:cxn>
+                <a:cxn ang="0">
+                  <a:pos x="connsiteX32" y="connsiteY32"/>
+                </a:cxn>
+                <a:cxn ang="0">
+                  <a:pos x="connsiteX33" y="connsiteY33"/>
+                </a:cxn>
+                <a:cxn ang="0">
+                  <a:pos x="connsiteX34" y="connsiteY34"/>
+                </a:cxn>
+                <a:cxn ang="0">
+                  <a:pos x="connsiteX35" y="connsiteY35"/>
+                </a:cxn>
+                <a:cxn ang="0">
+                  <a:pos x="connsiteX36" y="connsiteY36"/>
+                </a:cxn>
+                <a:cxn ang="0">
+                  <a:pos x="connsiteX37" y="connsiteY37"/>
+                </a:cxn>
+                <a:cxn ang="0">
+                  <a:pos x="connsiteX38" y="connsiteY38"/>
+                </a:cxn>
+                <a:cxn ang="0">
+                  <a:pos x="connsiteX39" y="connsiteY39"/>
+                </a:cxn>
+                <a:cxn ang="0">
+                  <a:pos x="connsiteX40" y="connsiteY40"/>
+                </a:cxn>
+                <a:cxn ang="0">
+                  <a:pos x="connsiteX41" y="connsiteY41"/>
+                </a:cxn>
+                <a:cxn ang="0">
+                  <a:pos x="connsiteX42" y="connsiteY42"/>
+                </a:cxn>
+                <a:cxn ang="0">
+                  <a:pos x="connsiteX43" y="connsiteY43"/>
+                </a:cxn>
+                <a:cxn ang="0">
+                  <a:pos x="connsiteX44" y="connsiteY44"/>
+                </a:cxn>
+                <a:cxn ang="0">
+                  <a:pos x="connsiteX45" y="connsiteY45"/>
+                </a:cxn>
+                <a:cxn ang="0">
+                  <a:pos x="connsiteX46" y="connsiteY46"/>
+                </a:cxn>
+                <a:cxn ang="0">
+                  <a:pos x="connsiteX47" y="connsiteY47"/>
+                </a:cxn>
+                <a:cxn ang="0">
+                  <a:pos x="connsiteX48" y="connsiteY48"/>
+                </a:cxn>
+                <a:cxn ang="0">
+                  <a:pos x="connsiteX49" y="connsiteY49"/>
+                </a:cxn>
+                <a:cxn ang="0">
+                  <a:pos x="connsiteX50" y="connsiteY50"/>
+                </a:cxn>
+                <a:cxn ang="0">
+                  <a:pos x="connsiteX51" y="connsiteY51"/>
+                </a:cxn>
+                <a:cxn ang="0">
+                  <a:pos x="connsiteX52" y="connsiteY52"/>
+                </a:cxn>
+                <a:cxn ang="0">
+                  <a:pos x="connsiteX53" y="connsiteY53"/>
+                </a:cxn>
+                <a:cxn ang="0">
+                  <a:pos x="connsiteX54" y="connsiteY54"/>
+                </a:cxn>
+                <a:cxn ang="0">
+                  <a:pos x="connsiteX55" y="connsiteY55"/>
+                </a:cxn>
+                <a:cxn ang="0">
+                  <a:pos x="connsiteX56" y="connsiteY56"/>
+                </a:cxn>
+                <a:cxn ang="0">
+                  <a:pos x="connsiteX57" y="connsiteY57"/>
+                </a:cxn>
+                <a:cxn ang="0">
+                  <a:pos x="connsiteX58" y="connsiteY58"/>
+                </a:cxn>
+              </a:cxnLst>
+              <a:rect l="l" t="t" r="r" b="b"/>
+              <a:pathLst>
+                <a:path w="5324985" h="3251912">
+                  <a:moveTo>
+                    <a:pt x="0" y="0"/>
+                  </a:moveTo>
+                  <a:lnTo>
+                    <a:pt x="36826" y="0"/>
+                  </a:lnTo>
+                  <a:lnTo>
+                    <a:pt x="45003" y="152909"/>
+                  </a:lnTo>
+                  <a:cubicBezTo>
+                    <a:pt x="50351" y="205154"/>
+                    <a:pt x="58290" y="257123"/>
+                    <a:pt x="68956" y="308600"/>
+                  </a:cubicBezTo>
+                  <a:cubicBezTo>
+                    <a:pt x="91393" y="411324"/>
+                    <a:pt x="123882" y="511847"/>
+                    <a:pt x="167774" y="607968"/>
+                  </a:cubicBezTo>
+                  <a:cubicBezTo>
+                    <a:pt x="178195" y="632173"/>
+                    <a:pt x="190333" y="655798"/>
+                    <a:pt x="201857" y="679539"/>
+                  </a:cubicBezTo>
+                  <a:cubicBezTo>
+                    <a:pt x="214363" y="702933"/>
+                    <a:pt x="226255" y="726557"/>
+                    <a:pt x="239741" y="749488"/>
+                  </a:cubicBezTo>
+                  <a:cubicBezTo>
+                    <a:pt x="265488" y="795812"/>
+                    <a:pt x="294176" y="840746"/>
+                    <a:pt x="323724" y="885101"/>
+                  </a:cubicBezTo>
+                  <a:cubicBezTo>
+                    <a:pt x="353149" y="929572"/>
+                    <a:pt x="384657" y="972885"/>
+                    <a:pt x="416412" y="1016081"/>
+                  </a:cubicBezTo>
+                  <a:cubicBezTo>
+                    <a:pt x="448655" y="1058931"/>
+                    <a:pt x="482127" y="1101202"/>
+                    <a:pt x="515719" y="1143356"/>
+                  </a:cubicBezTo>
+                  <a:cubicBezTo>
+                    <a:pt x="583027" y="1227782"/>
+                    <a:pt x="653402" y="1310470"/>
+                    <a:pt x="722427" y="1395127"/>
+                  </a:cubicBezTo>
+                  <a:cubicBezTo>
+                    <a:pt x="757123" y="1437282"/>
+                    <a:pt x="791697" y="1479783"/>
+                    <a:pt x="825780" y="1522749"/>
+                  </a:cubicBezTo>
+                  <a:cubicBezTo>
+                    <a:pt x="859742" y="1565367"/>
+                    <a:pt x="893457" y="1610649"/>
+                    <a:pt x="926314" y="1651992"/>
+                  </a:cubicBezTo>
+                  <a:cubicBezTo>
+                    <a:pt x="958927" y="1694379"/>
+                    <a:pt x="993132" y="1735492"/>
+                    <a:pt x="1026848" y="1776836"/>
+                  </a:cubicBezTo>
+                  <a:cubicBezTo>
+                    <a:pt x="1061545" y="1817485"/>
+                    <a:pt x="1095996" y="1858133"/>
+                    <a:pt x="1131918" y="1897393"/>
+                  </a:cubicBezTo>
+                  <a:cubicBezTo>
+                    <a:pt x="1203273" y="1976376"/>
+                    <a:pt x="1277447" y="2052463"/>
+                    <a:pt x="1354688" y="2124728"/>
+                  </a:cubicBezTo>
+                  <a:cubicBezTo>
+                    <a:pt x="1509411" y="2268911"/>
+                    <a:pt x="1676396" y="2397575"/>
+                    <a:pt x="1855027" y="2504236"/>
+                  </a:cubicBezTo>
+                  <a:cubicBezTo>
+                    <a:pt x="1944528" y="2557277"/>
+                    <a:pt x="2036357" y="2605917"/>
+                    <a:pt x="2131618" y="2646913"/>
+                  </a:cubicBezTo>
+                  <a:cubicBezTo>
+                    <a:pt x="2226267" y="2689068"/>
+                    <a:pt x="2323981" y="2724622"/>
+                    <a:pt x="2423534" y="2754732"/>
+                  </a:cubicBezTo>
+                  <a:cubicBezTo>
+                    <a:pt x="2523087" y="2784958"/>
+                    <a:pt x="2624602" y="2809394"/>
+                    <a:pt x="2727588" y="2829197"/>
+                  </a:cubicBezTo>
+                  <a:cubicBezTo>
+                    <a:pt x="2830698" y="2848653"/>
+                    <a:pt x="2935522" y="2861971"/>
+                    <a:pt x="3041083" y="2870890"/>
+                  </a:cubicBezTo>
+                  <a:cubicBezTo>
+                    <a:pt x="3146644" y="2879922"/>
+                    <a:pt x="3253307" y="2883860"/>
+                    <a:pt x="3360340" y="2883976"/>
+                  </a:cubicBezTo>
+                  <a:cubicBezTo>
+                    <a:pt x="3387067" y="2883976"/>
+                    <a:pt x="3414162" y="2884439"/>
+                    <a:pt x="3439663" y="2883396"/>
+                  </a:cubicBezTo>
+                  <a:lnTo>
+                    <a:pt x="3478529" y="2882471"/>
+                  </a:lnTo>
+                  <a:lnTo>
+                    <a:pt x="3517271" y="2880616"/>
+                  </a:lnTo>
+                  <a:cubicBezTo>
+                    <a:pt x="3568887" y="2878417"/>
+                    <a:pt x="3620257" y="2873552"/>
+                    <a:pt x="3671260" y="2867878"/>
+                  </a:cubicBezTo>
+                  <a:cubicBezTo>
+                    <a:pt x="3875515" y="2844253"/>
+                    <a:pt x="4074253" y="2792486"/>
+                    <a:pt x="4265268" y="2716283"/>
+                  </a:cubicBezTo>
+                  <a:cubicBezTo>
+                    <a:pt x="4361020" y="2678529"/>
+                    <a:pt x="4454444" y="2633710"/>
+                    <a:pt x="4546395" y="2584724"/>
+                  </a:cubicBezTo>
+                  <a:cubicBezTo>
+                    <a:pt x="4638470" y="2535967"/>
+                    <a:pt x="4728827" y="2481885"/>
+                    <a:pt x="4817837" y="2424674"/>
+                  </a:cubicBezTo>
+                  <a:cubicBezTo>
+                    <a:pt x="4906846" y="2367348"/>
+                    <a:pt x="4994385" y="2306317"/>
+                    <a:pt x="5081677" y="2243548"/>
+                  </a:cubicBezTo>
+                  <a:cubicBezTo>
+                    <a:pt x="5125201" y="2212164"/>
+                    <a:pt x="5168603" y="2179969"/>
+                    <a:pt x="5211881" y="2147658"/>
+                  </a:cubicBezTo>
+                  <a:lnTo>
+                    <a:pt x="5324985" y="2062128"/>
+                  </a:lnTo>
+                  <a:lnTo>
+                    <a:pt x="5324985" y="2514993"/>
+                  </a:lnTo>
+                  <a:lnTo>
+                    <a:pt x="5314867" y="2522881"/>
+                  </a:lnTo>
+                  <a:cubicBezTo>
+                    <a:pt x="5225490" y="2591325"/>
+                    <a:pt x="5133783" y="2658379"/>
+                    <a:pt x="5038276" y="2722421"/>
+                  </a:cubicBezTo>
+                  <a:cubicBezTo>
+                    <a:pt x="4942892" y="2786348"/>
+                    <a:pt x="4844810" y="2848422"/>
+                    <a:pt x="4741701" y="2904937"/>
+                  </a:cubicBezTo>
+                  <a:cubicBezTo>
+                    <a:pt x="4638592" y="2961337"/>
+                    <a:pt x="4531929" y="3013683"/>
+                    <a:pt x="4420728" y="3058848"/>
+                  </a:cubicBezTo>
+                  <a:cubicBezTo>
+                    <a:pt x="4199063" y="3150338"/>
+                    <a:pt x="3959621" y="3211485"/>
+                    <a:pt x="3717481" y="3237079"/>
+                  </a:cubicBezTo>
+                  <a:cubicBezTo>
+                    <a:pt x="3656914" y="3243101"/>
+                    <a:pt x="3596227" y="3247966"/>
+                    <a:pt x="3535661" y="3249934"/>
+                  </a:cubicBezTo>
+                  <a:lnTo>
+                    <a:pt x="3490175" y="3251555"/>
+                  </a:lnTo>
+                  <a:lnTo>
+                    <a:pt x="3444813" y="3251787"/>
+                  </a:lnTo>
+                  <a:cubicBezTo>
+                    <a:pt x="3414162" y="3252250"/>
+                    <a:pt x="3385105" y="3251324"/>
+                    <a:pt x="3355681" y="3250745"/>
+                  </a:cubicBezTo>
+                  <a:cubicBezTo>
+                    <a:pt x="3296954" y="3250050"/>
+                    <a:pt x="3237860" y="3246692"/>
+                    <a:pt x="3179011" y="3243795"/>
+                  </a:cubicBezTo>
+                  <a:cubicBezTo>
+                    <a:pt x="3120039" y="3239164"/>
+                    <a:pt x="3061067" y="3234878"/>
+                    <a:pt x="3002217" y="3227814"/>
+                  </a:cubicBezTo>
+                  <a:cubicBezTo>
+                    <a:pt x="2884397" y="3214496"/>
+                    <a:pt x="2766699" y="3196314"/>
+                    <a:pt x="2650103" y="3170836"/>
+                  </a:cubicBezTo>
+                  <a:cubicBezTo>
+                    <a:pt x="2533510" y="3145358"/>
+                    <a:pt x="2418263" y="3112583"/>
+                    <a:pt x="2305836" y="3072514"/>
+                  </a:cubicBezTo>
+                  <a:cubicBezTo>
+                    <a:pt x="2193410" y="3032328"/>
+                    <a:pt x="2083926" y="2984383"/>
+                    <a:pt x="1978611" y="2929952"/>
+                  </a:cubicBezTo>
+                  <a:cubicBezTo>
+                    <a:pt x="1873663" y="2874711"/>
+                    <a:pt x="1772884" y="2812985"/>
+                    <a:pt x="1678235" y="2744424"/>
+                  </a:cubicBezTo>
+                  <a:cubicBezTo>
+                    <a:pt x="1488201" y="2608001"/>
+                    <a:pt x="1321708" y="2448068"/>
+                    <a:pt x="1175688" y="2277018"/>
+                  </a:cubicBezTo>
+                  <a:cubicBezTo>
+                    <a:pt x="1102985" y="2191086"/>
+                    <a:pt x="1035309" y="2102377"/>
+                    <a:pt x="971310" y="2012044"/>
+                  </a:cubicBezTo>
+                  <a:cubicBezTo>
+                    <a:pt x="907188" y="1921714"/>
+                    <a:pt x="847358" y="1829413"/>
+                    <a:pt x="790717" y="1735723"/>
+                  </a:cubicBezTo>
+                  <a:cubicBezTo>
+                    <a:pt x="761782" y="1688357"/>
+                    <a:pt x="735300" y="1644002"/>
+                    <a:pt x="706488" y="1598604"/>
+                  </a:cubicBezTo>
+                  <a:cubicBezTo>
+                    <a:pt x="677922" y="1553555"/>
+                    <a:pt x="648866" y="1508505"/>
+                    <a:pt x="618951" y="1463802"/>
+                  </a:cubicBezTo>
+                  <a:lnTo>
+                    <a:pt x="436273" y="1195355"/>
+                  </a:lnTo>
+                  <a:cubicBezTo>
+                    <a:pt x="405990" y="1150189"/>
+                    <a:pt x="376075" y="1104792"/>
+                    <a:pt x="346896" y="1058816"/>
+                  </a:cubicBezTo>
+                  <a:cubicBezTo>
+                    <a:pt x="317716" y="1012838"/>
+                    <a:pt x="288782" y="966747"/>
+                    <a:pt x="261809" y="919264"/>
+                  </a:cubicBezTo>
+                  <a:cubicBezTo>
+                    <a:pt x="207742" y="824764"/>
+                    <a:pt x="158088" y="727485"/>
+                    <a:pt x="118487" y="626498"/>
+                  </a:cubicBezTo>
+                  <a:cubicBezTo>
+                    <a:pt x="78151" y="525859"/>
+                    <a:pt x="48237" y="421515"/>
+                    <a:pt x="28130" y="315781"/>
+                  </a:cubicBezTo>
+                  <a:cubicBezTo>
+                    <a:pt x="18506" y="262914"/>
+                    <a:pt x="11425" y="209642"/>
+                    <a:pt x="6751" y="156195"/>
+                  </a:cubicBezTo>
+                  <a:close/>
+                </a:path>
+              </a:pathLst>
+            </a:custGeom>
+            <a:gradFill>
+              <a:gsLst>
+                <a:gs pos="2000">
+                  <a:schemeClr val="bg1">
+                    <a:alpha val="10000"/>
+                  </a:schemeClr>
+                </a:gs>
+                <a:gs pos="16000">
+                  <a:schemeClr val="accent6">
+                    <a:alpha val="10000"/>
+                  </a:schemeClr>
+                </a:gs>
+                <a:gs pos="100000">
+                  <a:schemeClr val="bg1">
+                    <a:alpha val="10000"/>
+                  </a:schemeClr>
+                </a:gs>
+                <a:gs pos="85000">
+                  <a:schemeClr val="accent1">
+                    <a:alpha val="10000"/>
+                  </a:schemeClr>
+                </a:gs>
+              </a:gsLst>
+              <a:lin ang="12000000" scaled="0"/>
+            </a:gradFill>
+            <a:ln>
+              <a:noFill/>
+            </a:ln>
+          </p:spPr>
+          <p:style>
+            <a:lnRef idx="2">
+              <a:schemeClr val="accent1">
+                <a:shade val="50000"/>
+              </a:schemeClr>
+            </a:lnRef>
+            <a:fillRef idx="1">
+              <a:schemeClr val="accent1"/>
+            </a:fillRef>
+            <a:effectRef idx="0">
+              <a:schemeClr val="accent1"/>
+            </a:effectRef>
+            <a:fontRef idx="minor">
+              <a:schemeClr val="lt1"/>
+            </a:fontRef>
+          </p:style>
+          <p:txBody>
+            <a:bodyPr rtlCol="0" anchor="ctr"/>
+            <a:lstStyle/>
+            <a:p>
+              <a:pPr algn="ctr"/>
+              <a:endParaRPr lang="en-US"/>
+            </a:p>
+          </p:txBody>
+        </p:sp>
+        <p:sp>
+          <p:nvSpPr>
+            <p:cNvPr id="26" name="Freeform: Shape 25">
+              <a:extLst>
+                <a:ext uri="{FF2B5EF4-FFF2-40B4-BE49-F238E27FC236}">
+                  <a16:creationId xmlns:a16="http://schemas.microsoft.com/office/drawing/2014/main" id="{AF093259-3E74-43A1-944B-B106C8105E9B}"/>
+                </a:ext>
+                <a:ext uri="{C183D7F6-B498-43B3-948B-1728B52AA6E4}">
+                  <adec:decorative xmlns:adec="http://schemas.microsoft.com/office/drawing/2017/decorative" val="1"/>
+                </a:ext>
+              </a:extLst>
+            </p:cNvPr>
+            <p:cNvSpPr/>
+            <p:nvPr>
+              <p:extLst>
+                <p:ext uri="{386F3935-93C4-4BCD-93E2-E3B085C9AB24}">
+                  <p16:designElem xmlns:p16="http://schemas.microsoft.com/office/powerpoint/2015/main" val="1"/>
+                </p:ext>
+              </p:extLst>
+            </p:nvPr>
+          </p:nvSpPr>
+          <p:spPr>
+            <a:xfrm>
+              <a:off x="6916467" y="-1"/>
+              <a:ext cx="5275533" cy="2980757"/>
+            </a:xfrm>
+            <a:custGeom>
+              <a:avLst/>
+              <a:gdLst>
+                <a:gd name="connsiteX0" fmla="*/ 0 w 5275533"/>
+                <a:gd name="connsiteY0" fmla="*/ 0 h 2980757"/>
+                <a:gd name="connsiteX1" fmla="*/ 201166 w 5275533"/>
+                <a:gd name="connsiteY1" fmla="*/ 0 h 2980757"/>
+                <a:gd name="connsiteX2" fmla="*/ 206734 w 5275533"/>
+                <a:gd name="connsiteY2" fmla="*/ 89286 h 2980757"/>
+                <a:gd name="connsiteX3" fmla="*/ 232051 w 5275533"/>
+                <a:gd name="connsiteY3" fmla="*/ 226897 h 2980757"/>
+                <a:gd name="connsiteX4" fmla="*/ 332707 w 5275533"/>
+                <a:gd name="connsiteY4" fmla="*/ 487120 h 2980757"/>
+                <a:gd name="connsiteX5" fmla="*/ 402959 w 5275533"/>
+                <a:gd name="connsiteY5" fmla="*/ 609647 h 2980757"/>
+                <a:gd name="connsiteX6" fmla="*/ 483631 w 5275533"/>
+                <a:gd name="connsiteY6" fmla="*/ 728236 h 2980757"/>
+                <a:gd name="connsiteX7" fmla="*/ 669986 w 5275533"/>
+                <a:gd name="connsiteY7" fmla="*/ 957424 h 2980757"/>
+                <a:gd name="connsiteX8" fmla="*/ 871667 w 5275533"/>
+                <a:gd name="connsiteY8" fmla="*/ 1188348 h 2980757"/>
+                <a:gd name="connsiteX9" fmla="*/ 971956 w 5275533"/>
+                <a:gd name="connsiteY9" fmla="*/ 1308905 h 2980757"/>
+                <a:gd name="connsiteX10" fmla="*/ 1020139 w 5275533"/>
+                <a:gd name="connsiteY10" fmla="*/ 1368084 h 2980757"/>
+                <a:gd name="connsiteX11" fmla="*/ 1067340 w 5275533"/>
+                <a:gd name="connsiteY11" fmla="*/ 1424715 h 2980757"/>
+                <a:gd name="connsiteX12" fmla="*/ 1472909 w 5275533"/>
+                <a:gd name="connsiteY12" fmla="*/ 1843252 h 2980757"/>
+                <a:gd name="connsiteX13" fmla="*/ 1688567 w 5275533"/>
+                <a:gd name="connsiteY13" fmla="*/ 2031559 h 2980757"/>
+                <a:gd name="connsiteX14" fmla="*/ 1914401 w 5275533"/>
+                <a:gd name="connsiteY14" fmla="*/ 2205156 h 2980757"/>
+                <a:gd name="connsiteX15" fmla="*/ 2418909 w 5275533"/>
+                <a:gd name="connsiteY15" fmla="*/ 2479741 h 2980757"/>
+                <a:gd name="connsiteX16" fmla="*/ 2701141 w 5275533"/>
+                <a:gd name="connsiteY16" fmla="*/ 2557333 h 2980757"/>
+                <a:gd name="connsiteX17" fmla="*/ 2773475 w 5275533"/>
+                <a:gd name="connsiteY17" fmla="*/ 2570999 h 2980757"/>
+                <a:gd name="connsiteX18" fmla="*/ 2846424 w 5275533"/>
+                <a:gd name="connsiteY18" fmla="*/ 2582465 h 2980757"/>
+                <a:gd name="connsiteX19" fmla="*/ 2993669 w 5275533"/>
+                <a:gd name="connsiteY19" fmla="*/ 2598909 h 2980757"/>
+                <a:gd name="connsiteX20" fmla="*/ 3067721 w 5275533"/>
+                <a:gd name="connsiteY20" fmla="*/ 2604237 h 2980757"/>
+                <a:gd name="connsiteX21" fmla="*/ 3142019 w 5275533"/>
+                <a:gd name="connsiteY21" fmla="*/ 2607943 h 2980757"/>
+                <a:gd name="connsiteX22" fmla="*/ 3216561 w 5275533"/>
+                <a:gd name="connsiteY22" fmla="*/ 2609564 h 2980757"/>
+                <a:gd name="connsiteX23" fmla="*/ 3291225 w 5275533"/>
+                <a:gd name="connsiteY23" fmla="*/ 2609217 h 2980757"/>
+                <a:gd name="connsiteX24" fmla="*/ 3328619 w 5275533"/>
+                <a:gd name="connsiteY24" fmla="*/ 2608869 h 2980757"/>
+                <a:gd name="connsiteX25" fmla="*/ 3364665 w 5275533"/>
+                <a:gd name="connsiteY25" fmla="*/ 2607363 h 2980757"/>
+                <a:gd name="connsiteX26" fmla="*/ 3400587 w 5275533"/>
+                <a:gd name="connsiteY26" fmla="*/ 2605627 h 2980757"/>
+                <a:gd name="connsiteX27" fmla="*/ 3436387 w 5275533"/>
+                <a:gd name="connsiteY27" fmla="*/ 2602847 h 2980757"/>
+                <a:gd name="connsiteX28" fmla="*/ 3578361 w 5275533"/>
+                <a:gd name="connsiteY28" fmla="*/ 2586286 h 2980757"/>
+                <a:gd name="connsiteX29" fmla="*/ 4119159 w 5275533"/>
+                <a:gd name="connsiteY29" fmla="*/ 2418594 h 2980757"/>
+                <a:gd name="connsiteX30" fmla="*/ 4618765 w 5275533"/>
+                <a:gd name="connsiteY30" fmla="*/ 2124668 h 2980757"/>
+                <a:gd name="connsiteX31" fmla="*/ 4739895 w 5275533"/>
+                <a:gd name="connsiteY31" fmla="*/ 2038275 h 2980757"/>
+                <a:gd name="connsiteX32" fmla="*/ 4861027 w 5275533"/>
+                <a:gd name="connsiteY32" fmla="*/ 1948986 h 2980757"/>
+                <a:gd name="connsiteX33" fmla="*/ 5106354 w 5275533"/>
+                <a:gd name="connsiteY33" fmla="*/ 1763690 h 2980757"/>
+                <a:gd name="connsiteX34" fmla="*/ 5275533 w 5275533"/>
+                <a:gd name="connsiteY34" fmla="*/ 1641017 h 2980757"/>
+                <a:gd name="connsiteX35" fmla="*/ 5275533 w 5275533"/>
+                <a:gd name="connsiteY35" fmla="*/ 2257481 h 2980757"/>
+                <a:gd name="connsiteX36" fmla="*/ 5168881 w 5275533"/>
+                <a:gd name="connsiteY36" fmla="*/ 2332084 h 2980757"/>
+                <a:gd name="connsiteX37" fmla="*/ 5036225 w 5275533"/>
+                <a:gd name="connsiteY37" fmla="*/ 2421489 h 2980757"/>
+                <a:gd name="connsiteX38" fmla="*/ 4899401 w 5275533"/>
+                <a:gd name="connsiteY38" fmla="*/ 2508347 h 2980757"/>
+                <a:gd name="connsiteX39" fmla="*/ 4612145 w 5275533"/>
+                <a:gd name="connsiteY39" fmla="*/ 2671407 h 2980757"/>
+                <a:gd name="connsiteX40" fmla="*/ 4303187 w 5275533"/>
+                <a:gd name="connsiteY40" fmla="*/ 2810030 h 2980757"/>
+                <a:gd name="connsiteX41" fmla="*/ 3630835 w 5275533"/>
+                <a:gd name="connsiteY41" fmla="*/ 2969500 h 2980757"/>
+                <a:gd name="connsiteX42" fmla="*/ 3457719 w 5275533"/>
+                <a:gd name="connsiteY42" fmla="*/ 2979808 h 2980757"/>
+                <a:gd name="connsiteX43" fmla="*/ 3414441 w 5275533"/>
+                <a:gd name="connsiteY43" fmla="*/ 2980733 h 2980757"/>
+                <a:gd name="connsiteX44" fmla="*/ 3371285 w 5275533"/>
+                <a:gd name="connsiteY44" fmla="*/ 2980502 h 2980757"/>
+                <a:gd name="connsiteX45" fmla="*/ 3328252 w 5275533"/>
+                <a:gd name="connsiteY45" fmla="*/ 2980039 h 2980757"/>
+                <a:gd name="connsiteX46" fmla="*/ 3286445 w 5275533"/>
+                <a:gd name="connsiteY46" fmla="*/ 2978534 h 2980757"/>
+                <a:gd name="connsiteX47" fmla="*/ 2952475 w 5275533"/>
+                <a:gd name="connsiteY47" fmla="*/ 2953402 h 2980757"/>
+                <a:gd name="connsiteX48" fmla="*/ 2620591 w 5275533"/>
+                <a:gd name="connsiteY48" fmla="*/ 2898046 h 2980757"/>
+                <a:gd name="connsiteX49" fmla="*/ 2294591 w 5275533"/>
+                <a:gd name="connsiteY49" fmla="*/ 2811305 h 2980757"/>
+                <a:gd name="connsiteX50" fmla="*/ 1670544 w 5275533"/>
+                <a:gd name="connsiteY50" fmla="*/ 2550501 h 2980757"/>
+                <a:gd name="connsiteX51" fmla="*/ 1144703 w 5275533"/>
+                <a:gd name="connsiteY51" fmla="*/ 2144472 h 2980757"/>
+                <a:gd name="connsiteX52" fmla="*/ 931497 w 5275533"/>
+                <a:gd name="connsiteY52" fmla="*/ 1900114 h 2980757"/>
+                <a:gd name="connsiteX53" fmla="*/ 745265 w 5275533"/>
+                <a:gd name="connsiteY53" fmla="*/ 1641395 h 2980757"/>
+                <a:gd name="connsiteX54" fmla="*/ 701741 w 5275533"/>
+                <a:gd name="connsiteY54" fmla="*/ 1575500 h 2980757"/>
+                <a:gd name="connsiteX55" fmla="*/ 660178 w 5275533"/>
+                <a:gd name="connsiteY55" fmla="*/ 1511573 h 2980757"/>
+                <a:gd name="connsiteX56" fmla="*/ 578158 w 5275533"/>
+                <a:gd name="connsiteY56" fmla="*/ 1387656 h 2980757"/>
+                <a:gd name="connsiteX57" fmla="*/ 408230 w 5275533"/>
+                <a:gd name="connsiteY57" fmla="*/ 1134497 h 2980757"/>
+                <a:gd name="connsiteX58" fmla="*/ 242349 w 5275533"/>
+                <a:gd name="connsiteY58" fmla="*/ 866860 h 2980757"/>
+                <a:gd name="connsiteX59" fmla="*/ 167562 w 5275533"/>
+                <a:gd name="connsiteY59" fmla="*/ 724994 h 2980757"/>
+                <a:gd name="connsiteX60" fmla="*/ 104054 w 5275533"/>
+                <a:gd name="connsiteY60" fmla="*/ 576525 h 2980757"/>
+                <a:gd name="connsiteX61" fmla="*/ 55381 w 5275533"/>
+                <a:gd name="connsiteY61" fmla="*/ 422499 h 2980757"/>
+                <a:gd name="connsiteX62" fmla="*/ 37236 w 5275533"/>
+                <a:gd name="connsiteY62" fmla="*/ 343980 h 2980757"/>
+                <a:gd name="connsiteX63" fmla="*/ 29267 w 5275533"/>
+                <a:gd name="connsiteY63" fmla="*/ 304604 h 2980757"/>
+                <a:gd name="connsiteX64" fmla="*/ 22646 w 5275533"/>
+                <a:gd name="connsiteY64" fmla="*/ 265113 h 2980757"/>
+                <a:gd name="connsiteX65" fmla="*/ 3903 w 5275533"/>
+                <a:gd name="connsiteY65" fmla="*/ 106787 h 2980757"/>
+              </a:gdLst>
+              <a:ahLst/>
+              <a:cxnLst>
+                <a:cxn ang="0">
+                  <a:pos x="connsiteX0" y="connsiteY0"/>
+                </a:cxn>
+                <a:cxn ang="0">
+                  <a:pos x="connsiteX1" y="connsiteY1"/>
+                </a:cxn>
+                <a:cxn ang="0">
+                  <a:pos x="connsiteX2" y="connsiteY2"/>
+                </a:cxn>
+                <a:cxn ang="0">
+                  <a:pos x="connsiteX3" y="connsiteY3"/>
+                </a:cxn>
+                <a:cxn ang="0">
+                  <a:pos x="connsiteX4" y="connsiteY4"/>
+                </a:cxn>
+                <a:cxn ang="0">
+                  <a:pos x="connsiteX5" y="connsiteY5"/>
+                </a:cxn>
+                <a:cxn ang="0">
+                  <a:pos x="connsiteX6" y="connsiteY6"/>
+                </a:cxn>
+                <a:cxn ang="0">
+                  <a:pos x="connsiteX7" y="connsiteY7"/>
+                </a:cxn>
+                <a:cxn ang="0">
+                  <a:pos x="connsiteX8" y="connsiteY8"/>
+                </a:cxn>
+                <a:cxn ang="0">
+                  <a:pos x="connsiteX9" y="connsiteY9"/>
+                </a:cxn>
+                <a:cxn ang="0">
+                  <a:pos x="connsiteX10" y="connsiteY10"/>
+                </a:cxn>
+                <a:cxn ang="0">
+                  <a:pos x="connsiteX11" y="connsiteY11"/>
+                </a:cxn>
+                <a:cxn ang="0">
+                  <a:pos x="connsiteX12" y="connsiteY12"/>
+                </a:cxn>
+                <a:cxn ang="0">
+                  <a:pos x="connsiteX13" y="connsiteY13"/>
+                </a:cxn>
+                <a:cxn ang="0">
+                  <a:pos x="connsiteX14" y="connsiteY14"/>
+                </a:cxn>
+                <a:cxn ang="0">
+                  <a:pos x="connsiteX15" y="connsiteY15"/>
+                </a:cxn>
+                <a:cxn ang="0">
+                  <a:pos x="connsiteX16" y="connsiteY16"/>
+                </a:cxn>
+                <a:cxn ang="0">
+                  <a:pos x="connsiteX17" y="connsiteY17"/>
+                </a:cxn>
+                <a:cxn ang="0">
+                  <a:pos x="connsiteX18" y="connsiteY18"/>
+                </a:cxn>
+                <a:cxn ang="0">
+                  <a:pos x="connsiteX19" y="connsiteY19"/>
+                </a:cxn>
+                <a:cxn ang="0">
+                  <a:pos x="connsiteX20" y="connsiteY20"/>
+                </a:cxn>
+                <a:cxn ang="0">
+                  <a:pos x="connsiteX21" y="connsiteY21"/>
+                </a:cxn>
+                <a:cxn ang="0">
+                  <a:pos x="connsiteX22" y="connsiteY22"/>
+                </a:cxn>
+                <a:cxn ang="0">
+                  <a:pos x="connsiteX23" y="connsiteY23"/>
+                </a:cxn>
+                <a:cxn ang="0">
+                  <a:pos x="connsiteX24" y="connsiteY24"/>
+                </a:cxn>
+                <a:cxn ang="0">
+                  <a:pos x="connsiteX25" y="connsiteY25"/>
+                </a:cxn>
+                <a:cxn ang="0">
+                  <a:pos x="connsiteX26" y="connsiteY26"/>
+                </a:cxn>
+                <a:cxn ang="0">
+                  <a:pos x="connsiteX27" y="connsiteY27"/>
+                </a:cxn>
+                <a:cxn ang="0">
+                  <a:pos x="connsiteX28" y="connsiteY28"/>
+                </a:cxn>
+                <a:cxn ang="0">
+                  <a:pos x="connsiteX29" y="connsiteY29"/>
+                </a:cxn>
+                <a:cxn ang="0">
+                  <a:pos x="connsiteX30" y="connsiteY30"/>
+                </a:cxn>
+                <a:cxn ang="0">
+                  <a:pos x="connsiteX31" y="connsiteY31"/>
+                </a:cxn>
+                <a:cxn ang="0">
+                  <a:pos x="connsiteX32" y="connsiteY32"/>
+                </a:cxn>
+                <a:cxn ang="0">
+                  <a:pos x="connsiteX33" y="connsiteY33"/>
+                </a:cxn>
+                <a:cxn ang="0">
+                  <a:pos x="connsiteX34" y="connsiteY34"/>
+                </a:cxn>
+                <a:cxn ang="0">
+                  <a:pos x="connsiteX35" y="connsiteY35"/>
+                </a:cxn>
+                <a:cxn ang="0">
+                  <a:pos x="connsiteX36" y="connsiteY36"/>
+                </a:cxn>
+                <a:cxn ang="0">
+                  <a:pos x="connsiteX37" y="connsiteY37"/>
+                </a:cxn>
+                <a:cxn ang="0">
+                  <a:pos x="connsiteX38" y="connsiteY38"/>
+                </a:cxn>
+                <a:cxn ang="0">
+                  <a:pos x="connsiteX39" y="connsiteY39"/>
+                </a:cxn>
+                <a:cxn ang="0">
+                  <a:pos x="connsiteX40" y="connsiteY40"/>
+                </a:cxn>
+                <a:cxn ang="0">
+                  <a:pos x="connsiteX41" y="connsiteY41"/>
+                </a:cxn>
+                <a:cxn ang="0">
+                  <a:pos x="connsiteX42" y="connsiteY42"/>
+                </a:cxn>
+                <a:cxn ang="0">
+                  <a:pos x="connsiteX43" y="connsiteY43"/>
+                </a:cxn>
+                <a:cxn ang="0">
+                  <a:pos x="connsiteX44" y="connsiteY44"/>
+                </a:cxn>
+                <a:cxn ang="0">
+                  <a:pos x="connsiteX45" y="connsiteY45"/>
+                </a:cxn>
+                <a:cxn ang="0">
+                  <a:pos x="connsiteX46" y="connsiteY46"/>
+                </a:cxn>
+                <a:cxn ang="0">
+                  <a:pos x="connsiteX47" y="connsiteY47"/>
+                </a:cxn>
+                <a:cxn ang="0">
+                  <a:pos x="connsiteX48" y="connsiteY48"/>
+                </a:cxn>
+                <a:cxn ang="0">
+                  <a:pos x="connsiteX49" y="connsiteY49"/>
+                </a:cxn>
+                <a:cxn ang="0">
+                  <a:pos x="connsiteX50" y="connsiteY50"/>
+                </a:cxn>
+                <a:cxn ang="0">
+                  <a:pos x="connsiteX51" y="connsiteY51"/>
+                </a:cxn>
+                <a:cxn ang="0">
+                  <a:pos x="connsiteX52" y="connsiteY52"/>
+                </a:cxn>
+                <a:cxn ang="0">
+                  <a:pos x="connsiteX53" y="connsiteY53"/>
+                </a:cxn>
+                <a:cxn ang="0">
+                  <a:pos x="connsiteX54" y="connsiteY54"/>
+                </a:cxn>
+                <a:cxn ang="0">
+                  <a:pos x="connsiteX55" y="connsiteY55"/>
+                </a:cxn>
+                <a:cxn ang="0">
+                  <a:pos x="connsiteX56" y="connsiteY56"/>
+                </a:cxn>
+                <a:cxn ang="0">
+                  <a:pos x="connsiteX57" y="connsiteY57"/>
+                </a:cxn>
+                <a:cxn ang="0">
+                  <a:pos x="connsiteX58" y="connsiteY58"/>
+                </a:cxn>
+                <a:cxn ang="0">
+                  <a:pos x="connsiteX59" y="connsiteY59"/>
+                </a:cxn>
+                <a:cxn ang="0">
+                  <a:pos x="connsiteX60" y="connsiteY60"/>
+                </a:cxn>
+                <a:cxn ang="0">
+                  <a:pos x="connsiteX61" y="connsiteY61"/>
+                </a:cxn>
+                <a:cxn ang="0">
+                  <a:pos x="connsiteX62" y="connsiteY62"/>
+                </a:cxn>
+                <a:cxn ang="0">
+                  <a:pos x="connsiteX63" y="connsiteY63"/>
+                </a:cxn>
+                <a:cxn ang="0">
+                  <a:pos x="connsiteX64" y="connsiteY64"/>
+                </a:cxn>
+                <a:cxn ang="0">
+                  <a:pos x="connsiteX65" y="connsiteY65"/>
+                </a:cxn>
+              </a:cxnLst>
+              <a:rect l="l" t="t" r="r" b="b"/>
+              <a:pathLst>
+                <a:path w="5275533" h="2980757">
+                  <a:moveTo>
+                    <a:pt x="0" y="0"/>
+                  </a:moveTo>
+                  <a:lnTo>
+                    <a:pt x="201166" y="0"/>
+                  </a:lnTo>
+                  <a:lnTo>
+                    <a:pt x="206734" y="89286"/>
+                  </a:lnTo>
+                  <a:cubicBezTo>
+                    <a:pt x="212220" y="135755"/>
+                    <a:pt x="220465" y="181731"/>
+                    <a:pt x="232051" y="226897"/>
+                  </a:cubicBezTo>
+                  <a:cubicBezTo>
+                    <a:pt x="254855" y="317344"/>
+                    <a:pt x="290287" y="403854"/>
+                    <a:pt x="332707" y="487120"/>
+                  </a:cubicBezTo>
+                  <a:cubicBezTo>
+                    <a:pt x="354163" y="528696"/>
+                    <a:pt x="377948" y="569461"/>
+                    <a:pt x="402959" y="609647"/>
+                  </a:cubicBezTo>
+                  <a:cubicBezTo>
+                    <a:pt x="428337" y="649717"/>
+                    <a:pt x="455433" y="689209"/>
+                    <a:pt x="483631" y="728236"/>
+                  </a:cubicBezTo>
+                  <a:cubicBezTo>
+                    <a:pt x="540764" y="806061"/>
+                    <a:pt x="604271" y="881569"/>
+                    <a:pt x="669986" y="957424"/>
+                  </a:cubicBezTo>
+                  <a:cubicBezTo>
+                    <a:pt x="735701" y="1033395"/>
+                    <a:pt x="804359" y="1109366"/>
+                    <a:pt x="871667" y="1188348"/>
+                  </a:cubicBezTo>
+                  <a:cubicBezTo>
+                    <a:pt x="905383" y="1227723"/>
+                    <a:pt x="938731" y="1268025"/>
+                    <a:pt x="971956" y="1308905"/>
+                  </a:cubicBezTo>
+                  <a:lnTo>
+                    <a:pt x="1020139" y="1368084"/>
+                  </a:lnTo>
+                  <a:cubicBezTo>
+                    <a:pt x="1035954" y="1386962"/>
+                    <a:pt x="1051035" y="1406302"/>
+                    <a:pt x="1067340" y="1424715"/>
+                  </a:cubicBezTo>
+                  <a:cubicBezTo>
+                    <a:pt x="1194602" y="1574573"/>
+                    <a:pt x="1332652" y="1712503"/>
+                    <a:pt x="1472909" y="1843252"/>
+                  </a:cubicBezTo>
+                  <a:cubicBezTo>
+                    <a:pt x="1543406" y="1908337"/>
+                    <a:pt x="1615128" y="1971221"/>
+                    <a:pt x="1688567" y="2031559"/>
+                  </a:cubicBezTo>
+                  <a:cubicBezTo>
+                    <a:pt x="1762006" y="2091895"/>
+                    <a:pt x="1836793" y="2150263"/>
+                    <a:pt x="1914401" y="2205156"/>
+                  </a:cubicBezTo>
+                  <a:cubicBezTo>
+                    <a:pt x="2069003" y="2315176"/>
+                    <a:pt x="2235742" y="2413498"/>
+                    <a:pt x="2418909" y="2479741"/>
+                  </a:cubicBezTo>
+                  <a:cubicBezTo>
+                    <a:pt x="2510249" y="2512863"/>
+                    <a:pt x="2604898" y="2538225"/>
+                    <a:pt x="2701141" y="2557333"/>
+                  </a:cubicBezTo>
+                  <a:cubicBezTo>
+                    <a:pt x="2725293" y="2561850"/>
+                    <a:pt x="2749201" y="2567062"/>
+                    <a:pt x="2773475" y="2570999"/>
+                  </a:cubicBezTo>
+                  <a:lnTo>
+                    <a:pt x="2846424" y="2582465"/>
+                  </a:lnTo>
+                  <a:cubicBezTo>
+                    <a:pt x="2895343" y="2588602"/>
+                    <a:pt x="2944261" y="2595088"/>
+                    <a:pt x="2993669" y="2598909"/>
+                  </a:cubicBezTo>
+                  <a:cubicBezTo>
+                    <a:pt x="3018313" y="2601110"/>
+                    <a:pt x="3042956" y="2603195"/>
+                    <a:pt x="3067721" y="2604237"/>
+                  </a:cubicBezTo>
+                  <a:cubicBezTo>
+                    <a:pt x="3092487" y="2605394"/>
+                    <a:pt x="3117130" y="2607247"/>
+                    <a:pt x="3142019" y="2607943"/>
+                  </a:cubicBezTo>
+                  <a:lnTo>
+                    <a:pt x="3216561" y="2609564"/>
+                  </a:lnTo>
+                  <a:cubicBezTo>
+                    <a:pt x="3241326" y="2610142"/>
+                    <a:pt x="3266337" y="2609333"/>
+                    <a:pt x="3291225" y="2609217"/>
+                  </a:cubicBezTo>
+                  <a:lnTo>
+                    <a:pt x="3328619" y="2608869"/>
+                  </a:lnTo>
+                  <a:cubicBezTo>
+                    <a:pt x="3340757" y="2608522"/>
+                    <a:pt x="3352649" y="2607827"/>
+                    <a:pt x="3364665" y="2607363"/>
+                  </a:cubicBezTo>
+                  <a:cubicBezTo>
+                    <a:pt x="3376679" y="2606784"/>
+                    <a:pt x="3388695" y="2606438"/>
+                    <a:pt x="3400587" y="2605627"/>
+                  </a:cubicBezTo>
+                  <a:lnTo>
+                    <a:pt x="3436387" y="2602847"/>
+                  </a:lnTo>
+                  <a:cubicBezTo>
+                    <a:pt x="3484079" y="2599257"/>
+                    <a:pt x="3531404" y="2593235"/>
+                    <a:pt x="3578361" y="2586286"/>
+                  </a:cubicBezTo>
+                  <a:cubicBezTo>
+                    <a:pt x="3766310" y="2556871"/>
+                    <a:pt x="3947025" y="2499314"/>
+                    <a:pt x="4119159" y="2418594"/>
+                  </a:cubicBezTo>
+                  <a:cubicBezTo>
+                    <a:pt x="4291907" y="2338801"/>
+                    <a:pt x="4456317" y="2236657"/>
+                    <a:pt x="4618765" y="2124668"/>
+                  </a:cubicBezTo>
+                  <a:cubicBezTo>
+                    <a:pt x="4659346" y="2096759"/>
+                    <a:pt x="4699682" y="2067575"/>
+                    <a:pt x="4739895" y="2038275"/>
+                  </a:cubicBezTo>
+                  <a:cubicBezTo>
+                    <a:pt x="4780355" y="2008976"/>
+                    <a:pt x="4820691" y="1979212"/>
+                    <a:pt x="4861027" y="1948986"/>
+                  </a:cubicBezTo>
+                  <a:lnTo>
+                    <a:pt x="5106354" y="1763690"/>
+                  </a:lnTo>
+                  <a:lnTo>
+                    <a:pt x="5275533" y="1641017"/>
+                  </a:lnTo>
+                  <a:lnTo>
+                    <a:pt x="5275533" y="2257481"/>
+                  </a:lnTo>
+                  <a:lnTo>
+                    <a:pt x="5168881" y="2332084"/>
+                  </a:lnTo>
+                  <a:cubicBezTo>
+                    <a:pt x="5125235" y="2362079"/>
+                    <a:pt x="5081099" y="2391958"/>
+                    <a:pt x="5036225" y="2421489"/>
+                  </a:cubicBezTo>
+                  <a:cubicBezTo>
+                    <a:pt x="4991231" y="2450790"/>
+                    <a:pt x="4945867" y="2479857"/>
+                    <a:pt x="4899401" y="2508347"/>
+                  </a:cubicBezTo>
+                  <a:cubicBezTo>
+                    <a:pt x="4806959" y="2565440"/>
+                    <a:pt x="4711574" y="2620798"/>
+                    <a:pt x="4612145" y="2671407"/>
+                  </a:cubicBezTo>
+                  <a:cubicBezTo>
+                    <a:pt x="4512836" y="2722247"/>
+                    <a:pt x="4410095" y="2769496"/>
+                    <a:pt x="4303187" y="2810030"/>
+                  </a:cubicBezTo>
+                  <a:cubicBezTo>
+                    <a:pt x="4090349" y="2892256"/>
+                    <a:pt x="3861694" y="2947728"/>
+                    <a:pt x="3630835" y="2969500"/>
+                  </a:cubicBezTo>
+                  <a:cubicBezTo>
+                    <a:pt x="3573089" y="2974712"/>
+                    <a:pt x="3515343" y="2978649"/>
+                    <a:pt x="3457719" y="2979808"/>
+                  </a:cubicBezTo>
+                  <a:lnTo>
+                    <a:pt x="3414441" y="2980733"/>
+                  </a:lnTo>
+                  <a:cubicBezTo>
+                    <a:pt x="3400097" y="2980850"/>
+                    <a:pt x="3385630" y="2980502"/>
+                    <a:pt x="3371285" y="2980502"/>
+                  </a:cubicBezTo>
+                  <a:lnTo>
+                    <a:pt x="3328252" y="2980039"/>
+                  </a:lnTo>
+                  <a:lnTo>
+                    <a:pt x="3286445" y="2978534"/>
+                  </a:lnTo>
+                  <a:cubicBezTo>
+                    <a:pt x="3175121" y="2975174"/>
+                    <a:pt x="3063553" y="2966837"/>
+                    <a:pt x="2952475" y="2953402"/>
+                  </a:cubicBezTo>
+                  <a:cubicBezTo>
+                    <a:pt x="2841275" y="2940664"/>
+                    <a:pt x="2730319" y="2922365"/>
+                    <a:pt x="2620591" y="2898046"/>
+                  </a:cubicBezTo>
+                  <a:cubicBezTo>
+                    <a:pt x="2510984" y="2873494"/>
+                    <a:pt x="2402235" y="2844426"/>
+                    <a:pt x="2294591" y="2811305"/>
+                  </a:cubicBezTo>
+                  <a:cubicBezTo>
+                    <a:pt x="2079669" y="2744483"/>
+                    <a:pt x="1867198" y="2661331"/>
+                    <a:pt x="1670544" y="2550501"/>
+                  </a:cubicBezTo>
+                  <a:cubicBezTo>
+                    <a:pt x="1473767" y="2439903"/>
+                    <a:pt x="1298079" y="2299657"/>
+                    <a:pt x="1144703" y="2144472"/>
+                  </a:cubicBezTo>
+                  <a:cubicBezTo>
+                    <a:pt x="1067586" y="2066996"/>
+                    <a:pt x="997458" y="1984539"/>
+                    <a:pt x="931497" y="1900114"/>
+                  </a:cubicBezTo>
+                  <a:cubicBezTo>
+                    <a:pt x="865906" y="1815342"/>
+                    <a:pt x="803500" y="1729295"/>
+                    <a:pt x="745265" y="1641395"/>
+                  </a:cubicBezTo>
+                  <a:cubicBezTo>
+                    <a:pt x="730307" y="1619623"/>
+                    <a:pt x="716207" y="1597503"/>
+                    <a:pt x="701741" y="1575500"/>
+                  </a:cubicBezTo>
+                  <a:lnTo>
+                    <a:pt x="660178" y="1511573"/>
+                  </a:lnTo>
+                  <a:cubicBezTo>
+                    <a:pt x="633574" y="1470229"/>
+                    <a:pt x="605989" y="1429232"/>
+                    <a:pt x="578158" y="1387656"/>
+                  </a:cubicBezTo>
+                  <a:lnTo>
+                    <a:pt x="408230" y="1134497"/>
+                  </a:lnTo>
+                  <a:cubicBezTo>
+                    <a:pt x="351220" y="1048219"/>
+                    <a:pt x="294945" y="959392"/>
+                    <a:pt x="242349" y="866860"/>
+                  </a:cubicBezTo>
+                  <a:cubicBezTo>
+                    <a:pt x="216112" y="820536"/>
+                    <a:pt x="190734" y="773402"/>
+                    <a:pt x="167562" y="724994"/>
+                  </a:cubicBezTo>
+                  <a:cubicBezTo>
+                    <a:pt x="144513" y="676469"/>
+                    <a:pt x="123057" y="627019"/>
+                    <a:pt x="104054" y="576525"/>
+                  </a:cubicBezTo>
+                  <a:cubicBezTo>
+                    <a:pt x="85418" y="525917"/>
+                    <a:pt x="68867" y="474613"/>
+                    <a:pt x="55381" y="422499"/>
+                  </a:cubicBezTo>
+                  <a:cubicBezTo>
+                    <a:pt x="49006" y="396442"/>
+                    <a:pt x="42508" y="370269"/>
+                    <a:pt x="37236" y="343980"/>
+                  </a:cubicBezTo>
+                  <a:lnTo>
+                    <a:pt x="29267" y="304604"/>
+                  </a:lnTo>
+                  <a:lnTo>
+                    <a:pt x="22646" y="265113"/>
+                  </a:lnTo>
+                  <a:cubicBezTo>
+                    <a:pt x="14003" y="212420"/>
+                    <a:pt x="7872" y="159582"/>
+                    <a:pt x="3903" y="106787"/>
+                  </a:cubicBezTo>
+                  <a:close/>
+                </a:path>
+              </a:pathLst>
+            </a:custGeom>
+            <a:gradFill>
+              <a:gsLst>
+                <a:gs pos="2000">
+                  <a:schemeClr val="bg1">
+                    <a:alpha val="10000"/>
+                  </a:schemeClr>
+                </a:gs>
+                <a:gs pos="16000">
+                  <a:schemeClr val="accent6">
+                    <a:alpha val="10000"/>
+                  </a:schemeClr>
+                </a:gs>
+                <a:gs pos="100000">
+                  <a:schemeClr val="bg1">
+                    <a:alpha val="10000"/>
+                  </a:schemeClr>
+                </a:gs>
+                <a:gs pos="85000">
+                  <a:schemeClr val="accent1">
+                    <a:alpha val="10000"/>
+                  </a:schemeClr>
+                </a:gs>
+              </a:gsLst>
+              <a:lin ang="12000000" scaled="0"/>
+            </a:gradFill>
+            <a:ln>
+              <a:noFill/>
+            </a:ln>
+          </p:spPr>
+          <p:style>
+            <a:lnRef idx="2">
+              <a:schemeClr val="accent1">
+                <a:shade val="50000"/>
+              </a:schemeClr>
+            </a:lnRef>
+            <a:fillRef idx="1">
+              <a:schemeClr val="accent1"/>
+            </a:fillRef>
+            <a:effectRef idx="0">
+              <a:schemeClr val="accent1"/>
+            </a:effectRef>
+            <a:fontRef idx="minor">
+              <a:schemeClr val="lt1"/>
+            </a:fontRef>
+          </p:style>
+          <p:txBody>
+            <a:bodyPr rtlCol="0" anchor="ctr"/>
+            <a:lstStyle/>
+            <a:p>
+              <a:pPr algn="ctr"/>
+              <a:endParaRPr lang="en-US"/>
+            </a:p>
+          </p:txBody>
+        </p:sp>
+        <p:sp>
+          <p:nvSpPr>
+            <p:cNvPr id="14" name="Freeform: Shape 13">
+              <a:extLst>
+                <a:ext uri="{FF2B5EF4-FFF2-40B4-BE49-F238E27FC236}">
+                  <a16:creationId xmlns:a16="http://schemas.microsoft.com/office/drawing/2014/main" id="{AAA28A35-1E54-4054-BB95-42FAFA13A942}"/>
+                </a:ext>
+                <a:ext uri="{C183D7F6-B498-43B3-948B-1728B52AA6E4}">
+                  <adec:decorative xmlns:adec="http://schemas.microsoft.com/office/drawing/2017/decorative" val="1"/>
+                </a:ext>
+              </a:extLst>
+            </p:cNvPr>
+            <p:cNvSpPr/>
+            <p:nvPr>
+              <p:extLst>
+                <p:ext uri="{386F3935-93C4-4BCD-93E2-E3B085C9AB24}">
+                  <p16:designElem xmlns:p16="http://schemas.microsoft.com/office/powerpoint/2015/main" val="1"/>
+                </p:ext>
+              </p:extLst>
+            </p:nvPr>
+          </p:nvSpPr>
+          <p:spPr>
+            <a:xfrm>
+              <a:off x="6921214" y="-1"/>
+              <a:ext cx="5270786" cy="2927775"/>
+            </a:xfrm>
+            <a:custGeom>
+              <a:avLst/>
+              <a:gdLst>
+                <a:gd name="connsiteX0" fmla="*/ 0 w 5270786"/>
+                <a:gd name="connsiteY0" fmla="*/ 0 h 2927775"/>
+                <a:gd name="connsiteX1" fmla="*/ 613805 w 5270786"/>
+                <a:gd name="connsiteY1" fmla="*/ 0 h 2927775"/>
+                <a:gd name="connsiteX2" fmla="*/ 618487 w 5270786"/>
+                <a:gd name="connsiteY2" fmla="*/ 85404 h 2927775"/>
+                <a:gd name="connsiteX3" fmla="*/ 1054084 w 5270786"/>
+                <a:gd name="connsiteY3" fmla="*/ 895200 h 2927775"/>
+                <a:gd name="connsiteX4" fmla="*/ 1276976 w 5270786"/>
+                <a:gd name="connsiteY4" fmla="*/ 1191325 h 2927775"/>
+                <a:gd name="connsiteX5" fmla="*/ 3368450 w 5270786"/>
+                <a:gd name="connsiteY5" fmla="*/ 2348843 h 2927775"/>
+                <a:gd name="connsiteX6" fmla="*/ 4956151 w 5270786"/>
+                <a:gd name="connsiteY6" fmla="*/ 1636730 h 2927775"/>
+                <a:gd name="connsiteX7" fmla="*/ 5149372 w 5270786"/>
+                <a:gd name="connsiteY7" fmla="*/ 1495325 h 2927775"/>
+                <a:gd name="connsiteX8" fmla="*/ 5270786 w 5270786"/>
+                <a:gd name="connsiteY8" fmla="*/ 1406110 h 2927775"/>
+                <a:gd name="connsiteX9" fmla="*/ 5270786 w 5270786"/>
+                <a:gd name="connsiteY9" fmla="*/ 2138641 h 2927775"/>
+                <a:gd name="connsiteX10" fmla="*/ 5112925 w 5270786"/>
+                <a:gd name="connsiteY10" fmla="*/ 2253730 h 2927775"/>
+                <a:gd name="connsiteX11" fmla="*/ 3368327 w 5270786"/>
+                <a:gd name="connsiteY11" fmla="*/ 2927775 h 2927775"/>
+                <a:gd name="connsiteX12" fmla="*/ 769646 w 5270786"/>
+                <a:gd name="connsiteY12" fmla="*/ 1516288 h 2927775"/>
+                <a:gd name="connsiteX13" fmla="*/ 3149 w 5270786"/>
+                <a:gd name="connsiteY13" fmla="*/ 85252 h 2927775"/>
+              </a:gdLst>
+              <a:ahLst/>
+              <a:cxnLst>
+                <a:cxn ang="0">
+                  <a:pos x="connsiteX0" y="connsiteY0"/>
+                </a:cxn>
+                <a:cxn ang="0">
+                  <a:pos x="connsiteX1" y="connsiteY1"/>
+                </a:cxn>
+                <a:cxn ang="0">
+                  <a:pos x="connsiteX2" y="connsiteY2"/>
+                </a:cxn>
+                <a:cxn ang="0">
+                  <a:pos x="connsiteX3" y="connsiteY3"/>
+                </a:cxn>
+                <a:cxn ang="0">
+                  <a:pos x="connsiteX4" y="connsiteY4"/>
+                </a:cxn>
+                <a:cxn ang="0">
+                  <a:pos x="connsiteX5" y="connsiteY5"/>
+                </a:cxn>
+                <a:cxn ang="0">
+                  <a:pos x="connsiteX6" y="connsiteY6"/>
+                </a:cxn>
+                <a:cxn ang="0">
+                  <a:pos x="connsiteX7" y="connsiteY7"/>
+                </a:cxn>
+                <a:cxn ang="0">
+                  <a:pos x="connsiteX8" y="connsiteY8"/>
+                </a:cxn>
+                <a:cxn ang="0">
+                  <a:pos x="connsiteX9" y="connsiteY9"/>
+                </a:cxn>
+                <a:cxn ang="0">
+                  <a:pos x="connsiteX10" y="connsiteY10"/>
+                </a:cxn>
+                <a:cxn ang="0">
+                  <a:pos x="connsiteX11" y="connsiteY11"/>
+                </a:cxn>
+                <a:cxn ang="0">
+                  <a:pos x="connsiteX12" y="connsiteY12"/>
+                </a:cxn>
+                <a:cxn ang="0">
+                  <a:pos x="connsiteX13" y="connsiteY13"/>
+                </a:cxn>
+              </a:cxnLst>
+              <a:rect l="l" t="t" r="r" b="b"/>
+              <a:pathLst>
+                <a:path w="5270786" h="2927775">
+                  <a:moveTo>
+                    <a:pt x="0" y="0"/>
+                  </a:moveTo>
+                  <a:lnTo>
+                    <a:pt x="613805" y="0"/>
+                  </a:lnTo>
+                  <a:lnTo>
+                    <a:pt x="618487" y="85404"/>
+                  </a:lnTo>
+                  <a:cubicBezTo>
+                    <a:pt x="650052" y="360109"/>
+                    <a:pt x="792650" y="556543"/>
+                    <a:pt x="1054084" y="895200"/>
+                  </a:cubicBezTo>
+                  <a:cubicBezTo>
+                    <a:pt x="1126174" y="988542"/>
+                    <a:pt x="1200716" y="1085128"/>
+                    <a:pt x="1276976" y="1191325"/>
+                  </a:cubicBezTo>
+                  <a:cubicBezTo>
+                    <a:pt x="1859704" y="2002688"/>
+                    <a:pt x="2485223" y="2348843"/>
+                    <a:pt x="3368450" y="2348843"/>
+                  </a:cubicBezTo>
+                  <a:cubicBezTo>
+                    <a:pt x="3948114" y="2348843"/>
+                    <a:pt x="4373422" y="2066846"/>
+                    <a:pt x="4956151" y="1636730"/>
+                  </a:cubicBezTo>
+                  <a:cubicBezTo>
+                    <a:pt x="5021253" y="1588668"/>
+                    <a:pt x="5086356" y="1541186"/>
+                    <a:pt x="5149372" y="1495325"/>
+                  </a:cubicBezTo>
+                  <a:lnTo>
+                    <a:pt x="5270786" y="1406110"/>
+                  </a:lnTo>
+                  <a:lnTo>
+                    <a:pt x="5270786" y="2138641"/>
+                  </a:lnTo>
+                  <a:lnTo>
+                    <a:pt x="5112925" y="2253730"/>
+                  </a:lnTo>
+                  <a:cubicBezTo>
+                    <a:pt x="4598179" y="2621786"/>
+                    <a:pt x="4074961" y="2927775"/>
+                    <a:pt x="3368327" y="2927775"/>
+                  </a:cubicBezTo>
+                  <a:cubicBezTo>
+                    <a:pt x="2170746" y="2927775"/>
+                    <a:pt x="1393203" y="2384512"/>
+                    <a:pt x="769646" y="1516288"/>
+                  </a:cubicBezTo>
+                  <a:cubicBezTo>
+                    <a:pt x="418850" y="1027932"/>
+                    <a:pt x="48120" y="683401"/>
+                    <a:pt x="3149" y="85252"/>
+                  </a:cubicBezTo>
+                  <a:close/>
+                </a:path>
+              </a:pathLst>
+            </a:custGeom>
+            <a:gradFill>
+              <a:gsLst>
+                <a:gs pos="2000">
+                  <a:schemeClr val="bg1">
+                    <a:alpha val="10000"/>
+                  </a:schemeClr>
+                </a:gs>
+                <a:gs pos="16000">
+                  <a:schemeClr val="accent6">
+                    <a:alpha val="10000"/>
+                  </a:schemeClr>
+                </a:gs>
+                <a:gs pos="100000">
+                  <a:schemeClr val="bg1">
+                    <a:alpha val="10000"/>
+                  </a:schemeClr>
+                </a:gs>
+                <a:gs pos="85000">
+                  <a:schemeClr val="accent1">
+                    <a:alpha val="10000"/>
+                  </a:schemeClr>
+                </a:gs>
+              </a:gsLst>
+              <a:lin ang="12000000" scaled="0"/>
+            </a:gradFill>
+            <a:ln>
+              <a:noFill/>
+            </a:ln>
+          </p:spPr>
+          <p:style>
+            <a:lnRef idx="2">
+              <a:schemeClr val="accent1">
+                <a:shade val="50000"/>
+              </a:schemeClr>
+            </a:lnRef>
+            <a:fillRef idx="1">
+              <a:schemeClr val="accent1"/>
+            </a:fillRef>
+            <a:effectRef idx="0">
+              <a:schemeClr val="accent1"/>
+            </a:effectRef>
+            <a:fontRef idx="minor">
+              <a:schemeClr val="lt1"/>
+            </a:fontRef>
+          </p:style>
+          <p:txBody>
+            <a:bodyPr rtlCol="0" anchor="ctr"/>
+            <a:lstStyle/>
+            <a:p>
+              <a:pPr algn="ctr"/>
+              <a:endParaRPr lang="en-US"/>
+            </a:p>
+          </p:txBody>
+        </p:sp>
+        <p:sp>
+          <p:nvSpPr>
+            <p:cNvPr id="15" name="Freeform: Shape 14">
+              <a:extLst>
+                <a:ext uri="{FF2B5EF4-FFF2-40B4-BE49-F238E27FC236}">
+                  <a16:creationId xmlns:a16="http://schemas.microsoft.com/office/drawing/2014/main" id="{FBA3A17F-F3BD-4B94-9CC8-006700210FA6}"/>
+                </a:ext>
+                <a:ext uri="{C183D7F6-B498-43B3-948B-1728B52AA6E4}">
+                  <adec:decorative xmlns:adec="http://schemas.microsoft.com/office/drawing/2017/decorative" val="1"/>
+                </a:ext>
+              </a:extLst>
+            </p:cNvPr>
+            <p:cNvSpPr/>
+            <p:nvPr>
+              <p:extLst>
+                <p:ext uri="{386F3935-93C4-4BCD-93E2-E3B085C9AB24}">
+                  <p16:designElem xmlns:p16="http://schemas.microsoft.com/office/powerpoint/2015/main" val="1"/>
+                </p:ext>
+              </p:extLst>
+            </p:nvPr>
+          </p:nvSpPr>
+          <p:spPr>
+            <a:xfrm>
+              <a:off x="6921214" y="-1"/>
+              <a:ext cx="5270786" cy="2927775"/>
+            </a:xfrm>
+            <a:custGeom>
+              <a:avLst/>
+              <a:gdLst>
+                <a:gd name="connsiteX0" fmla="*/ 0 w 5270786"/>
+                <a:gd name="connsiteY0" fmla="*/ 0 h 2927775"/>
+                <a:gd name="connsiteX1" fmla="*/ 736294 w 5270786"/>
+                <a:gd name="connsiteY1" fmla="*/ 0 h 2927775"/>
+                <a:gd name="connsiteX2" fmla="*/ 740298 w 5270786"/>
+                <a:gd name="connsiteY2" fmla="*/ 72745 h 2927775"/>
+                <a:gd name="connsiteX3" fmla="*/ 1153024 w 5270786"/>
+                <a:gd name="connsiteY3" fmla="*/ 826989 h 2927775"/>
+                <a:gd name="connsiteX4" fmla="*/ 1378368 w 5270786"/>
+                <a:gd name="connsiteY4" fmla="*/ 1126356 h 2927775"/>
+                <a:gd name="connsiteX5" fmla="*/ 2238056 w 5270786"/>
+                <a:gd name="connsiteY5" fmla="*/ 1955322 h 2927775"/>
+                <a:gd name="connsiteX6" fmla="*/ 3368327 w 5270786"/>
+                <a:gd name="connsiteY6" fmla="*/ 2233033 h 2927775"/>
+                <a:gd name="connsiteX7" fmla="*/ 4095360 w 5270786"/>
+                <a:gd name="connsiteY7" fmla="*/ 2056192 h 2927775"/>
+                <a:gd name="connsiteX8" fmla="*/ 4880506 w 5270786"/>
+                <a:gd name="connsiteY8" fmla="*/ 1545587 h 2927775"/>
+                <a:gd name="connsiteX9" fmla="*/ 5074340 w 5270786"/>
+                <a:gd name="connsiteY9" fmla="*/ 1403721 h 2927775"/>
+                <a:gd name="connsiteX10" fmla="*/ 5270786 w 5270786"/>
+                <a:gd name="connsiteY10" fmla="*/ 1259367 h 2927775"/>
+                <a:gd name="connsiteX11" fmla="*/ 5270786 w 5270786"/>
+                <a:gd name="connsiteY11" fmla="*/ 2138641 h 2927775"/>
+                <a:gd name="connsiteX12" fmla="*/ 5112925 w 5270786"/>
+                <a:gd name="connsiteY12" fmla="*/ 2253730 h 2927775"/>
+                <a:gd name="connsiteX13" fmla="*/ 3368327 w 5270786"/>
+                <a:gd name="connsiteY13" fmla="*/ 2927775 h 2927775"/>
+                <a:gd name="connsiteX14" fmla="*/ 769646 w 5270786"/>
+                <a:gd name="connsiteY14" fmla="*/ 1516288 h 2927775"/>
+                <a:gd name="connsiteX15" fmla="*/ 3149 w 5270786"/>
+                <a:gd name="connsiteY15" fmla="*/ 85252 h 2927775"/>
+              </a:gdLst>
+              <a:ahLst/>
+              <a:cxnLst>
+                <a:cxn ang="0">
+                  <a:pos x="connsiteX0" y="connsiteY0"/>
+                </a:cxn>
+                <a:cxn ang="0">
+                  <a:pos x="connsiteX1" y="connsiteY1"/>
+                </a:cxn>
+                <a:cxn ang="0">
+                  <a:pos x="connsiteX2" y="connsiteY2"/>
+                </a:cxn>
+                <a:cxn ang="0">
+                  <a:pos x="connsiteX3" y="connsiteY3"/>
+                </a:cxn>
+                <a:cxn ang="0">
+                  <a:pos x="connsiteX4" y="connsiteY4"/>
+                </a:cxn>
+                <a:cxn ang="0">
+                  <a:pos x="connsiteX5" y="connsiteY5"/>
+                </a:cxn>
+                <a:cxn ang="0">
+                  <a:pos x="connsiteX6" y="connsiteY6"/>
+                </a:cxn>
+                <a:cxn ang="0">
+                  <a:pos x="connsiteX7" y="connsiteY7"/>
+                </a:cxn>
+                <a:cxn ang="0">
+                  <a:pos x="connsiteX8" y="connsiteY8"/>
+                </a:cxn>
+                <a:cxn ang="0">
+                  <a:pos x="connsiteX9" y="connsiteY9"/>
+                </a:cxn>
+                <a:cxn ang="0">
+                  <a:pos x="connsiteX10" y="connsiteY10"/>
+                </a:cxn>
+                <a:cxn ang="0">
+                  <a:pos x="connsiteX11" y="connsiteY11"/>
+                </a:cxn>
+                <a:cxn ang="0">
+                  <a:pos x="connsiteX12" y="connsiteY12"/>
+                </a:cxn>
+                <a:cxn ang="0">
+                  <a:pos x="connsiteX13" y="connsiteY13"/>
+                </a:cxn>
+                <a:cxn ang="0">
+                  <a:pos x="connsiteX14" y="connsiteY14"/>
+                </a:cxn>
+                <a:cxn ang="0">
+                  <a:pos x="connsiteX15" y="connsiteY15"/>
+                </a:cxn>
+              </a:cxnLst>
+              <a:rect l="l" t="t" r="r" b="b"/>
+              <a:pathLst>
+                <a:path w="5270786" h="2927775">
+                  <a:moveTo>
+                    <a:pt x="0" y="0"/>
+                  </a:moveTo>
+                  <a:lnTo>
+                    <a:pt x="736294" y="0"/>
+                  </a:lnTo>
+                  <a:lnTo>
+                    <a:pt x="740298" y="72745"/>
+                  </a:lnTo>
+                  <a:cubicBezTo>
+                    <a:pt x="768839" y="319371"/>
+                    <a:pt x="898885" y="497858"/>
+                    <a:pt x="1153024" y="826989"/>
+                  </a:cubicBezTo>
+                  <a:cubicBezTo>
+                    <a:pt x="1225727" y="921142"/>
+                    <a:pt x="1300882" y="1018537"/>
+                    <a:pt x="1378368" y="1126356"/>
+                  </a:cubicBezTo>
+                  <a:cubicBezTo>
+                    <a:pt x="1652384" y="1507833"/>
+                    <a:pt x="1933512" y="1779060"/>
+                    <a:pt x="2238056" y="1955322"/>
+                  </a:cubicBezTo>
+                  <a:cubicBezTo>
+                    <a:pt x="2560868" y="2142238"/>
+                    <a:pt x="2930637" y="2233033"/>
+                    <a:pt x="3368327" y="2233033"/>
+                  </a:cubicBezTo>
+                  <a:cubicBezTo>
+                    <a:pt x="3616720" y="2233033"/>
+                    <a:pt x="3847703" y="2176866"/>
+                    <a:pt x="4095360" y="2056192"/>
+                  </a:cubicBezTo>
+                  <a:cubicBezTo>
+                    <a:pt x="4349636" y="1932276"/>
+                    <a:pt x="4601340" y="1751613"/>
+                    <a:pt x="4880506" y="1545587"/>
+                  </a:cubicBezTo>
+                  <a:cubicBezTo>
+                    <a:pt x="4945974" y="1497295"/>
+                    <a:pt x="5011199" y="1449697"/>
+                    <a:pt x="5074340" y="1403721"/>
+                  </a:cubicBezTo>
+                  <a:lnTo>
+                    <a:pt x="5270786" y="1259367"/>
+                  </a:lnTo>
+                  <a:lnTo>
+                    <a:pt x="5270786" y="2138641"/>
+                  </a:lnTo>
+                  <a:lnTo>
+                    <a:pt x="5112925" y="2253730"/>
+                  </a:lnTo>
+                  <a:cubicBezTo>
+                    <a:pt x="4598179" y="2621786"/>
+                    <a:pt x="4074961" y="2927775"/>
+                    <a:pt x="3368327" y="2927775"/>
+                  </a:cubicBezTo>
+                  <a:cubicBezTo>
+                    <a:pt x="2170746" y="2927775"/>
+                    <a:pt x="1393203" y="2384512"/>
+                    <a:pt x="769646" y="1516288"/>
+                  </a:cubicBezTo>
+                  <a:cubicBezTo>
+                    <a:pt x="418850" y="1027932"/>
+                    <a:pt x="48120" y="683401"/>
+                    <a:pt x="3149" y="85252"/>
+                  </a:cubicBezTo>
+                  <a:close/>
+                </a:path>
+              </a:pathLst>
+            </a:custGeom>
+            <a:gradFill>
+              <a:gsLst>
+                <a:gs pos="2000">
+                  <a:schemeClr val="bg1">
+                    <a:alpha val="10000"/>
+                  </a:schemeClr>
+                </a:gs>
+                <a:gs pos="16000">
+                  <a:schemeClr val="accent6">
+                    <a:alpha val="10000"/>
+                  </a:schemeClr>
+                </a:gs>
+                <a:gs pos="100000">
+                  <a:schemeClr val="bg1">
+                    <a:alpha val="10000"/>
+                  </a:schemeClr>
+                </a:gs>
+                <a:gs pos="85000">
+                  <a:schemeClr val="accent1">
+                    <a:alpha val="10000"/>
+                  </a:schemeClr>
+                </a:gs>
+              </a:gsLst>
+              <a:lin ang="12000000" scaled="0"/>
+            </a:gradFill>
+            <a:ln>
+              <a:noFill/>
+            </a:ln>
+          </p:spPr>
+          <p:style>
+            <a:lnRef idx="2">
+              <a:schemeClr val="accent1">
+                <a:shade val="50000"/>
+              </a:schemeClr>
+            </a:lnRef>
+            <a:fillRef idx="1">
+              <a:schemeClr val="accent1"/>
+            </a:fillRef>
+            <a:effectRef idx="0">
+              <a:schemeClr val="accent1"/>
+            </a:effectRef>
+            <a:fontRef idx="minor">
+              <a:schemeClr val="lt1"/>
+            </a:fontRef>
+          </p:style>
+          <p:txBody>
+            <a:bodyPr rtlCol="0" anchor="ctr"/>
+            <a:lstStyle/>
+            <a:p>
+              <a:pPr algn="ctr"/>
+              <a:endParaRPr lang="en-US"/>
+            </a:p>
+          </p:txBody>
+        </p:sp>
+      </p:grpSp>
+      <p:grpSp>
+        <p:nvGrpSpPr>
+          <p:cNvPr id="17" name="Group 16">
+            <a:extLst>
+              <a:ext uri="{FF2B5EF4-FFF2-40B4-BE49-F238E27FC236}">
+                <a16:creationId xmlns:a16="http://schemas.microsoft.com/office/drawing/2014/main" id="{CD0398DD-AD75-4E2B-A3C6-35073082A8B4}"/>
+              </a:ext>
+              <a:ext uri="{C183D7F6-B498-43B3-948B-1728B52AA6E4}">
+                <adec:decorative xmlns:adec="http://schemas.microsoft.com/office/drawing/2017/decorative" val="1"/>
+              </a:ext>
+            </a:extLst>
+          </p:cNvPr>
+          <p:cNvGrpSpPr>
+            <a:grpSpLocks noGrp="1" noUngrp="1" noRot="1" noChangeAspect="1" noMove="1" noResize="1"/>
+          </p:cNvGrpSpPr>
+          <p:nvPr>
+            <p:extLst>
+              <p:ext uri="{386F3935-93C4-4BCD-93E2-E3B085C9AB24}">
+                <p16:designElem xmlns:p16="http://schemas.microsoft.com/office/powerpoint/2015/main" val="1"/>
+              </p:ext>
+            </p:extLst>
+          </p:nvPr>
+        </p:nvGrpSpPr>
+        <p:grpSpPr>
+          <a:xfrm rot="16200000">
+            <a:off x="-456265" y="3658536"/>
+            <a:ext cx="3655725" cy="2743201"/>
+            <a:chOff x="-305" y="-1"/>
+            <a:chExt cx="3832880" cy="2876136"/>
+          </a:xfrm>
+        </p:grpSpPr>
+        <p:sp>
+          <p:nvSpPr>
+            <p:cNvPr id="18" name="Freeform: Shape 17">
+              <a:extLst>
+                <a:ext uri="{FF2B5EF4-FFF2-40B4-BE49-F238E27FC236}">
+                  <a16:creationId xmlns:a16="http://schemas.microsoft.com/office/drawing/2014/main" id="{03E4F247-A844-4CD1-A37E-B7EA0DA2DBC3}"/>
+                </a:ext>
+                <a:ext uri="{C183D7F6-B498-43B3-948B-1728B52AA6E4}">
+                  <adec:decorative xmlns:adec="http://schemas.microsoft.com/office/drawing/2017/decorative" val="1"/>
+                </a:ext>
+              </a:extLst>
+            </p:cNvPr>
+            <p:cNvSpPr/>
+            <p:nvPr>
+              <p:extLst>
+                <p:ext uri="{386F3935-93C4-4BCD-93E2-E3B085C9AB24}">
+                  <p16:designElem xmlns:p16="http://schemas.microsoft.com/office/powerpoint/2015/main" val="1"/>
+                </p:ext>
+              </p:extLst>
+            </p:nvPr>
+          </p:nvSpPr>
+          <p:spPr>
+            <a:xfrm>
+              <a:off x="305" y="1"/>
+              <a:ext cx="3815424" cy="2653659"/>
+            </a:xfrm>
+            <a:custGeom>
+              <a:avLst/>
+              <a:gdLst>
+                <a:gd name="connsiteX0" fmla="*/ 3203055 w 3815424"/>
+                <a:gd name="connsiteY0" fmla="*/ 0 h 2653659"/>
+                <a:gd name="connsiteX1" fmla="*/ 3815424 w 3815424"/>
+                <a:gd name="connsiteY1" fmla="*/ 0 h 2653659"/>
+                <a:gd name="connsiteX2" fmla="*/ 3801025 w 3815424"/>
+                <a:gd name="connsiteY2" fmla="*/ 214243 h 2653659"/>
+                <a:gd name="connsiteX3" fmla="*/ 587142 w 3815424"/>
+                <a:gd name="connsiteY3" fmla="*/ 2653659 h 2653659"/>
+                <a:gd name="connsiteX4" fmla="*/ 53389 w 3815424"/>
+                <a:gd name="connsiteY4" fmla="*/ 2605041 h 2653659"/>
+                <a:gd name="connsiteX5" fmla="*/ 0 w 3815424"/>
+                <a:gd name="connsiteY5" fmla="*/ 2593136 h 2653659"/>
+                <a:gd name="connsiteX6" fmla="*/ 0 w 3815424"/>
+                <a:gd name="connsiteY6" fmla="*/ 1994836 h 2653659"/>
+                <a:gd name="connsiteX7" fmla="*/ 159710 w 3815424"/>
+                <a:gd name="connsiteY7" fmla="*/ 2035054 h 2653659"/>
+                <a:gd name="connsiteX8" fmla="*/ 587142 w 3815424"/>
+                <a:gd name="connsiteY8" fmla="*/ 2075152 h 2653659"/>
+                <a:gd name="connsiteX9" fmla="*/ 1549283 w 3815424"/>
+                <a:gd name="connsiteY9" fmla="*/ 1900153 h 2653659"/>
+                <a:gd name="connsiteX10" fmla="*/ 2406698 w 3815424"/>
+                <a:gd name="connsiteY10" fmla="*/ 1418450 h 2653659"/>
+                <a:gd name="connsiteX11" fmla="*/ 2996069 w 3815424"/>
+                <a:gd name="connsiteY11" fmla="*/ 728678 h 2653659"/>
+                <a:gd name="connsiteX12" fmla="*/ 3193967 w 3815424"/>
+                <a:gd name="connsiteY12" fmla="*/ 137719 h 2653659"/>
+              </a:gdLst>
+              <a:ahLst/>
+              <a:cxnLst>
+                <a:cxn ang="0">
+                  <a:pos x="connsiteX0" y="connsiteY0"/>
+                </a:cxn>
+                <a:cxn ang="0">
+                  <a:pos x="connsiteX1" y="connsiteY1"/>
+                </a:cxn>
+                <a:cxn ang="0">
+                  <a:pos x="connsiteX2" y="connsiteY2"/>
+                </a:cxn>
+                <a:cxn ang="0">
+                  <a:pos x="connsiteX3" y="connsiteY3"/>
+                </a:cxn>
+                <a:cxn ang="0">
+                  <a:pos x="connsiteX4" y="connsiteY4"/>
+                </a:cxn>
+                <a:cxn ang="0">
+                  <a:pos x="connsiteX5" y="connsiteY5"/>
+                </a:cxn>
+                <a:cxn ang="0">
+                  <a:pos x="connsiteX6" y="connsiteY6"/>
+                </a:cxn>
+                <a:cxn ang="0">
+                  <a:pos x="connsiteX7" y="connsiteY7"/>
+                </a:cxn>
+                <a:cxn ang="0">
+                  <a:pos x="connsiteX8" y="connsiteY8"/>
+                </a:cxn>
+                <a:cxn ang="0">
+                  <a:pos x="connsiteX9" y="connsiteY9"/>
+                </a:cxn>
+                <a:cxn ang="0">
+                  <a:pos x="connsiteX10" y="connsiteY10"/>
+                </a:cxn>
+                <a:cxn ang="0">
+                  <a:pos x="connsiteX11" y="connsiteY11"/>
+                </a:cxn>
+                <a:cxn ang="0">
+                  <a:pos x="connsiteX12" y="connsiteY12"/>
+                </a:cxn>
+              </a:cxnLst>
+              <a:rect l="l" t="t" r="r" b="b"/>
+              <a:pathLst>
+                <a:path w="3815424" h="2653659">
+                  <a:moveTo>
+                    <a:pt x="3203055" y="0"/>
+                  </a:moveTo>
+                  <a:lnTo>
+                    <a:pt x="3815424" y="0"/>
+                  </a:lnTo>
+                  <a:lnTo>
+                    <a:pt x="3801025" y="214243"/>
+                  </a:lnTo>
+                  <a:cubicBezTo>
+                    <a:pt x="3616317" y="1584467"/>
+                    <a:pt x="2091637" y="2653659"/>
+                    <a:pt x="587142" y="2653659"/>
+                  </a:cubicBezTo>
+                  <a:cubicBezTo>
+                    <a:pt x="400192" y="2653659"/>
+                    <a:pt x="222112" y="2636953"/>
+                    <a:pt x="53389" y="2605041"/>
+                  </a:cubicBezTo>
+                  <a:lnTo>
+                    <a:pt x="0" y="2593136"/>
+                  </a:lnTo>
+                  <a:lnTo>
+                    <a:pt x="0" y="1994836"/>
+                  </a:lnTo>
+                  <a:lnTo>
+                    <a:pt x="159710" y="2035054"/>
+                  </a:lnTo>
+                  <a:cubicBezTo>
+                    <a:pt x="295467" y="2061726"/>
+                    <a:pt x="438268" y="2075152"/>
+                    <a:pt x="587142" y="2075152"/>
+                  </a:cubicBezTo>
+                  <a:cubicBezTo>
+                    <a:pt x="901731" y="2075152"/>
+                    <a:pt x="1234490" y="2014697"/>
+                    <a:pt x="1549283" y="1900153"/>
+                  </a:cubicBezTo>
+                  <a:cubicBezTo>
+                    <a:pt x="1860709" y="1786959"/>
+                    <a:pt x="2157231" y="1620350"/>
+                    <a:pt x="2406698" y="1418450"/>
+                  </a:cubicBezTo>
+                  <a:cubicBezTo>
+                    <a:pt x="2655859" y="1216840"/>
+                    <a:pt x="2859596" y="978302"/>
+                    <a:pt x="2996069" y="728678"/>
+                  </a:cubicBezTo>
+                  <a:cubicBezTo>
+                    <a:pt x="3101178" y="536396"/>
+                    <a:pt x="3167417" y="338366"/>
+                    <a:pt x="3193967" y="137719"/>
+                  </a:cubicBezTo>
+                  <a:close/>
+                </a:path>
+              </a:pathLst>
+            </a:custGeom>
+            <a:gradFill>
+              <a:gsLst>
+                <a:gs pos="2000">
+                  <a:schemeClr val="bg1">
+                    <a:alpha val="10000"/>
+                  </a:schemeClr>
+                </a:gs>
+                <a:gs pos="16000">
+                  <a:schemeClr val="accent6">
+                    <a:alpha val="10000"/>
+                  </a:schemeClr>
+                </a:gs>
+                <a:gs pos="100000">
+                  <a:schemeClr val="bg1">
+                    <a:alpha val="10000"/>
+                  </a:schemeClr>
+                </a:gs>
+                <a:gs pos="85000">
+                  <a:schemeClr val="accent1">
+                    <a:alpha val="10000"/>
+                  </a:schemeClr>
+                </a:gs>
+              </a:gsLst>
+              <a:lin ang="12000000" scaled="0"/>
+            </a:gradFill>
+            <a:ln>
+              <a:noFill/>
+            </a:ln>
+          </p:spPr>
+          <p:style>
+            <a:lnRef idx="2">
+              <a:schemeClr val="accent1">
+                <a:shade val="50000"/>
+              </a:schemeClr>
+            </a:lnRef>
+            <a:fillRef idx="1">
+              <a:schemeClr val="accent1"/>
+            </a:fillRef>
+            <a:effectRef idx="0">
+              <a:schemeClr val="accent1"/>
+            </a:effectRef>
+            <a:fontRef idx="minor">
+              <a:schemeClr val="lt1"/>
+            </a:fontRef>
+          </p:style>
+          <p:txBody>
+            <a:bodyPr rtlCol="0" anchor="ctr"/>
+            <a:lstStyle/>
+            <a:p>
+              <a:pPr algn="ctr"/>
+              <a:endParaRPr lang="en-US"/>
+            </a:p>
+          </p:txBody>
+        </p:sp>
+        <p:sp>
+          <p:nvSpPr>
+            <p:cNvPr id="19" name="Freeform: Shape 18">
+              <a:extLst>
+                <a:ext uri="{FF2B5EF4-FFF2-40B4-BE49-F238E27FC236}">
+                  <a16:creationId xmlns:a16="http://schemas.microsoft.com/office/drawing/2014/main" id="{E2387B1B-D4D3-493F-8D7A-C7A89DBD4AB8}"/>
+                </a:ext>
+                <a:ext uri="{C183D7F6-B498-43B3-948B-1728B52AA6E4}">
+                  <adec:decorative xmlns:adec="http://schemas.microsoft.com/office/drawing/2017/decorative" val="1"/>
+                </a:ext>
+              </a:extLst>
+            </p:cNvPr>
+            <p:cNvSpPr/>
+            <p:nvPr>
+              <p:extLst>
+                <p:ext uri="{386F3935-93C4-4BCD-93E2-E3B085C9AB24}">
+                  <p16:designElem xmlns:p16="http://schemas.microsoft.com/office/powerpoint/2015/main" val="1"/>
+                </p:ext>
+              </p:extLst>
+            </p:nvPr>
+          </p:nvSpPr>
+          <p:spPr>
+            <a:xfrm>
+              <a:off x="305" y="-1"/>
+              <a:ext cx="3815424" cy="2653660"/>
+            </a:xfrm>
+            <a:custGeom>
+              <a:avLst/>
+              <a:gdLst>
+                <a:gd name="connsiteX0" fmla="*/ 3305038 w 3815424"/>
+                <a:gd name="connsiteY0" fmla="*/ 0 h 2653660"/>
+                <a:gd name="connsiteX1" fmla="*/ 3815424 w 3815424"/>
+                <a:gd name="connsiteY1" fmla="*/ 0 h 2653660"/>
+                <a:gd name="connsiteX2" fmla="*/ 3801025 w 3815424"/>
+                <a:gd name="connsiteY2" fmla="*/ 214244 h 2653660"/>
+                <a:gd name="connsiteX3" fmla="*/ 587142 w 3815424"/>
+                <a:gd name="connsiteY3" fmla="*/ 2653660 h 2653660"/>
+                <a:gd name="connsiteX4" fmla="*/ 53389 w 3815424"/>
+                <a:gd name="connsiteY4" fmla="*/ 2605042 h 2653660"/>
+                <a:gd name="connsiteX5" fmla="*/ 0 w 3815424"/>
+                <a:gd name="connsiteY5" fmla="*/ 2593137 h 2653660"/>
+                <a:gd name="connsiteX6" fmla="*/ 0 w 3815424"/>
+                <a:gd name="connsiteY6" fmla="*/ 2094444 h 2653660"/>
+                <a:gd name="connsiteX7" fmla="*/ 137675 w 3815424"/>
+                <a:gd name="connsiteY7" fmla="*/ 2129195 h 2653660"/>
+                <a:gd name="connsiteX8" fmla="*/ 587142 w 3815424"/>
+                <a:gd name="connsiteY8" fmla="*/ 2171571 h 2653660"/>
+                <a:gd name="connsiteX9" fmla="*/ 1585826 w 3815424"/>
+                <a:gd name="connsiteY9" fmla="*/ 1990112 h 2653660"/>
+                <a:gd name="connsiteX10" fmla="*/ 2473046 w 3815424"/>
+                <a:gd name="connsiteY10" fmla="*/ 1491633 h 2653660"/>
+                <a:gd name="connsiteX11" fmla="*/ 3086710 w 3815424"/>
+                <a:gd name="connsiteY11" fmla="*/ 772838 h 2653660"/>
+                <a:gd name="connsiteX12" fmla="*/ 3295217 w 3815424"/>
+                <a:gd name="connsiteY12" fmla="*/ 149229 h 2653660"/>
+              </a:gdLst>
+              <a:ahLst/>
+              <a:cxnLst>
+                <a:cxn ang="0">
+                  <a:pos x="connsiteX0" y="connsiteY0"/>
+                </a:cxn>
+                <a:cxn ang="0">
+                  <a:pos x="connsiteX1" y="connsiteY1"/>
+                </a:cxn>
+                <a:cxn ang="0">
+                  <a:pos x="connsiteX2" y="connsiteY2"/>
+                </a:cxn>
+                <a:cxn ang="0">
+                  <a:pos x="connsiteX3" y="connsiteY3"/>
+                </a:cxn>
+                <a:cxn ang="0">
+                  <a:pos x="connsiteX4" y="connsiteY4"/>
+                </a:cxn>
+                <a:cxn ang="0">
+                  <a:pos x="connsiteX5" y="connsiteY5"/>
+                </a:cxn>
+                <a:cxn ang="0">
+                  <a:pos x="connsiteX6" y="connsiteY6"/>
+                </a:cxn>
+                <a:cxn ang="0">
+                  <a:pos x="connsiteX7" y="connsiteY7"/>
+                </a:cxn>
+                <a:cxn ang="0">
+                  <a:pos x="connsiteX8" y="connsiteY8"/>
+                </a:cxn>
+                <a:cxn ang="0">
+                  <a:pos x="connsiteX9" y="connsiteY9"/>
+                </a:cxn>
+                <a:cxn ang="0">
+                  <a:pos x="connsiteX10" y="connsiteY10"/>
+                </a:cxn>
+                <a:cxn ang="0">
+                  <a:pos x="connsiteX11" y="connsiteY11"/>
+                </a:cxn>
+                <a:cxn ang="0">
+                  <a:pos x="connsiteX12" y="connsiteY12"/>
+                </a:cxn>
+              </a:cxnLst>
+              <a:rect l="l" t="t" r="r" b="b"/>
+              <a:pathLst>
+                <a:path w="3815424" h="2653660">
+                  <a:moveTo>
+                    <a:pt x="3305038" y="0"/>
+                  </a:moveTo>
+                  <a:lnTo>
+                    <a:pt x="3815424" y="0"/>
+                  </a:lnTo>
+                  <a:lnTo>
+                    <a:pt x="3801025" y="214244"/>
+                  </a:lnTo>
+                  <a:cubicBezTo>
+                    <a:pt x="3616317" y="1584467"/>
+                    <a:pt x="2091637" y="2653660"/>
+                    <a:pt x="587142" y="2653660"/>
+                  </a:cubicBezTo>
+                  <a:cubicBezTo>
+                    <a:pt x="400192" y="2653660"/>
+                    <a:pt x="222112" y="2636954"/>
+                    <a:pt x="53389" y="2605042"/>
+                  </a:cubicBezTo>
+                  <a:lnTo>
+                    <a:pt x="0" y="2593137"/>
+                  </a:lnTo>
+                  <a:lnTo>
+                    <a:pt x="0" y="2094444"/>
+                  </a:lnTo>
+                  <a:lnTo>
+                    <a:pt x="137675" y="2129195"/>
+                  </a:lnTo>
+                  <a:cubicBezTo>
+                    <a:pt x="280616" y="2157374"/>
+                    <a:pt x="430766" y="2171571"/>
+                    <a:pt x="587142" y="2171571"/>
+                  </a:cubicBezTo>
+                  <a:cubicBezTo>
+                    <a:pt x="918879" y="2171571"/>
+                    <a:pt x="1254904" y="2110634"/>
+                    <a:pt x="1585826" y="1990112"/>
+                  </a:cubicBezTo>
+                  <a:cubicBezTo>
+                    <a:pt x="1908071" y="1873061"/>
+                    <a:pt x="2214800" y="1700666"/>
+                    <a:pt x="2473046" y="1491633"/>
+                  </a:cubicBezTo>
+                  <a:cubicBezTo>
+                    <a:pt x="2735782" y="1279031"/>
+                    <a:pt x="2942276" y="1037118"/>
+                    <a:pt x="3086710" y="772838"/>
+                  </a:cubicBezTo>
+                  <a:cubicBezTo>
+                    <a:pt x="3197408" y="570216"/>
+                    <a:pt x="3267226" y="361248"/>
+                    <a:pt x="3295217" y="149229"/>
+                  </a:cubicBezTo>
+                  <a:close/>
+                </a:path>
+              </a:pathLst>
+            </a:custGeom>
+            <a:gradFill>
+              <a:gsLst>
+                <a:gs pos="2000">
+                  <a:schemeClr val="bg1">
+                    <a:alpha val="10000"/>
+                  </a:schemeClr>
+                </a:gs>
+                <a:gs pos="16000">
+                  <a:schemeClr val="accent6">
+                    <a:alpha val="10000"/>
+                  </a:schemeClr>
+                </a:gs>
+                <a:gs pos="100000">
+                  <a:schemeClr val="bg1">
+                    <a:alpha val="10000"/>
+                  </a:schemeClr>
+                </a:gs>
+                <a:gs pos="85000">
+                  <a:schemeClr val="accent1">
+                    <a:alpha val="10000"/>
+                  </a:schemeClr>
+                </a:gs>
+              </a:gsLst>
+              <a:lin ang="12000000" scaled="0"/>
+            </a:gradFill>
+            <a:ln>
+              <a:noFill/>
+            </a:ln>
+          </p:spPr>
+          <p:style>
+            <a:lnRef idx="2">
+              <a:schemeClr val="accent1">
+                <a:shade val="50000"/>
+              </a:schemeClr>
+            </a:lnRef>
+            <a:fillRef idx="1">
+              <a:schemeClr val="accent1"/>
+            </a:fillRef>
+            <a:effectRef idx="0">
+              <a:schemeClr val="accent1"/>
+            </a:effectRef>
+            <a:fontRef idx="minor">
+              <a:schemeClr val="lt1"/>
+            </a:fontRef>
+          </p:style>
+          <p:txBody>
+            <a:bodyPr rtlCol="0" anchor="ctr"/>
+            <a:lstStyle/>
+            <a:p>
+              <a:pPr algn="ctr"/>
+              <a:endParaRPr lang="en-US"/>
+            </a:p>
+          </p:txBody>
+        </p:sp>
+        <p:sp>
+          <p:nvSpPr>
+            <p:cNvPr id="20" name="Freeform: Shape 19">
+              <a:extLst>
+                <a:ext uri="{FF2B5EF4-FFF2-40B4-BE49-F238E27FC236}">
+                  <a16:creationId xmlns:a16="http://schemas.microsoft.com/office/drawing/2014/main" id="{C3404477-1F13-4859-84DA-12A303ACAD01}"/>
+                </a:ext>
+                <a:ext uri="{C183D7F6-B498-43B3-948B-1728B52AA6E4}">
+                  <adec:decorative xmlns:adec="http://schemas.microsoft.com/office/drawing/2017/decorative" val="1"/>
+                </a:ext>
+              </a:extLst>
+            </p:cNvPr>
+            <p:cNvSpPr/>
+            <p:nvPr>
+              <p:extLst>
+                <p:ext uri="{386F3935-93C4-4BCD-93E2-E3B085C9AB24}">
+                  <p16:designElem xmlns:p16="http://schemas.microsoft.com/office/powerpoint/2015/main" val="1"/>
+                </p:ext>
+              </p:extLst>
+            </p:nvPr>
+          </p:nvSpPr>
+          <p:spPr>
+            <a:xfrm>
+              <a:off x="-305" y="1"/>
+              <a:ext cx="3815986" cy="2675935"/>
+            </a:xfrm>
+            <a:custGeom>
+              <a:avLst/>
+              <a:gdLst>
+                <a:gd name="connsiteX0" fmla="*/ 3648768 w 3815986"/>
+                <a:gd name="connsiteY0" fmla="*/ 0 h 2675935"/>
+                <a:gd name="connsiteX1" fmla="*/ 3815986 w 3815986"/>
+                <a:gd name="connsiteY1" fmla="*/ 0 h 2675935"/>
+                <a:gd name="connsiteX2" fmla="*/ 3804695 w 3815986"/>
+                <a:gd name="connsiteY2" fmla="*/ 200084 h 2675935"/>
+                <a:gd name="connsiteX3" fmla="*/ 3762590 w 3815986"/>
+                <a:gd name="connsiteY3" fmla="*/ 455543 h 2675935"/>
+                <a:gd name="connsiteX4" fmla="*/ 3592332 w 3815986"/>
+                <a:gd name="connsiteY4" fmla="*/ 947274 h 2675935"/>
+                <a:gd name="connsiteX5" fmla="*/ 2953967 w 3815986"/>
+                <a:gd name="connsiteY5" fmla="*/ 1782349 h 2675935"/>
+                <a:gd name="connsiteX6" fmla="*/ 2530669 w 3815986"/>
+                <a:gd name="connsiteY6" fmla="*/ 2109494 h 2675935"/>
+                <a:gd name="connsiteX7" fmla="*/ 2057561 w 3815986"/>
+                <a:gd name="connsiteY7" fmla="*/ 2369245 h 2675935"/>
+                <a:gd name="connsiteX8" fmla="*/ 1007330 w 3815986"/>
+                <a:gd name="connsiteY8" fmla="*/ 2655701 h 2675935"/>
+                <a:gd name="connsiteX9" fmla="*/ 732765 w 3815986"/>
+                <a:gd name="connsiteY9" fmla="*/ 2674696 h 2675935"/>
+                <a:gd name="connsiteX10" fmla="*/ 457666 w 3815986"/>
+                <a:gd name="connsiteY10" fmla="*/ 2670839 h 2675935"/>
+                <a:gd name="connsiteX11" fmla="*/ 183574 w 3815986"/>
+                <a:gd name="connsiteY11" fmla="*/ 2643312 h 2675935"/>
+                <a:gd name="connsiteX12" fmla="*/ 0 w 3815986"/>
+                <a:gd name="connsiteY12" fmla="*/ 2607798 h 2675935"/>
+                <a:gd name="connsiteX13" fmla="*/ 0 w 3815986"/>
+                <a:gd name="connsiteY13" fmla="*/ 2356652 h 2675935"/>
+                <a:gd name="connsiteX14" fmla="*/ 222195 w 3815986"/>
+                <a:gd name="connsiteY14" fmla="*/ 2396940 h 2675935"/>
+                <a:gd name="connsiteX15" fmla="*/ 472364 w 3815986"/>
+                <a:gd name="connsiteY15" fmla="*/ 2419092 h 2675935"/>
+                <a:gd name="connsiteX16" fmla="*/ 974972 w 3815986"/>
+                <a:gd name="connsiteY16" fmla="*/ 2402122 h 2675935"/>
+                <a:gd name="connsiteX17" fmla="*/ 1468292 w 3815986"/>
+                <a:gd name="connsiteY17" fmla="*/ 2304162 h 2675935"/>
+                <a:gd name="connsiteX18" fmla="*/ 1940176 w 3815986"/>
+                <a:gd name="connsiteY18" fmla="*/ 2133695 h 2675935"/>
+                <a:gd name="connsiteX19" fmla="*/ 2783403 w 3815986"/>
+                <a:gd name="connsiteY19" fmla="*/ 1609954 h 2675935"/>
+                <a:gd name="connsiteX20" fmla="*/ 3128104 w 3815986"/>
+                <a:gd name="connsiteY20" fmla="*/ 1260439 h 2675935"/>
+                <a:gd name="connsiteX21" fmla="*/ 3400639 w 3815986"/>
+                <a:gd name="connsiteY21" fmla="*/ 859052 h 2675935"/>
+                <a:gd name="connsiteX22" fmla="*/ 3585595 w 3815986"/>
+                <a:gd name="connsiteY22" fmla="*/ 415336 h 2675935"/>
+                <a:gd name="connsiteX23" fmla="*/ 3635918 w 3815986"/>
+                <a:gd name="connsiteY23" fmla="*/ 181137 h 2675935"/>
+              </a:gdLst>
+              <a:ahLst/>
+              <a:cxnLst>
+                <a:cxn ang="0">
+                  <a:pos x="connsiteX0" y="connsiteY0"/>
+                </a:cxn>
+                <a:cxn ang="0">
+                  <a:pos x="connsiteX1" y="connsiteY1"/>
+                </a:cxn>
+                <a:cxn ang="0">
+                  <a:pos x="connsiteX2" y="connsiteY2"/>
+                </a:cxn>
+                <a:cxn ang="0">
+                  <a:pos x="connsiteX3" y="connsiteY3"/>
+                </a:cxn>
+                <a:cxn ang="0">
+                  <a:pos x="connsiteX4" y="connsiteY4"/>
+                </a:cxn>
+                <a:cxn ang="0">
+                  <a:pos x="connsiteX5" y="connsiteY5"/>
+                </a:cxn>
+                <a:cxn ang="0">
+                  <a:pos x="connsiteX6" y="connsiteY6"/>
+                </a:cxn>
+                <a:cxn ang="0">
+                  <a:pos x="connsiteX7" y="connsiteY7"/>
+                </a:cxn>
+                <a:cxn ang="0">
+                  <a:pos x="connsiteX8" y="connsiteY8"/>
+                </a:cxn>
+                <a:cxn ang="0">
+                  <a:pos x="connsiteX9" y="connsiteY9"/>
+                </a:cxn>
+                <a:cxn ang="0">
+                  <a:pos x="connsiteX10" y="connsiteY10"/>
+                </a:cxn>
+                <a:cxn ang="0">
+                  <a:pos x="connsiteX11" y="connsiteY11"/>
+                </a:cxn>
+                <a:cxn ang="0">
+                  <a:pos x="connsiteX12" y="connsiteY12"/>
+                </a:cxn>
+                <a:cxn ang="0">
+                  <a:pos x="connsiteX13" y="connsiteY13"/>
+                </a:cxn>
+                <a:cxn ang="0">
+                  <a:pos x="connsiteX14" y="connsiteY14"/>
+                </a:cxn>
+                <a:cxn ang="0">
+                  <a:pos x="connsiteX15" y="connsiteY15"/>
+                </a:cxn>
+                <a:cxn ang="0">
+                  <a:pos x="connsiteX16" y="connsiteY16"/>
+                </a:cxn>
+                <a:cxn ang="0">
+                  <a:pos x="connsiteX17" y="connsiteY17"/>
+                </a:cxn>
+                <a:cxn ang="0">
+                  <a:pos x="connsiteX18" y="connsiteY18"/>
+                </a:cxn>
+                <a:cxn ang="0">
+                  <a:pos x="connsiteX19" y="connsiteY19"/>
+                </a:cxn>
+                <a:cxn ang="0">
+                  <a:pos x="connsiteX20" y="connsiteY20"/>
+                </a:cxn>
+                <a:cxn ang="0">
+                  <a:pos x="connsiteX21" y="connsiteY21"/>
+                </a:cxn>
+                <a:cxn ang="0">
+                  <a:pos x="connsiteX22" y="connsiteY22"/>
+                </a:cxn>
+                <a:cxn ang="0">
+                  <a:pos x="connsiteX23" y="connsiteY23"/>
+                </a:cxn>
+              </a:cxnLst>
+              <a:rect l="l" t="t" r="r" b="b"/>
+              <a:pathLst>
+                <a:path w="3815986" h="2675935">
+                  <a:moveTo>
+                    <a:pt x="3648768" y="0"/>
+                  </a:moveTo>
+                  <a:lnTo>
+                    <a:pt x="3815986" y="0"/>
+                  </a:lnTo>
+                  <a:lnTo>
+                    <a:pt x="3804695" y="200084"/>
+                  </a:lnTo>
+                  <a:cubicBezTo>
+                    <a:pt x="3795228" y="285751"/>
+                    <a:pt x="3781167" y="371032"/>
+                    <a:pt x="3762590" y="455543"/>
+                  </a:cubicBezTo>
+                  <a:cubicBezTo>
+                    <a:pt x="3725537" y="624467"/>
+                    <a:pt x="3668784" y="790112"/>
+                    <a:pt x="3592332" y="947274"/>
+                  </a:cubicBezTo>
+                  <a:cubicBezTo>
+                    <a:pt x="3438712" y="1261596"/>
+                    <a:pt x="3216091" y="1542847"/>
+                    <a:pt x="2953967" y="1782349"/>
+                  </a:cubicBezTo>
+                  <a:cubicBezTo>
+                    <a:pt x="2822599" y="1902099"/>
+                    <a:pt x="2680615" y="2011341"/>
+                    <a:pt x="2530669" y="2109494"/>
+                  </a:cubicBezTo>
+                  <a:cubicBezTo>
+                    <a:pt x="2380520" y="2207551"/>
+                    <a:pt x="2222510" y="2294906"/>
+                    <a:pt x="2057561" y="2369245"/>
+                  </a:cubicBezTo>
+                  <a:cubicBezTo>
+                    <a:pt x="1727252" y="2516859"/>
+                    <a:pt x="1371629" y="2614434"/>
+                    <a:pt x="1007330" y="2655701"/>
+                  </a:cubicBezTo>
+                  <a:cubicBezTo>
+                    <a:pt x="916281" y="2665873"/>
+                    <a:pt x="824568" y="2672188"/>
+                    <a:pt x="732765" y="2674696"/>
+                  </a:cubicBezTo>
+                  <a:cubicBezTo>
+                    <a:pt x="640963" y="2677203"/>
+                    <a:pt x="549072" y="2675901"/>
+                    <a:pt x="457666" y="2670839"/>
+                  </a:cubicBezTo>
+                  <a:cubicBezTo>
+                    <a:pt x="366106" y="2665584"/>
+                    <a:pt x="274572" y="2656521"/>
+                    <a:pt x="183574" y="2643312"/>
+                  </a:cubicBezTo>
+                  <a:lnTo>
+                    <a:pt x="0" y="2607798"/>
+                  </a:lnTo>
+                  <a:lnTo>
+                    <a:pt x="0" y="2356652"/>
+                  </a:lnTo>
+                  <a:lnTo>
+                    <a:pt x="222195" y="2396940"/>
+                  </a:lnTo>
+                  <a:cubicBezTo>
+                    <a:pt x="304990" y="2407980"/>
+                    <a:pt x="388511" y="2415283"/>
+                    <a:pt x="472364" y="2419092"/>
+                  </a:cubicBezTo>
+                  <a:cubicBezTo>
+                    <a:pt x="640376" y="2427095"/>
+                    <a:pt x="808184" y="2421791"/>
+                    <a:pt x="974972" y="2402122"/>
+                  </a:cubicBezTo>
+                  <a:cubicBezTo>
+                    <a:pt x="1141658" y="2382358"/>
+                    <a:pt x="1306812" y="2349286"/>
+                    <a:pt x="1468292" y="2304162"/>
+                  </a:cubicBezTo>
+                  <a:cubicBezTo>
+                    <a:pt x="1629874" y="2259231"/>
+                    <a:pt x="1787475" y="2201091"/>
+                    <a:pt x="1940176" y="2133695"/>
+                  </a:cubicBezTo>
+                  <a:cubicBezTo>
+                    <a:pt x="2246498" y="2000349"/>
+                    <a:pt x="2532507" y="1823520"/>
+                    <a:pt x="2783403" y="1609954"/>
+                  </a:cubicBezTo>
+                  <a:cubicBezTo>
+                    <a:pt x="2908442" y="1502833"/>
+                    <a:pt x="3024295" y="1385975"/>
+                    <a:pt x="3128104" y="1260439"/>
+                  </a:cubicBezTo>
+                  <a:cubicBezTo>
+                    <a:pt x="3232116" y="1135096"/>
+                    <a:pt x="3323881" y="1000689"/>
+                    <a:pt x="3400639" y="859052"/>
+                  </a:cubicBezTo>
+                  <a:cubicBezTo>
+                    <a:pt x="3477399" y="717510"/>
+                    <a:pt x="3541296" y="569316"/>
+                    <a:pt x="3585595" y="415336"/>
+                  </a:cubicBezTo>
+                  <a:cubicBezTo>
+                    <a:pt x="3607796" y="338540"/>
+                    <a:pt x="3624638" y="260224"/>
+                    <a:pt x="3635918" y="181137"/>
+                  </a:cubicBezTo>
+                  <a:close/>
+                </a:path>
+              </a:pathLst>
+            </a:custGeom>
+            <a:gradFill>
+              <a:gsLst>
+                <a:gs pos="2000">
+                  <a:schemeClr val="bg1">
+                    <a:alpha val="10000"/>
+                  </a:schemeClr>
+                </a:gs>
+                <a:gs pos="16000">
+                  <a:schemeClr val="accent6">
+                    <a:alpha val="10000"/>
+                  </a:schemeClr>
+                </a:gs>
+                <a:gs pos="100000">
+                  <a:schemeClr val="bg1">
+                    <a:alpha val="10000"/>
+                  </a:schemeClr>
+                </a:gs>
+                <a:gs pos="85000">
+                  <a:schemeClr val="accent1">
+                    <a:alpha val="10000"/>
+                  </a:schemeClr>
+                </a:gs>
+              </a:gsLst>
+              <a:lin ang="12000000" scaled="0"/>
+            </a:gradFill>
+            <a:ln>
+              <a:noFill/>
+            </a:ln>
+          </p:spPr>
+          <p:style>
+            <a:lnRef idx="2">
+              <a:schemeClr val="accent1">
+                <a:shade val="50000"/>
+              </a:schemeClr>
+            </a:lnRef>
+            <a:fillRef idx="1">
+              <a:schemeClr val="accent1"/>
+            </a:fillRef>
+            <a:effectRef idx="0">
+              <a:schemeClr val="accent1"/>
+            </a:effectRef>
+            <a:fontRef idx="minor">
+              <a:schemeClr val="lt1"/>
+            </a:fontRef>
+          </p:style>
+          <p:txBody>
+            <a:bodyPr rtlCol="0" anchor="ctr"/>
+            <a:lstStyle/>
+            <a:p>
+              <a:pPr algn="ctr"/>
+              <a:endParaRPr lang="en-US"/>
+            </a:p>
+          </p:txBody>
+        </p:sp>
+        <p:sp>
+          <p:nvSpPr>
+            <p:cNvPr id="21" name="Freeform: Shape 20">
+              <a:extLst>
+                <a:ext uri="{FF2B5EF4-FFF2-40B4-BE49-F238E27FC236}">
+                  <a16:creationId xmlns:a16="http://schemas.microsoft.com/office/drawing/2014/main" id="{1B8C62FD-B708-4F00-80BB-1250C60119EE}"/>
+                </a:ext>
+                <a:ext uri="{C183D7F6-B498-43B3-948B-1728B52AA6E4}">
+                  <adec:decorative xmlns:adec="http://schemas.microsoft.com/office/drawing/2017/decorative" val="1"/>
+                </a:ext>
+              </a:extLst>
+            </p:cNvPr>
+            <p:cNvSpPr/>
+            <p:nvPr>
+              <p:extLst>
+                <p:ext uri="{386F3935-93C4-4BCD-93E2-E3B085C9AB24}">
+                  <p16:designElem xmlns:p16="http://schemas.microsoft.com/office/powerpoint/2015/main" val="1"/>
+                </p:ext>
+              </p:extLst>
+            </p:nvPr>
+          </p:nvSpPr>
+          <p:spPr>
+            <a:xfrm>
+              <a:off x="305" y="-1"/>
+              <a:ext cx="3832270" cy="2876136"/>
+            </a:xfrm>
+            <a:custGeom>
+              <a:avLst/>
+              <a:gdLst>
+                <a:gd name="connsiteX0" fmla="*/ 3800718 w 3832270"/>
+                <a:gd name="connsiteY0" fmla="*/ 0 h 2876136"/>
+                <a:gd name="connsiteX1" fmla="*/ 3832270 w 3832270"/>
+                <a:gd name="connsiteY1" fmla="*/ 0 h 2876136"/>
+                <a:gd name="connsiteX2" fmla="*/ 3824562 w 3832270"/>
+                <a:gd name="connsiteY2" fmla="*/ 143769 h 2876136"/>
+                <a:gd name="connsiteX3" fmla="*/ 3628155 w 3832270"/>
+                <a:gd name="connsiteY3" fmla="*/ 922055 h 2876136"/>
+                <a:gd name="connsiteX4" fmla="*/ 3514853 w 3832270"/>
+                <a:gd name="connsiteY4" fmla="*/ 1169078 h 2876136"/>
+                <a:gd name="connsiteX5" fmla="*/ 3379198 w 3832270"/>
+                <a:gd name="connsiteY5" fmla="*/ 1407037 h 2876136"/>
+                <a:gd name="connsiteX6" fmla="*/ 3043787 w 3832270"/>
+                <a:gd name="connsiteY6" fmla="*/ 1848342 h 2876136"/>
+                <a:gd name="connsiteX7" fmla="*/ 2845661 w 3832270"/>
+                <a:gd name="connsiteY7" fmla="*/ 2047444 h 2876136"/>
+                <a:gd name="connsiteX8" fmla="*/ 2793197 w 3832270"/>
+                <a:gd name="connsiteY8" fmla="*/ 2094689 h 2876136"/>
+                <a:gd name="connsiteX9" fmla="*/ 2739710 w 3832270"/>
+                <a:gd name="connsiteY9" fmla="*/ 2140969 h 2876136"/>
+                <a:gd name="connsiteX10" fmla="*/ 2629166 w 3832270"/>
+                <a:gd name="connsiteY10" fmla="*/ 2229867 h 2876136"/>
+                <a:gd name="connsiteX11" fmla="*/ 2145952 w 3832270"/>
+                <a:gd name="connsiteY11" fmla="*/ 2535994 h 2876136"/>
+                <a:gd name="connsiteX12" fmla="*/ 1034987 w 3832270"/>
+                <a:gd name="connsiteY12" fmla="*/ 2863910 h 2876136"/>
+                <a:gd name="connsiteX13" fmla="*/ 741909 w 3832270"/>
+                <a:gd name="connsiteY13" fmla="*/ 2875939 h 2876136"/>
+                <a:gd name="connsiteX14" fmla="*/ 450208 w 3832270"/>
+                <a:gd name="connsiteY14" fmla="*/ 2857451 h 2876136"/>
+                <a:gd name="connsiteX15" fmla="*/ 22215 w 3832270"/>
+                <a:gd name="connsiteY15" fmla="*/ 2775923 h 2876136"/>
+                <a:gd name="connsiteX16" fmla="*/ 0 w 3832270"/>
+                <a:gd name="connsiteY16" fmla="*/ 2769256 h 2876136"/>
+                <a:gd name="connsiteX17" fmla="*/ 0 w 3832270"/>
+                <a:gd name="connsiteY17" fmla="*/ 2590612 h 2876136"/>
+                <a:gd name="connsiteX18" fmla="*/ 199046 w 3832270"/>
+                <a:gd name="connsiteY18" fmla="*/ 2627410 h 2876136"/>
+                <a:gd name="connsiteX19" fmla="*/ 468174 w 3832270"/>
+                <a:gd name="connsiteY19" fmla="*/ 2649670 h 2876136"/>
+                <a:gd name="connsiteX20" fmla="*/ 1003650 w 3832270"/>
+                <a:gd name="connsiteY20" fmla="*/ 2622480 h 2876136"/>
+                <a:gd name="connsiteX21" fmla="*/ 1266489 w 3832270"/>
+                <a:gd name="connsiteY21" fmla="*/ 2573982 h 2876136"/>
+                <a:gd name="connsiteX22" fmla="*/ 1524223 w 3832270"/>
+                <a:gd name="connsiteY22" fmla="*/ 2504657 h 2876136"/>
+                <a:gd name="connsiteX23" fmla="*/ 1775731 w 3832270"/>
+                <a:gd name="connsiteY23" fmla="*/ 2416243 h 2876136"/>
+                <a:gd name="connsiteX24" fmla="*/ 2019789 w 3832270"/>
+                <a:gd name="connsiteY24" fmla="*/ 2309412 h 2876136"/>
+                <a:gd name="connsiteX25" fmla="*/ 2482486 w 3832270"/>
+                <a:gd name="connsiteY25" fmla="*/ 2046962 h 2876136"/>
+                <a:gd name="connsiteX26" fmla="*/ 2591908 w 3832270"/>
+                <a:gd name="connsiteY26" fmla="*/ 1971371 h 2876136"/>
+                <a:gd name="connsiteX27" fmla="*/ 2645702 w 3832270"/>
+                <a:gd name="connsiteY27" fmla="*/ 1932321 h 2876136"/>
+                <a:gd name="connsiteX28" fmla="*/ 2698779 w 3832270"/>
+                <a:gd name="connsiteY28" fmla="*/ 1892309 h 2876136"/>
+                <a:gd name="connsiteX29" fmla="*/ 2903537 w 3832270"/>
+                <a:gd name="connsiteY29" fmla="*/ 1722516 h 2876136"/>
+                <a:gd name="connsiteX30" fmla="*/ 3269061 w 3832270"/>
+                <a:gd name="connsiteY30" fmla="*/ 1337327 h 2876136"/>
+                <a:gd name="connsiteX31" fmla="*/ 3424928 w 3832270"/>
+                <a:gd name="connsiteY31" fmla="*/ 1122508 h 2876136"/>
+                <a:gd name="connsiteX32" fmla="*/ 3557622 w 3832270"/>
+                <a:gd name="connsiteY32" fmla="*/ 893226 h 2876136"/>
+                <a:gd name="connsiteX33" fmla="*/ 3587019 w 3832270"/>
+                <a:gd name="connsiteY33" fmla="*/ 833929 h 2876136"/>
+                <a:gd name="connsiteX34" fmla="*/ 3601310 w 3832270"/>
+                <a:gd name="connsiteY34" fmla="*/ 804040 h 2876136"/>
+                <a:gd name="connsiteX35" fmla="*/ 3614885 w 3832270"/>
+                <a:gd name="connsiteY35" fmla="*/ 773861 h 2876136"/>
+                <a:gd name="connsiteX36" fmla="*/ 3640812 w 3832270"/>
+                <a:gd name="connsiteY36" fmla="*/ 713022 h 2876136"/>
+                <a:gd name="connsiteX37" fmla="*/ 3665105 w 3832270"/>
+                <a:gd name="connsiteY37" fmla="*/ 651506 h 2876136"/>
+                <a:gd name="connsiteX38" fmla="*/ 3744110 w 3832270"/>
+                <a:gd name="connsiteY38" fmla="*/ 399567 h 2876136"/>
+                <a:gd name="connsiteX39" fmla="*/ 3792123 w 3832270"/>
+                <a:gd name="connsiteY39" fmla="*/ 140444 h 2876136"/>
+              </a:gdLst>
+              <a:ahLst/>
+              <a:cxnLst>
+                <a:cxn ang="0">
+                  <a:pos x="connsiteX0" y="connsiteY0"/>
+                </a:cxn>
+                <a:cxn ang="0">
+                  <a:pos x="connsiteX1" y="connsiteY1"/>
+                </a:cxn>
+                <a:cxn ang="0">
+                  <a:pos x="connsiteX2" y="connsiteY2"/>
+                </a:cxn>
+                <a:cxn ang="0">
+                  <a:pos x="connsiteX3" y="connsiteY3"/>
+                </a:cxn>
+                <a:cxn ang="0">
+                  <a:pos x="connsiteX4" y="connsiteY4"/>
+                </a:cxn>
+                <a:cxn ang="0">
+                  <a:pos x="connsiteX5" y="connsiteY5"/>
+                </a:cxn>
+                <a:cxn ang="0">
+                  <a:pos x="connsiteX6" y="connsiteY6"/>
+                </a:cxn>
+                <a:cxn ang="0">
+                  <a:pos x="connsiteX7" y="connsiteY7"/>
+                </a:cxn>
+                <a:cxn ang="0">
+                  <a:pos x="connsiteX8" y="connsiteY8"/>
+                </a:cxn>
+                <a:cxn ang="0">
+                  <a:pos x="connsiteX9" y="connsiteY9"/>
+                </a:cxn>
+                <a:cxn ang="0">
+                  <a:pos x="connsiteX10" y="connsiteY10"/>
+                </a:cxn>
+                <a:cxn ang="0">
+                  <a:pos x="connsiteX11" y="connsiteY11"/>
+                </a:cxn>
+                <a:cxn ang="0">
+                  <a:pos x="connsiteX12" y="connsiteY12"/>
+                </a:cxn>
+                <a:cxn ang="0">
+                  <a:pos x="connsiteX13" y="connsiteY13"/>
+                </a:cxn>
+                <a:cxn ang="0">
+                  <a:pos x="connsiteX14" y="connsiteY14"/>
+                </a:cxn>
+                <a:cxn ang="0">
+                  <a:pos x="connsiteX15" y="connsiteY15"/>
+                </a:cxn>
+                <a:cxn ang="0">
+                  <a:pos x="connsiteX16" y="connsiteY16"/>
+                </a:cxn>
+                <a:cxn ang="0">
+                  <a:pos x="connsiteX17" y="connsiteY17"/>
+                </a:cxn>
+                <a:cxn ang="0">
+                  <a:pos x="connsiteX18" y="connsiteY18"/>
+                </a:cxn>
+                <a:cxn ang="0">
+                  <a:pos x="connsiteX19" y="connsiteY19"/>
+                </a:cxn>
+                <a:cxn ang="0">
+                  <a:pos x="connsiteX20" y="connsiteY20"/>
+                </a:cxn>
+                <a:cxn ang="0">
+                  <a:pos x="connsiteX21" y="connsiteY21"/>
+                </a:cxn>
+                <a:cxn ang="0">
+                  <a:pos x="connsiteX22" y="connsiteY22"/>
+                </a:cxn>
+                <a:cxn ang="0">
+                  <a:pos x="connsiteX23" y="connsiteY23"/>
+                </a:cxn>
+                <a:cxn ang="0">
+                  <a:pos x="connsiteX24" y="connsiteY24"/>
+                </a:cxn>
+                <a:cxn ang="0">
+                  <a:pos x="connsiteX25" y="connsiteY25"/>
+                </a:cxn>
+                <a:cxn ang="0">
+                  <a:pos x="connsiteX26" y="connsiteY26"/>
+                </a:cxn>
+                <a:cxn ang="0">
+                  <a:pos x="connsiteX27" y="connsiteY27"/>
+                </a:cxn>
+                <a:cxn ang="0">
+                  <a:pos x="connsiteX28" y="connsiteY28"/>
+                </a:cxn>
+                <a:cxn ang="0">
+                  <a:pos x="connsiteX29" y="connsiteY29"/>
+                </a:cxn>
+                <a:cxn ang="0">
+                  <a:pos x="connsiteX30" y="connsiteY30"/>
+                </a:cxn>
+                <a:cxn ang="0">
+                  <a:pos x="connsiteX31" y="connsiteY31"/>
+                </a:cxn>
+                <a:cxn ang="0">
+                  <a:pos x="connsiteX32" y="connsiteY32"/>
+                </a:cxn>
+                <a:cxn ang="0">
+                  <a:pos x="connsiteX33" y="connsiteY33"/>
+                </a:cxn>
+                <a:cxn ang="0">
+                  <a:pos x="connsiteX34" y="connsiteY34"/>
+                </a:cxn>
+                <a:cxn ang="0">
+                  <a:pos x="connsiteX35" y="connsiteY35"/>
+                </a:cxn>
+                <a:cxn ang="0">
+                  <a:pos x="connsiteX36" y="connsiteY36"/>
+                </a:cxn>
+                <a:cxn ang="0">
+                  <a:pos x="connsiteX37" y="connsiteY37"/>
+                </a:cxn>
+                <a:cxn ang="0">
+                  <a:pos x="connsiteX38" y="connsiteY38"/>
+                </a:cxn>
+                <a:cxn ang="0">
+                  <a:pos x="connsiteX39" y="connsiteY39"/>
+                </a:cxn>
+              </a:cxnLst>
+              <a:rect l="l" t="t" r="r" b="b"/>
+              <a:pathLst>
+                <a:path w="3832270" h="2876136">
+                  <a:moveTo>
+                    <a:pt x="3800718" y="0"/>
+                  </a:moveTo>
+                  <a:lnTo>
+                    <a:pt x="3832270" y="0"/>
+                  </a:lnTo>
+                  <a:lnTo>
+                    <a:pt x="3824562" y="143769"/>
+                  </a:lnTo>
+                  <a:cubicBezTo>
+                    <a:pt x="3797131" y="409191"/>
+                    <a:pt x="3730585" y="671345"/>
+                    <a:pt x="3628155" y="922055"/>
+                  </a:cubicBezTo>
+                  <a:cubicBezTo>
+                    <a:pt x="3593858" y="1005553"/>
+                    <a:pt x="3556704" y="1088280"/>
+                    <a:pt x="3514853" y="1169078"/>
+                  </a:cubicBezTo>
+                  <a:cubicBezTo>
+                    <a:pt x="3473616" y="1250166"/>
+                    <a:pt x="3428194" y="1329517"/>
+                    <a:pt x="3379198" y="1407037"/>
+                  </a:cubicBezTo>
+                  <a:cubicBezTo>
+                    <a:pt x="3281106" y="1561980"/>
+                    <a:pt x="3169132" y="1710174"/>
+                    <a:pt x="3043787" y="1848342"/>
+                  </a:cubicBezTo>
+                  <a:cubicBezTo>
+                    <a:pt x="2980806" y="1917184"/>
+                    <a:pt x="2915071" y="1984001"/>
+                    <a:pt x="2845661" y="2047444"/>
+                  </a:cubicBezTo>
+                  <a:cubicBezTo>
+                    <a:pt x="2828411" y="2063450"/>
+                    <a:pt x="2811060" y="2079263"/>
+                    <a:pt x="2793197" y="2094689"/>
+                  </a:cubicBezTo>
+                  <a:cubicBezTo>
+                    <a:pt x="2775436" y="2110213"/>
+                    <a:pt x="2757982" y="2126025"/>
+                    <a:pt x="2739710" y="2140969"/>
+                  </a:cubicBezTo>
+                  <a:cubicBezTo>
+                    <a:pt x="2703576" y="2171341"/>
+                    <a:pt x="2666524" y="2200749"/>
+                    <a:pt x="2629166" y="2229867"/>
+                  </a:cubicBezTo>
+                  <a:cubicBezTo>
+                    <a:pt x="2479015" y="2345569"/>
+                    <a:pt x="2316821" y="2448061"/>
+                    <a:pt x="2145952" y="2535994"/>
+                  </a:cubicBezTo>
+                  <a:cubicBezTo>
+                    <a:pt x="1804312" y="2711957"/>
+                    <a:pt x="1424600" y="2826982"/>
+                    <a:pt x="1034987" y="2863910"/>
+                  </a:cubicBezTo>
+                  <a:cubicBezTo>
+                    <a:pt x="937762" y="2873167"/>
+                    <a:pt x="839720" y="2877096"/>
+                    <a:pt x="741909" y="2875939"/>
+                  </a:cubicBezTo>
+                  <a:cubicBezTo>
+                    <a:pt x="644097" y="2874782"/>
+                    <a:pt x="546515" y="2868539"/>
+                    <a:pt x="450208" y="2857451"/>
+                  </a:cubicBezTo>
+                  <a:cubicBezTo>
+                    <a:pt x="305520" y="2840674"/>
+                    <a:pt x="162095" y="2813810"/>
+                    <a:pt x="22215" y="2775923"/>
+                  </a:cubicBezTo>
+                  <a:lnTo>
+                    <a:pt x="0" y="2769256"/>
+                  </a:lnTo>
+                  <a:lnTo>
+                    <a:pt x="0" y="2590612"/>
+                  </a:lnTo>
+                  <a:lnTo>
+                    <a:pt x="199046" y="2627410"/>
+                  </a:lnTo>
+                  <a:cubicBezTo>
+                    <a:pt x="288321" y="2639209"/>
+                    <a:pt x="378197" y="2646537"/>
+                    <a:pt x="468174" y="2649670"/>
+                  </a:cubicBezTo>
+                  <a:cubicBezTo>
+                    <a:pt x="648333" y="2656805"/>
+                    <a:pt x="826655" y="2647163"/>
+                    <a:pt x="1003650" y="2622480"/>
+                  </a:cubicBezTo>
+                  <a:cubicBezTo>
+                    <a:pt x="1091943" y="2609658"/>
+                    <a:pt x="1179725" y="2593747"/>
+                    <a:pt x="1266489" y="2573982"/>
+                  </a:cubicBezTo>
+                  <a:cubicBezTo>
+                    <a:pt x="1353250" y="2553927"/>
+                    <a:pt x="1439298" y="2531076"/>
+                    <a:pt x="1524223" y="2504657"/>
+                  </a:cubicBezTo>
+                  <a:cubicBezTo>
+                    <a:pt x="1609149" y="2478336"/>
+                    <a:pt x="1693052" y="2448833"/>
+                    <a:pt x="1775731" y="2416243"/>
+                  </a:cubicBezTo>
+                  <a:cubicBezTo>
+                    <a:pt x="1858309" y="2383557"/>
+                    <a:pt x="1939764" y="2347882"/>
+                    <a:pt x="2019789" y="2309412"/>
+                  </a:cubicBezTo>
+                  <a:cubicBezTo>
+                    <a:pt x="2179839" y="2232567"/>
+                    <a:pt x="2334583" y="2144923"/>
+                    <a:pt x="2482486" y="2046962"/>
+                  </a:cubicBezTo>
+                  <a:cubicBezTo>
+                    <a:pt x="2519334" y="2022376"/>
+                    <a:pt x="2556081" y="1997403"/>
+                    <a:pt x="2591908" y="1971371"/>
+                  </a:cubicBezTo>
+                  <a:cubicBezTo>
+                    <a:pt x="2610077" y="1958644"/>
+                    <a:pt x="2627838" y="1945434"/>
+                    <a:pt x="2645702" y="1932321"/>
+                  </a:cubicBezTo>
+                  <a:cubicBezTo>
+                    <a:pt x="2663666" y="1919305"/>
+                    <a:pt x="2681325" y="1905903"/>
+                    <a:pt x="2698779" y="1892309"/>
+                  </a:cubicBezTo>
+                  <a:cubicBezTo>
+                    <a:pt x="2768903" y="1838025"/>
+                    <a:pt x="2837496" y="1781717"/>
+                    <a:pt x="2903537" y="1722516"/>
+                  </a:cubicBezTo>
+                  <a:cubicBezTo>
+                    <a:pt x="3035926" y="1604501"/>
+                    <a:pt x="3158720" y="1475784"/>
+                    <a:pt x="3269061" y="1337327"/>
+                  </a:cubicBezTo>
+                  <a:cubicBezTo>
+                    <a:pt x="3324182" y="1268099"/>
+                    <a:pt x="3376341" y="1196461"/>
+                    <a:pt x="3424928" y="1122508"/>
+                  </a:cubicBezTo>
+                  <a:cubicBezTo>
+                    <a:pt x="3472697" y="1048170"/>
+                    <a:pt x="3517814" y="972000"/>
+                    <a:pt x="3557622" y="893226"/>
+                  </a:cubicBezTo>
+                  <a:cubicBezTo>
+                    <a:pt x="3567931" y="873654"/>
+                    <a:pt x="3577526" y="853791"/>
+                    <a:pt x="3587019" y="833929"/>
+                  </a:cubicBezTo>
+                  <a:lnTo>
+                    <a:pt x="3601310" y="804040"/>
+                  </a:lnTo>
+                  <a:lnTo>
+                    <a:pt x="3614885" y="773861"/>
+                  </a:lnTo>
+                  <a:cubicBezTo>
+                    <a:pt x="3623766" y="753709"/>
+                    <a:pt x="3632748" y="733559"/>
+                    <a:pt x="3640812" y="713022"/>
+                  </a:cubicBezTo>
+                  <a:cubicBezTo>
+                    <a:pt x="3648876" y="692485"/>
+                    <a:pt x="3657756" y="672236"/>
+                    <a:pt x="3665105" y="651506"/>
+                  </a:cubicBezTo>
+                  <a:cubicBezTo>
+                    <a:pt x="3696544" y="569166"/>
+                    <a:pt x="3723185" y="485089"/>
+                    <a:pt x="3744110" y="399567"/>
+                  </a:cubicBezTo>
+                  <a:cubicBezTo>
+                    <a:pt x="3765341" y="314238"/>
+                    <a:pt x="3781392" y="227654"/>
+                    <a:pt x="3792123" y="140444"/>
+                  </a:cubicBezTo>
+                  <a:close/>
+                </a:path>
+              </a:pathLst>
+            </a:custGeom>
+            <a:gradFill>
+              <a:gsLst>
+                <a:gs pos="2000">
+                  <a:schemeClr val="bg1">
+                    <a:alpha val="10000"/>
+                  </a:schemeClr>
+                </a:gs>
+                <a:gs pos="16000">
+                  <a:schemeClr val="accent6">
+                    <a:alpha val="10000"/>
+                  </a:schemeClr>
+                </a:gs>
+                <a:gs pos="100000">
+                  <a:schemeClr val="bg1">
+                    <a:alpha val="10000"/>
+                  </a:schemeClr>
+                </a:gs>
+                <a:gs pos="85000">
+                  <a:schemeClr val="accent1">
+                    <a:alpha val="10000"/>
+                  </a:schemeClr>
+                </a:gs>
+              </a:gsLst>
+              <a:lin ang="12000000" scaled="0"/>
+            </a:gradFill>
+            <a:ln>
+              <a:noFill/>
+            </a:ln>
+          </p:spPr>
+          <p:style>
+            <a:lnRef idx="2">
+              <a:schemeClr val="accent1">
+                <a:shade val="50000"/>
+              </a:schemeClr>
+            </a:lnRef>
+            <a:fillRef idx="1">
+              <a:schemeClr val="accent1"/>
+            </a:fillRef>
+            <a:effectRef idx="0">
+              <a:schemeClr val="accent1"/>
+            </a:effectRef>
+            <a:fontRef idx="minor">
+              <a:schemeClr val="lt1"/>
+            </a:fontRef>
+          </p:style>
+          <p:txBody>
+            <a:bodyPr rtlCol="0" anchor="ctr"/>
+            <a:lstStyle/>
+            <a:p>
+              <a:pPr algn="ctr"/>
+              <a:endParaRPr lang="en-US"/>
+            </a:p>
+          </p:txBody>
+        </p:sp>
+      </p:grpSp>
     </p:spTree>
     <p:extLst>
       <p:ext uri="{BB962C8B-B14F-4D97-AF65-F5344CB8AC3E}">
@@ -3787,43 +7500,43 @@
           <a:lstStyle/>
           <a:p>
             <a:r>
-              <a:rPr lang="en-US" sz="2000"/>
+              <a:rPr lang="en-US" sz="2000" dirty="0"/>
               <a:t>Introduction</a:t>
             </a:r>
           </a:p>
           <a:p>
-            <a:endParaRPr lang="en-US" sz="2000"/>
-          </a:p>
-          <a:p>
-            <a:r>
-              <a:rPr lang="en-US" sz="2000"/>
+            <a:endParaRPr lang="en-US" sz="2000" dirty="0"/>
+          </a:p>
+          <a:p>
+            <a:r>
+              <a:rPr lang="en-US" sz="2000" dirty="0"/>
               <a:t>Geographical locations and stats</a:t>
             </a:r>
           </a:p>
           <a:p>
-            <a:endParaRPr lang="en-US" sz="2000"/>
-          </a:p>
-          <a:p>
-            <a:r>
-              <a:rPr lang="en-US" sz="2000"/>
+            <a:endParaRPr lang="en-US" sz="2000" dirty="0"/>
+          </a:p>
+          <a:p>
+            <a:r>
+              <a:rPr lang="en-US" sz="2000" dirty="0"/>
               <a:t>Reviews and Heat Mapped Ratings</a:t>
             </a:r>
           </a:p>
           <a:p>
-            <a:endParaRPr lang="en-US" sz="2000"/>
-          </a:p>
-          <a:p>
-            <a:r>
-              <a:rPr lang="en-US" sz="2000"/>
+            <a:endParaRPr lang="en-US" sz="2000" dirty="0"/>
+          </a:p>
+          <a:p>
+            <a:r>
+              <a:rPr lang="en-US" sz="2000" dirty="0"/>
               <a:t>Visitor Experience and Revenue</a:t>
             </a:r>
           </a:p>
           <a:p>
-            <a:endParaRPr lang="en-US" sz="2000"/>
-          </a:p>
-          <a:p>
-            <a:r>
-              <a:rPr lang="en-US" sz="2000"/>
+            <a:endParaRPr lang="en-US" sz="2000" dirty="0"/>
+          </a:p>
+          <a:p>
+            <a:r>
+              <a:rPr lang="en-US" sz="2000" dirty="0"/>
               <a:t>Demonstration</a:t>
             </a:r>
           </a:p>
@@ -3967,74 +7680,71 @@
           <a:lstStyle/>
           <a:p>
             <a:r>
-              <a:rPr lang="en-US" sz="1400"/>
+              <a:rPr lang="en-US" sz="1400" dirty="0"/>
               <a:t>Purpose</a:t>
             </a:r>
           </a:p>
           <a:p>
             <a:pPr lvl="1"/>
             <a:r>
-              <a:rPr lang="en-US" sz="1400"/>
-              <a:t>Market Museums as Travel Hotspots (National &amp; International)</a:t>
-            </a:r>
-          </a:p>
-          <a:p>
-            <a:endParaRPr lang="en-US" sz="1400"/>
-          </a:p>
-          <a:p>
-            <a:r>
-              <a:rPr lang="en-US" sz="1400"/>
+              <a:rPr lang="en-US" sz="1400" dirty="0"/>
+              <a:t>Market Museums as Travel Hotspots (for National &amp; International Tourists)</a:t>
+            </a:r>
+          </a:p>
+          <a:p>
+            <a:endParaRPr lang="en-US" sz="1400" dirty="0"/>
+          </a:p>
+          <a:p>
+            <a:r>
+              <a:rPr lang="en-US" sz="1400" dirty="0"/>
               <a:t>Audience</a:t>
             </a:r>
           </a:p>
           <a:p>
             <a:pPr lvl="1"/>
             <a:r>
-              <a:rPr lang="en-US" sz="1400"/>
-              <a:t>United States Travel and Tourism Administration </a:t>
-            </a:r>
-            <a:r>
-              <a:rPr lang="en-US" sz="1400" u="sng"/>
-              <a:t>(You)</a:t>
-            </a:r>
+              <a:rPr lang="en-US" sz="1400" dirty="0"/>
+              <a:t>United States Travel and Tourism Administration</a:t>
+            </a:r>
+            <a:endParaRPr lang="en-US" sz="1400" u="sng" dirty="0"/>
           </a:p>
           <a:p>
             <a:pPr lvl="1"/>
-            <a:endParaRPr lang="en-US" sz="1400"/>
-          </a:p>
-          <a:p>
-            <a:r>
-              <a:rPr lang="en-US" sz="1400"/>
+            <a:endParaRPr lang="en-US" sz="1400" dirty="0"/>
+          </a:p>
+          <a:p>
+            <a:r>
+              <a:rPr lang="en-US" sz="1400" dirty="0"/>
               <a:t>Dashboard</a:t>
             </a:r>
           </a:p>
           <a:p>
             <a:pPr lvl="1"/>
             <a:r>
-              <a:rPr lang="en-US" sz="1400"/>
+              <a:rPr lang="en-US" sz="1400" dirty="0"/>
               <a:t>High level view of locations</a:t>
             </a:r>
           </a:p>
           <a:p>
             <a:pPr lvl="1"/>
             <a:r>
-              <a:rPr lang="en-US" sz="1400"/>
+              <a:rPr lang="en-US" sz="1400" dirty="0"/>
               <a:t>Heatmap to reviews</a:t>
             </a:r>
           </a:p>
           <a:p>
             <a:pPr lvl="1"/>
             <a:r>
-              <a:rPr lang="en-US" sz="1400"/>
+              <a:rPr lang="en-US" sz="1400" dirty="0"/>
               <a:t>View of revenue generation, and visitor experience</a:t>
             </a:r>
           </a:p>
           <a:p>
             <a:pPr lvl="1"/>
-            <a:endParaRPr lang="en-US" sz="1400"/>
-          </a:p>
-          <a:p>
-            <a:endParaRPr lang="en-US" sz="1400"/>
+            <a:endParaRPr lang="en-US" sz="1400" dirty="0"/>
+          </a:p>
+          <a:p>
+            <a:endParaRPr lang="en-US" sz="1400" dirty="0"/>
           </a:p>
         </p:txBody>
       </p:sp>
@@ -4274,7 +7984,7 @@
         </p:nvSpPr>
         <p:spPr>
           <a:xfrm>
-            <a:off x="761801" y="2884929"/>
+            <a:off x="761801" y="1957482"/>
             <a:ext cx="4659756" cy="3374137"/>
           </a:xfrm>
         </p:spPr>
@@ -4285,57 +7995,57 @@
           <a:lstStyle/>
           <a:p>
             <a:r>
-              <a:rPr lang="en-US" sz="2000"/>
+              <a:rPr lang="en-US" sz="2000" dirty="0"/>
               <a:t>33,000 museums</a:t>
             </a:r>
           </a:p>
           <a:p>
             <a:r>
-              <a:rPr lang="en-US" sz="2000"/>
+              <a:rPr lang="en-US" sz="2000" dirty="0"/>
               <a:t>Top states with museums</a:t>
             </a:r>
           </a:p>
           <a:p>
             <a:pPr lvl="1"/>
             <a:r>
-              <a:rPr lang="en-US" sz="2000"/>
+              <a:rPr lang="en-US" sz="2000" dirty="0"/>
               <a:t>Max museum and state: </a:t>
             </a:r>
           </a:p>
           <a:p>
             <a:pPr lvl="1"/>
             <a:r>
-              <a:rPr lang="en-US" sz="2000"/>
+              <a:rPr lang="en-US" sz="2000" dirty="0"/>
               <a:t>(lowest count within the top 10) Min museum and state:</a:t>
             </a:r>
           </a:p>
           <a:p>
             <a:pPr lvl="1"/>
-            <a:endParaRPr lang="en-US" sz="2000"/>
-          </a:p>
-          <a:p>
-            <a:r>
-              <a:rPr lang="en-US" sz="2000"/>
+            <a:endParaRPr lang="en-US" sz="2000" dirty="0"/>
+          </a:p>
+          <a:p>
+            <a:r>
+              <a:rPr lang="en-US" sz="2000" dirty="0"/>
               <a:t>Top Major Cities with museums</a:t>
             </a:r>
           </a:p>
           <a:p>
             <a:pPr lvl="1"/>
             <a:r>
-              <a:rPr lang="en-US" sz="2000"/>
+              <a:rPr lang="en-US" sz="2000" dirty="0"/>
               <a:t>Max museum and city</a:t>
             </a:r>
           </a:p>
           <a:p>
             <a:pPr lvl="1"/>
             <a:r>
-              <a:rPr lang="en-US" sz="2000"/>
+              <a:rPr lang="en-US" sz="2000" dirty="0"/>
               <a:t>(lowest count) Min museum and city</a:t>
             </a:r>
           </a:p>
           <a:p>
             <a:pPr lvl="1"/>
-            <a:endParaRPr lang="en-US" sz="2000"/>
+            <a:endParaRPr lang="en-US" sz="2000" dirty="0"/>
           </a:p>
         </p:txBody>
       </p:sp>
@@ -4414,7 +8124,7 @@
           </p:nvPr>
         </p:nvPicPr>
         <p:blipFill>
-          <a:blip r:embed="rId2"/>
+          <a:blip r:embed="rId3"/>
           <a:stretch>
             <a:fillRect/>
           </a:stretch>
@@ -4528,53 +8238,70 @@
           <a:lstStyle/>
           <a:p>
             <a:r>
-              <a:rPr lang="en-US" sz="2000"/>
+              <a:rPr lang="en-US" sz="2000" dirty="0"/>
               <a:t>Ratings</a:t>
             </a:r>
           </a:p>
           <a:p>
             <a:pPr lvl="1"/>
             <a:r>
-              <a:rPr lang="en-US" sz="2000"/>
-              <a:t>A collection of xyz</a:t>
-            </a:r>
-          </a:p>
-          <a:p>
-            <a:r>
-              <a:rPr lang="en-US" sz="2000"/>
+              <a:rPr lang="en-US" sz="2000" dirty="0"/>
+              <a:t>A collection of </a:t>
+            </a:r>
+            <a:r>
+              <a:rPr lang="en-US" sz="2000" dirty="0" err="1"/>
+              <a:t>xyz</a:t>
+            </a:r>
+            <a:endParaRPr lang="en-US" sz="2000" dirty="0"/>
+          </a:p>
+          <a:p>
+            <a:pPr lvl="2"/>
+            <a:r>
+              <a:rPr lang="en-US" sz="1600" dirty="0"/>
+              <a:t>Highest rated state for museums</a:t>
+            </a:r>
+          </a:p>
+          <a:p>
+            <a:r>
+              <a:rPr lang="en-US" sz="2000" dirty="0"/>
               <a:t>Ranks</a:t>
             </a:r>
           </a:p>
           <a:p>
             <a:pPr lvl="1"/>
             <a:r>
-              <a:rPr lang="en-US" sz="2000"/>
+              <a:rPr lang="en-US" sz="2000" dirty="0"/>
               <a:t>By State and Type</a:t>
             </a:r>
           </a:p>
           <a:p>
             <a:r>
-              <a:rPr lang="en-US" sz="2000"/>
+              <a:rPr lang="en-US" sz="2000" dirty="0"/>
               <a:t>Reviews</a:t>
             </a:r>
           </a:p>
           <a:p>
             <a:pPr lvl="1"/>
             <a:r>
-              <a:rPr lang="en-US" sz="2000"/>
+              <a:rPr lang="en-US" sz="2000" dirty="0"/>
               <a:t>By length of Stay</a:t>
             </a:r>
           </a:p>
           <a:p>
             <a:pPr lvl="1"/>
             <a:r>
-              <a:rPr lang="en-US" sz="2000"/>
-              <a:t>By type of exhibition, etc</a:t>
-            </a:r>
+              <a:rPr lang="en-US" sz="2000" dirty="0"/>
+              <a:t>By type of exhibition, </a:t>
+            </a:r>
+            <a:r>
+              <a:rPr lang="en-US" sz="2000" dirty="0" err="1"/>
+              <a:t>etc</a:t>
+            </a:r>
+            <a:endParaRPr lang="en-US" sz="2000" dirty="0"/>
           </a:p>
           <a:p>
             <a:pPr lvl="1"/>
-            <a:endParaRPr lang="en-US" sz="2000"/>
+            <a:endParaRPr lang="en-US" sz="2000" dirty="0"/>
           </a:p>
         </p:txBody>
       </p:sp>
@@ -4661,7 +8388,7 @@
           <a:p>
             <a:r>
               <a:rPr lang="en-US" dirty="0"/>
-              <a:t>Visitor Experience</a:t>
+              <a:t>Financial Location of Museums</a:t>
             </a:r>
           </a:p>
         </p:txBody>
@@ -4729,227 +8456,6 @@
           <a:chExt cx="0" cy="0"/>
         </a:xfrm>
       </p:grpSpPr>
-      <p:sp useBgFill="1">
-        <p:nvSpPr>
-          <p:cNvPr id="35" name="Slide Background">
-            <a:extLst>
-              <a:ext uri="{FF2B5EF4-FFF2-40B4-BE49-F238E27FC236}">
-                <a16:creationId xmlns:a16="http://schemas.microsoft.com/office/drawing/2014/main" id="{FE1EC756-41E9-4FD6-AD48-EF46A28137B7}"/>
-              </a:ext>
-              <a:ext uri="{C183D7F6-B498-43B3-948B-1728B52AA6E4}">
-                <adec:decorative xmlns:adec="http://schemas.microsoft.com/office/drawing/2017/decorative" val="1"/>
-              </a:ext>
-            </a:extLst>
-          </p:cNvPr>
-          <p:cNvSpPr>
-            <a:spLocks noGrp="1" noRot="1" noChangeAspect="1" noMove="1" noResize="1" noEditPoints="1" noAdjustHandles="1" noChangeArrowheads="1" noChangeShapeType="1" noTextEdit="1"/>
-          </p:cNvSpPr>
-          <p:nvPr>
-            <p:extLst>
-              <p:ext uri="{386F3935-93C4-4BCD-93E2-E3B085C9AB24}">
-                <p16:designElem xmlns:p16="http://schemas.microsoft.com/office/powerpoint/2015/main" val="1"/>
-              </p:ext>
-            </p:extLst>
-          </p:nvPr>
-        </p:nvSpPr>
-        <p:spPr bwMode="white">
-          <a:xfrm>
-            <a:off x="-1" y="0"/>
-            <a:ext cx="12191999" cy="6858000"/>
-          </a:xfrm>
-          <a:prstGeom prst="rect">
-            <a:avLst/>
-          </a:prstGeom>
-          <a:ln>
-            <a:noFill/>
-          </a:ln>
-        </p:spPr>
-        <p:style>
-          <a:lnRef idx="2">
-            <a:schemeClr val="accent1">
-              <a:shade val="50000"/>
-            </a:schemeClr>
-          </a:lnRef>
-          <a:fillRef idx="1">
-            <a:schemeClr val="accent1"/>
-          </a:fillRef>
-          <a:effectRef idx="0">
-            <a:schemeClr val="accent1"/>
-          </a:effectRef>
-          <a:fontRef idx="minor">
-            <a:schemeClr val="lt1"/>
-          </a:fontRef>
-        </p:style>
-        <p:txBody>
-          <a:bodyPr rtlCol="0" anchor="ctr"/>
-          <a:lstStyle>
-            <a:defPPr>
-              <a:defRPr lang="en-US"/>
-            </a:defPPr>
-            <a:lvl1pPr marL="0" algn="l" defTabSz="914400" rtl="0" eaLnBrk="1" latinLnBrk="0" hangingPunct="1">
-              <a:defRPr sz="1800" kern="1200">
-                <a:solidFill>
-                  <a:schemeClr val="lt1"/>
-                </a:solidFill>
-                <a:latin typeface="+mn-lt"/>
-                <a:ea typeface="+mn-ea"/>
-                <a:cs typeface="+mn-cs"/>
-              </a:defRPr>
-            </a:lvl1pPr>
-            <a:lvl2pPr marL="457200" algn="l" defTabSz="914400" rtl="0" eaLnBrk="1" latinLnBrk="0" hangingPunct="1">
-              <a:defRPr sz="1800" kern="1200">
-                <a:solidFill>
-                  <a:schemeClr val="lt1"/>
-                </a:solidFill>
-                <a:latin typeface="+mn-lt"/>
-                <a:ea typeface="+mn-ea"/>
-                <a:cs typeface="+mn-cs"/>
-              </a:defRPr>
-            </a:lvl2pPr>
-            <a:lvl3pPr marL="914400" algn="l" defTabSz="914400" rtl="0" eaLnBrk="1" latinLnBrk="0" hangingPunct="1">
-              <a:defRPr sz="1800" kern="1200">
-                <a:solidFill>
-                  <a:schemeClr val="lt1"/>
-                </a:solidFill>
-                <a:latin typeface="+mn-lt"/>
-                <a:ea typeface="+mn-ea"/>
-                <a:cs typeface="+mn-cs"/>
-              </a:defRPr>
-            </a:lvl3pPr>
-            <a:lvl4pPr marL="1371600" algn="l" defTabSz="914400" rtl="0" eaLnBrk="1" latinLnBrk="0" hangingPunct="1">
-              <a:defRPr sz="1800" kern="1200">
-                <a:solidFill>
-                  <a:schemeClr val="lt1"/>
-                </a:solidFill>
-                <a:latin typeface="+mn-lt"/>
-                <a:ea typeface="+mn-ea"/>
-                <a:cs typeface="+mn-cs"/>
-              </a:defRPr>
-            </a:lvl4pPr>
-            <a:lvl5pPr marL="1828800" algn="l" defTabSz="914400" rtl="0" eaLnBrk="1" latinLnBrk="0" hangingPunct="1">
-              <a:defRPr sz="1800" kern="1200">
-                <a:solidFill>
-                  <a:schemeClr val="lt1"/>
-                </a:solidFill>
-                <a:latin typeface="+mn-lt"/>
-                <a:ea typeface="+mn-ea"/>
-                <a:cs typeface="+mn-cs"/>
-              </a:defRPr>
-            </a:lvl5pPr>
-            <a:lvl6pPr marL="2286000" algn="l" defTabSz="914400" rtl="0" eaLnBrk="1" latinLnBrk="0" hangingPunct="1">
-              <a:defRPr sz="1800" kern="1200">
-                <a:solidFill>
-                  <a:schemeClr val="lt1"/>
-                </a:solidFill>
-                <a:latin typeface="+mn-lt"/>
-                <a:ea typeface="+mn-ea"/>
-                <a:cs typeface="+mn-cs"/>
-              </a:defRPr>
-            </a:lvl6pPr>
-            <a:lvl7pPr marL="2743200" algn="l" defTabSz="914400" rtl="0" eaLnBrk="1" latinLnBrk="0" hangingPunct="1">
-              <a:defRPr sz="1800" kern="1200">
-                <a:solidFill>
-                  <a:schemeClr val="lt1"/>
-                </a:solidFill>
-                <a:latin typeface="+mn-lt"/>
-                <a:ea typeface="+mn-ea"/>
-                <a:cs typeface="+mn-cs"/>
-              </a:defRPr>
-            </a:lvl7pPr>
-            <a:lvl8pPr marL="3200400" algn="l" defTabSz="914400" rtl="0" eaLnBrk="1" latinLnBrk="0" hangingPunct="1">
-              <a:defRPr sz="1800" kern="1200">
-                <a:solidFill>
-                  <a:schemeClr val="lt1"/>
-                </a:solidFill>
-                <a:latin typeface="+mn-lt"/>
-                <a:ea typeface="+mn-ea"/>
-                <a:cs typeface="+mn-cs"/>
-              </a:defRPr>
-            </a:lvl8pPr>
-            <a:lvl9pPr marL="3657600" algn="l" defTabSz="914400" rtl="0" eaLnBrk="1" latinLnBrk="0" hangingPunct="1">
-              <a:defRPr sz="1800" kern="1200">
-                <a:solidFill>
-                  <a:schemeClr val="lt1"/>
-                </a:solidFill>
-                <a:latin typeface="+mn-lt"/>
-                <a:ea typeface="+mn-ea"/>
-                <a:cs typeface="+mn-cs"/>
-              </a:defRPr>
-            </a:lvl9pPr>
-          </a:lstStyle>
-          <a:p>
-            <a:pPr algn="ctr"/>
-            <a:endParaRPr lang="en-US"/>
-          </a:p>
-        </p:txBody>
-      </p:sp>
-      <p:sp useBgFill="1">
-        <p:nvSpPr>
-          <p:cNvPr id="34" name="Rectangle 33">
-            <a:extLst>
-              <a:ext uri="{FF2B5EF4-FFF2-40B4-BE49-F238E27FC236}">
-                <a16:creationId xmlns:a16="http://schemas.microsoft.com/office/drawing/2014/main" id="{E66F6371-9EA5-9354-29DC-1D07B921F79C}"/>
-              </a:ext>
-              <a:ext uri="{C183D7F6-B498-43B3-948B-1728B52AA6E4}">
-                <adec:decorative xmlns:adec="http://schemas.microsoft.com/office/drawing/2017/decorative" val="1"/>
-              </a:ext>
-            </a:extLst>
-          </p:cNvPr>
-          <p:cNvSpPr>
-            <a:spLocks noGrp="1" noRot="1" noChangeAspect="1" noMove="1" noResize="1" noEditPoints="1" noAdjustHandles="1" noChangeArrowheads="1" noChangeShapeType="1" noTextEdit="1"/>
-          </p:cNvSpPr>
-          <p:nvPr>
-            <p:extLst>
-              <p:ext uri="{386F3935-93C4-4BCD-93E2-E3B085C9AB24}">
-                <p16:designElem xmlns:p16="http://schemas.microsoft.com/office/powerpoint/2015/main" val="1"/>
-              </p:ext>
-            </p:extLst>
-          </p:nvPr>
-        </p:nvSpPr>
-        <p:spPr>
-          <a:xfrm>
-            <a:off x="-1" y="-4290"/>
-            <a:ext cx="12192000" cy="1733407"/>
-          </a:xfrm>
-          <a:prstGeom prst="rect">
-            <a:avLst/>
-          </a:prstGeom>
-          <a:ln>
-            <a:noFill/>
-          </a:ln>
-          <a:effectLst>
-            <a:outerShdw blurRad="254000" dist="38100" dir="5460000" sx="94000" sy="94000" algn="t" rotWithShape="0">
-              <a:srgbClr val="000000">
-                <a:alpha val="30000"/>
-              </a:srgbClr>
-            </a:outerShdw>
-          </a:effectLst>
-        </p:spPr>
-        <p:style>
-          <a:lnRef idx="2">
-            <a:schemeClr val="accent1">
-              <a:shade val="50000"/>
-            </a:schemeClr>
-          </a:lnRef>
-          <a:fillRef idx="1">
-            <a:schemeClr val="accent1"/>
-          </a:fillRef>
-          <a:effectRef idx="0">
-            <a:schemeClr val="accent1"/>
-          </a:effectRef>
-          <a:fontRef idx="minor">
-            <a:schemeClr val="lt1"/>
-          </a:fontRef>
-        </p:style>
-        <p:txBody>
-          <a:bodyPr rtlCol="0" anchor="ctr"/>
-          <a:lstStyle/>
-          <a:p>
-            <a:pPr algn="ctr"/>
-            <a:endParaRPr lang="en-US"/>
-          </a:p>
-        </p:txBody>
-      </p:sp>
       <p:sp>
         <p:nvSpPr>
           <p:cNvPr id="2" name="Title 1">
@@ -4982,6 +8488,93 @@
               <a:rPr lang="en-US" sz="4000"/>
               <a:t>Revenue</a:t>
             </a:r>
+          </a:p>
+        </p:txBody>
+      </p:sp>
+      <p:sp>
+        <p:nvSpPr>
+          <p:cNvPr id="27" name="Content Placeholder 2">
+            <a:extLst>
+              <a:ext uri="{FF2B5EF4-FFF2-40B4-BE49-F238E27FC236}">
+                <a16:creationId xmlns:a16="http://schemas.microsoft.com/office/drawing/2014/main" id="{CE11FD82-31FF-DA16-5FA1-FB3EEF04A302}"/>
+              </a:ext>
+            </a:extLst>
+          </p:cNvPr>
+          <p:cNvSpPr>
+            <a:spLocks noGrp="1"/>
+          </p:cNvSpPr>
+          <p:nvPr>
+            <p:ph idx="1"/>
+          </p:nvPr>
+        </p:nvSpPr>
+        <p:spPr>
+          <a:xfrm>
+            <a:off x="7190509" y="2357888"/>
+            <a:ext cx="4265370" cy="3902635"/>
+          </a:xfrm>
+        </p:spPr>
+        <p:txBody>
+          <a:bodyPr anchor="ctr">
+            <a:normAutofit/>
+          </a:bodyPr>
+          <a:lstStyle/>
+          <a:p>
+            <a:r>
+              <a:rPr lang="en-US" sz="2000" dirty="0"/>
+              <a:t>Largest Revenue Generation</a:t>
+            </a:r>
+          </a:p>
+          <a:p>
+            <a:pPr lvl="1"/>
+            <a:r>
+              <a:rPr lang="en-US" sz="2000" dirty="0"/>
+              <a:t>Research based</a:t>
+            </a:r>
+          </a:p>
+          <a:p>
+            <a:r>
+              <a:rPr lang="en-US" sz="2000" dirty="0"/>
+              <a:t>Smallest Revenue Generation</a:t>
+            </a:r>
+          </a:p>
+          <a:p>
+            <a:pPr lvl="1"/>
+            <a:r>
+              <a:rPr lang="en-US" sz="2000" dirty="0"/>
+              <a:t>Exhibitions only</a:t>
+            </a:r>
+          </a:p>
+          <a:p>
+            <a:endParaRPr lang="en-US" sz="2000" dirty="0"/>
+          </a:p>
+          <a:p>
+            <a:r>
+              <a:rPr lang="en-US" sz="2000" dirty="0"/>
+              <a:t>Length of stay</a:t>
+            </a:r>
+          </a:p>
+          <a:p>
+            <a:pPr lvl="1"/>
+            <a:r>
+              <a:rPr lang="en-US" sz="2000" dirty="0"/>
+              <a:t>By length of Stay</a:t>
+            </a:r>
+          </a:p>
+          <a:p>
+            <a:pPr lvl="1"/>
+            <a:r>
+              <a:rPr lang="en-US" sz="2000" dirty="0"/>
+              <a:t>By type of exhibition, </a:t>
+            </a:r>
+            <a:r>
+              <a:rPr lang="en-US" sz="2000" dirty="0" err="1"/>
+              <a:t>etc</a:t>
+            </a:r>
+            <a:endParaRPr lang="en-US" sz="2000" dirty="0"/>
+          </a:p>
+          <a:p>
+            <a:pPr lvl="1"/>
+            <a:endParaRPr lang="en-US" sz="2000" dirty="0"/>
           </a:p>
         </p:txBody>
       </p:sp>
@@ -5014,88 +8607,6 @@
           </a:prstGeom>
         </p:spPr>
       </p:pic>
-      <p:sp>
-        <p:nvSpPr>
-          <p:cNvPr id="27" name="Content Placeholder 2">
-            <a:extLst>
-              <a:ext uri="{FF2B5EF4-FFF2-40B4-BE49-F238E27FC236}">
-                <a16:creationId xmlns:a16="http://schemas.microsoft.com/office/drawing/2014/main" id="{CE11FD82-31FF-DA16-5FA1-FB3EEF04A302}"/>
-              </a:ext>
-            </a:extLst>
-          </p:cNvPr>
-          <p:cNvSpPr>
-            <a:spLocks noGrp="1"/>
-          </p:cNvSpPr>
-          <p:nvPr>
-            <p:ph idx="1"/>
-          </p:nvPr>
-        </p:nvSpPr>
-        <p:spPr>
-          <a:xfrm>
-            <a:off x="7190509" y="2357888"/>
-            <a:ext cx="4265370" cy="3902635"/>
-          </a:xfrm>
-        </p:spPr>
-        <p:txBody>
-          <a:bodyPr anchor="ctr">
-            <a:normAutofit/>
-          </a:bodyPr>
-          <a:lstStyle/>
-          <a:p>
-            <a:r>
-              <a:rPr lang="en-US" sz="2000"/>
-              <a:t>Largest Revenue Generation</a:t>
-            </a:r>
-          </a:p>
-          <a:p>
-            <a:pPr lvl="1"/>
-            <a:r>
-              <a:rPr lang="en-US" sz="2000"/>
-              <a:t>Research based</a:t>
-            </a:r>
-          </a:p>
-          <a:p>
-            <a:r>
-              <a:rPr lang="en-US" sz="2000"/>
-              <a:t>Smallest Revenue Generation</a:t>
-            </a:r>
-          </a:p>
-          <a:p>
-            <a:pPr lvl="1"/>
-            <a:r>
-              <a:rPr lang="en-US" sz="2000"/>
-              <a:t>Exhibitions only</a:t>
-            </a:r>
-          </a:p>
-          <a:p>
-            <a:endParaRPr lang="en-US" sz="2000"/>
-          </a:p>
-          <a:p>
-            <a:r>
-              <a:rPr lang="en-US" sz="2000"/>
-              <a:t>Length of stay</a:t>
-            </a:r>
-          </a:p>
-          <a:p>
-            <a:pPr lvl="1"/>
-            <a:r>
-              <a:rPr lang="en-US" sz="2000"/>
-              <a:t>By length of Stay</a:t>
-            </a:r>
-          </a:p>
-          <a:p>
-            <a:pPr lvl="1"/>
-            <a:r>
-              <a:rPr lang="en-US" sz="2000"/>
-              <a:t>By type of exhibition, etc</a:t>
-            </a:r>
-          </a:p>
-          <a:p>
-            <a:pPr lvl="1"/>
-            <a:endParaRPr lang="en-US" sz="2000"/>
-          </a:p>
-        </p:txBody>
-      </p:sp>
     </p:spTree>
     <p:extLst>
       <p:ext uri="{BB962C8B-B14F-4D97-AF65-F5344CB8AC3E}">
@@ -5402,4 +8913,299 @@
     </a:ext>
   </a:extLst>
 </a:theme>
+</file>
+
+<file path=ppt/theme/theme2.xml><?xml version="1.0" encoding="utf-8"?>
+<a:theme xmlns:a="http://schemas.openxmlformats.org/drawingml/2006/main" name="Office Theme">
+  <a:themeElements>
+    <a:clrScheme name="Office">
+      <a:dk1>
+        <a:sysClr val="windowText" lastClr="000000"/>
+      </a:dk1>
+      <a:lt1>
+        <a:sysClr val="window" lastClr="FFFFFF"/>
+      </a:lt1>
+      <a:dk2>
+        <a:srgbClr val="44546A"/>
+      </a:dk2>
+      <a:lt2>
+        <a:srgbClr val="E7E6E6"/>
+      </a:lt2>
+      <a:accent1>
+        <a:srgbClr val="4472C4"/>
+      </a:accent1>
+      <a:accent2>
+        <a:srgbClr val="ED7D31"/>
+      </a:accent2>
+      <a:accent3>
+        <a:srgbClr val="A5A5A5"/>
+      </a:accent3>
+      <a:accent4>
+        <a:srgbClr val="FFC000"/>
+      </a:accent4>
+      <a:accent5>
+        <a:srgbClr val="5B9BD5"/>
+      </a:accent5>
+      <a:accent6>
+        <a:srgbClr val="70AD47"/>
+      </a:accent6>
+      <a:hlink>
+        <a:srgbClr val="0563C1"/>
+      </a:hlink>
+      <a:folHlink>
+        <a:srgbClr val="954F72"/>
+      </a:folHlink>
+    </a:clrScheme>
+    <a:fontScheme name="Office">
+      <a:majorFont>
+        <a:latin typeface="Calibri Light" panose="020F0302020204030204"/>
+        <a:ea typeface=""/>
+        <a:cs typeface=""/>
+        <a:font script="Jpan" typeface="游ゴシック Light"/>
+        <a:font script="Hang" typeface="맑은 고딕"/>
+        <a:font script="Hans" typeface="等线 Light"/>
+        <a:font script="Hant" typeface="新細明體"/>
+        <a:font script="Arab" typeface="Times New Roman"/>
+        <a:font script="Hebr" typeface="Times New Roman"/>
+        <a:font script="Thai" typeface="Angsana New"/>
+        <a:font script="Ethi" typeface="Nyala"/>
+        <a:font script="Beng" typeface="Vrinda"/>
+        <a:font script="Gujr" typeface="Shruti"/>
+        <a:font script="Khmr" typeface="MoolBoran"/>
+        <a:font script="Knda" typeface="Tunga"/>
+        <a:font script="Guru" typeface="Raavi"/>
+        <a:font script="Cans" typeface="Euphemia"/>
+        <a:font script="Cher" typeface="Plantagenet Cherokee"/>
+        <a:font script="Yiii" typeface="Microsoft Yi Baiti"/>
+        <a:font script="Tibt" typeface="Microsoft Himalaya"/>
+        <a:font script="Thaa" typeface="MV Boli"/>
+        <a:font script="Deva" typeface="Mangal"/>
+        <a:font script="Telu" typeface="Gautami"/>
+        <a:font script="Taml" typeface="Latha"/>
+        <a:font script="Syrc" typeface="Estrangelo Edessa"/>
+        <a:font script="Orya" typeface="Kalinga"/>
+        <a:font script="Mlym" typeface="Kartika"/>
+        <a:font script="Laoo" typeface="DokChampa"/>
+        <a:font script="Sinh" typeface="Iskoola Pota"/>
+        <a:font script="Mong" typeface="Mongolian Baiti"/>
+        <a:font script="Viet" typeface="Times New Roman"/>
+        <a:font script="Uigh" typeface="Microsoft Uighur"/>
+        <a:font script="Geor" typeface="Sylfaen"/>
+        <a:font script="Armn" typeface="Arial"/>
+        <a:font script="Bugi" typeface="Leelawadee UI"/>
+        <a:font script="Bopo" typeface="Microsoft JhengHei"/>
+        <a:font script="Java" typeface="Javanese Text"/>
+        <a:font script="Lisu" typeface="Segoe UI"/>
+        <a:font script="Mymr" typeface="Myanmar Text"/>
+        <a:font script="Nkoo" typeface="Ebrima"/>
+        <a:font script="Olck" typeface="Nirmala UI"/>
+        <a:font script="Osma" typeface="Ebrima"/>
+        <a:font script="Phag" typeface="Phagspa"/>
+        <a:font script="Syrn" typeface="Estrangelo Edessa"/>
+        <a:font script="Syrj" typeface="Estrangelo Edessa"/>
+        <a:font script="Syre" typeface="Estrangelo Edessa"/>
+        <a:font script="Sora" typeface="Nirmala UI"/>
+        <a:font script="Tale" typeface="Microsoft Tai Le"/>
+        <a:font script="Talu" typeface="Microsoft New Tai Lue"/>
+        <a:font script="Tfng" typeface="Ebrima"/>
+      </a:majorFont>
+      <a:minorFont>
+        <a:latin typeface="Calibri" panose="020F0502020204030204"/>
+        <a:ea typeface=""/>
+        <a:cs typeface=""/>
+        <a:font script="Jpan" typeface="游ゴシック"/>
+        <a:font script="Hang" typeface="맑은 고딕"/>
+        <a:font script="Hans" typeface="等线"/>
+        <a:font script="Hant" typeface="新細明體"/>
+        <a:font script="Arab" typeface="Arial"/>
+        <a:font script="Hebr" typeface="Arial"/>
+        <a:font script="Thai" typeface="Cordia New"/>
+        <a:font script="Ethi" typeface="Nyala"/>
+        <a:font script="Beng" typeface="Vrinda"/>
+        <a:font script="Gujr" typeface="Shruti"/>
+        <a:font script="Khmr" typeface="DaunPenh"/>
+        <a:font script="Knda" typeface="Tunga"/>
+        <a:font script="Guru" typeface="Raavi"/>
+        <a:font script="Cans" typeface="Euphemia"/>
+        <a:font script="Cher" typeface="Plantagenet Cherokee"/>
+        <a:font script="Yiii" typeface="Microsoft Yi Baiti"/>
+        <a:font script="Tibt" typeface="Microsoft Himalaya"/>
+        <a:font script="Thaa" typeface="MV Boli"/>
+        <a:font script="Deva" typeface="Mangal"/>
+        <a:font script="Telu" typeface="Gautami"/>
+        <a:font script="Taml" typeface="Latha"/>
+        <a:font script="Syrc" typeface="Estrangelo Edessa"/>
+        <a:font script="Orya" typeface="Kalinga"/>
+        <a:font script="Mlym" typeface="Kartika"/>
+        <a:font script="Laoo" typeface="DokChampa"/>
+        <a:font script="Sinh" typeface="Iskoola Pota"/>
+        <a:font script="Mong" typeface="Mongolian Baiti"/>
+        <a:font script="Viet" typeface="Arial"/>
+        <a:font script="Uigh" typeface="Microsoft Uighur"/>
+        <a:font script="Geor" typeface="Sylfaen"/>
+        <a:font script="Armn" typeface="Arial"/>
+        <a:font script="Bugi" typeface="Leelawadee UI"/>
+        <a:font script="Bopo" typeface="Microsoft JhengHei"/>
+        <a:font script="Java" typeface="Javanese Text"/>
+        <a:font script="Lisu" typeface="Segoe UI"/>
+        <a:font script="Mymr" typeface="Myanmar Text"/>
+        <a:font script="Nkoo" typeface="Ebrima"/>
+        <a:font script="Olck" typeface="Nirmala UI"/>
+        <a:font script="Osma" typeface="Ebrima"/>
+        <a:font script="Phag" typeface="Phagspa"/>
+        <a:font script="Syrn" typeface="Estrangelo Edessa"/>
+        <a:font script="Syrj" typeface="Estrangelo Edessa"/>
+        <a:font script="Syre" typeface="Estrangelo Edessa"/>
+        <a:font script="Sora" typeface="Nirmala UI"/>
+        <a:font script="Tale" typeface="Microsoft Tai Le"/>
+        <a:font script="Talu" typeface="Microsoft New Tai Lue"/>
+        <a:font script="Tfng" typeface="Ebrima"/>
+      </a:minorFont>
+    </a:fontScheme>
+    <a:fmtScheme name="Office">
+      <a:fillStyleLst>
+        <a:solidFill>
+          <a:schemeClr val="phClr"/>
+        </a:solidFill>
+        <a:gradFill rotWithShape="1">
+          <a:gsLst>
+            <a:gs pos="0">
+              <a:schemeClr val="phClr">
+                <a:lumMod val="110000"/>
+                <a:satMod val="105000"/>
+                <a:tint val="67000"/>
+              </a:schemeClr>
+            </a:gs>
+            <a:gs pos="50000">
+              <a:schemeClr val="phClr">
+                <a:lumMod val="105000"/>
+                <a:satMod val="103000"/>
+                <a:tint val="73000"/>
+              </a:schemeClr>
+            </a:gs>
+            <a:gs pos="100000">
+              <a:schemeClr val="phClr">
+                <a:lumMod val="105000"/>
+                <a:satMod val="109000"/>
+                <a:tint val="81000"/>
+              </a:schemeClr>
+            </a:gs>
+          </a:gsLst>
+          <a:lin ang="5400000" scaled="0"/>
+        </a:gradFill>
+        <a:gradFill rotWithShape="1">
+          <a:gsLst>
+            <a:gs pos="0">
+              <a:schemeClr val="phClr">
+                <a:satMod val="103000"/>
+                <a:lumMod val="102000"/>
+                <a:tint val="94000"/>
+              </a:schemeClr>
+            </a:gs>
+            <a:gs pos="50000">
+              <a:schemeClr val="phClr">
+                <a:satMod val="110000"/>
+                <a:lumMod val="100000"/>
+                <a:shade val="100000"/>
+              </a:schemeClr>
+            </a:gs>
+            <a:gs pos="100000">
+              <a:schemeClr val="phClr">
+                <a:lumMod val="99000"/>
+                <a:satMod val="120000"/>
+                <a:shade val="78000"/>
+              </a:schemeClr>
+            </a:gs>
+          </a:gsLst>
+          <a:lin ang="5400000" scaled="0"/>
+        </a:gradFill>
+      </a:fillStyleLst>
+      <a:lnStyleLst>
+        <a:ln w="6350" cap="flat" cmpd="sng" algn="ctr">
+          <a:solidFill>
+            <a:schemeClr val="phClr"/>
+          </a:solidFill>
+          <a:prstDash val="solid"/>
+          <a:miter lim="800000"/>
+        </a:ln>
+        <a:ln w="12700" cap="flat" cmpd="sng" algn="ctr">
+          <a:solidFill>
+            <a:schemeClr val="phClr"/>
+          </a:solidFill>
+          <a:prstDash val="solid"/>
+          <a:miter lim="800000"/>
+        </a:ln>
+        <a:ln w="19050" cap="flat" cmpd="sng" algn="ctr">
+          <a:solidFill>
+            <a:schemeClr val="phClr"/>
+          </a:solidFill>
+          <a:prstDash val="solid"/>
+          <a:miter lim="800000"/>
+        </a:ln>
+      </a:lnStyleLst>
+      <a:effectStyleLst>
+        <a:effectStyle>
+          <a:effectLst/>
+        </a:effectStyle>
+        <a:effectStyle>
+          <a:effectLst/>
+        </a:effectStyle>
+        <a:effectStyle>
+          <a:effectLst>
+            <a:outerShdw blurRad="57150" dist="19050" dir="5400000" algn="ctr" rotWithShape="0">
+              <a:srgbClr val="000000">
+                <a:alpha val="63000"/>
+              </a:srgbClr>
+            </a:outerShdw>
+          </a:effectLst>
+        </a:effectStyle>
+      </a:effectStyleLst>
+      <a:bgFillStyleLst>
+        <a:solidFill>
+          <a:schemeClr val="phClr"/>
+        </a:solidFill>
+        <a:solidFill>
+          <a:schemeClr val="phClr">
+            <a:tint val="95000"/>
+            <a:satMod val="170000"/>
+          </a:schemeClr>
+        </a:solidFill>
+        <a:gradFill rotWithShape="1">
+          <a:gsLst>
+            <a:gs pos="0">
+              <a:schemeClr val="phClr">
+                <a:tint val="93000"/>
+                <a:satMod val="150000"/>
+                <a:shade val="98000"/>
+                <a:lumMod val="102000"/>
+              </a:schemeClr>
+            </a:gs>
+            <a:gs pos="50000">
+              <a:schemeClr val="phClr">
+                <a:tint val="98000"/>
+                <a:satMod val="130000"/>
+                <a:shade val="90000"/>
+                <a:lumMod val="103000"/>
+              </a:schemeClr>
+            </a:gs>
+            <a:gs pos="100000">
+              <a:schemeClr val="phClr">
+                <a:shade val="63000"/>
+                <a:satMod val="120000"/>
+              </a:schemeClr>
+            </a:gs>
+          </a:gsLst>
+          <a:lin ang="5400000" scaled="0"/>
+        </a:gradFill>
+      </a:bgFillStyleLst>
+    </a:fmtScheme>
+  </a:themeElements>
+  <a:objectDefaults/>
+  <a:extraClrSchemeLst/>
+  <a:extLst>
+    <a:ext uri="{05A4C25C-085E-4340-85A3-A5531E510DB2}">
+      <thm15:themeFamily xmlns:thm15="http://schemas.microsoft.com/office/thememl/2012/main" name="Office Theme" id="{62F939B6-93AF-4DB8-9C6B-D6C7DFDC589F}" vid="{4A3C46E8-61CC-4603-A589-7422A47A8E4A}"/>
+    </a:ext>
+  </a:extLst>
+</a:theme>
 </file>
</xml_diff>